<commit_message>
Adding updated presentation and notebook
</commit_message>
<xml_diff>
--- a/School District Analysis.pptx
+++ b/School District Analysis.pptx
@@ -7,10 +7,30 @@
   <p:sldIdLst>
     <p:sldId id="256" r:id="rId2"/>
     <p:sldId id="260" r:id="rId3"/>
-    <p:sldId id="289" r:id="rId4"/>
-    <p:sldId id="263" r:id="rId5"/>
-    <p:sldId id="291" r:id="rId6"/>
-    <p:sldId id="290" r:id="rId7"/>
+    <p:sldId id="263" r:id="rId4"/>
+    <p:sldId id="292" r:id="rId5"/>
+    <p:sldId id="289" r:id="rId6"/>
+    <p:sldId id="313" r:id="rId7"/>
+    <p:sldId id="294" r:id="rId8"/>
+    <p:sldId id="295" r:id="rId9"/>
+    <p:sldId id="293" r:id="rId10"/>
+    <p:sldId id="296" r:id="rId11"/>
+    <p:sldId id="297" r:id="rId12"/>
+    <p:sldId id="298" r:id="rId13"/>
+    <p:sldId id="314" r:id="rId14"/>
+    <p:sldId id="311" r:id="rId15"/>
+    <p:sldId id="312" r:id="rId16"/>
+    <p:sldId id="302" r:id="rId17"/>
+    <p:sldId id="299" r:id="rId18"/>
+    <p:sldId id="305" r:id="rId19"/>
+    <p:sldId id="306" r:id="rId20"/>
+    <p:sldId id="301" r:id="rId21"/>
+    <p:sldId id="304" r:id="rId22"/>
+    <p:sldId id="303" r:id="rId23"/>
+    <p:sldId id="307" r:id="rId24"/>
+    <p:sldId id="308" r:id="rId25"/>
+    <p:sldId id="309" r:id="rId26"/>
+    <p:sldId id="310" r:id="rId27"/>
   </p:sldIdLst>
   <p:sldSz cx="12192000" cy="6858000"/>
   <p:notesSz cx="6858000" cy="9144000"/>
@@ -116,10 +136,58 @@
           <p14:sldIdLst>
             <p14:sldId id="256"/>
             <p14:sldId id="260"/>
+          </p14:sldIdLst>
+        </p14:section>
+        <p14:section name="District Summary" id="{60A85B93-7758-468C-AE2A-53736DEE4DB4}">
+          <p14:sldIdLst>
+            <p14:sldId id="263"/>
+          </p14:sldIdLst>
+        </p14:section>
+        <p14:section name="Key Observations" id="{7E2FB61D-AE37-43CE-AB20-3346EC32D3B2}">
+          <p14:sldIdLst>
+            <p14:sldId id="292"/>
+          </p14:sldIdLst>
+        </p14:section>
+        <p14:section name="Success Metrics" id="{769FD178-F77E-4519-B993-FC257C48715B}">
+          <p14:sldIdLst>
             <p14:sldId id="289"/>
-            <p14:sldId id="263"/>
-            <p14:sldId id="291"/>
-            <p14:sldId id="290"/>
+            <p14:sldId id="313"/>
+            <p14:sldId id="294"/>
+            <p14:sldId id="295"/>
+            <p14:sldId id="293"/>
+            <p14:sldId id="296"/>
+            <p14:sldId id="297"/>
+            <p14:sldId id="298"/>
+            <p14:sldId id="314"/>
+            <p14:sldId id="311"/>
+            <p14:sldId id="312"/>
+          </p14:sldIdLst>
+        </p14:section>
+        <p14:section name="Recommend Next Steps" id="{16643B89-490A-40A5-AA18-871C7A901F60}">
+          <p14:sldIdLst>
+            <p14:sldId id="302"/>
+          </p14:sldIdLst>
+        </p14:section>
+        <p14:section name="Dataset Analyzed" id="{B66FD79B-9D7B-4B7B-B0EA-D5AC4DD96C72}">
+          <p14:sldIdLst>
+            <p14:sldId id="299"/>
+            <p14:sldId id="305"/>
+            <p14:sldId id="306"/>
+            <p14:sldId id="301"/>
+          </p14:sldIdLst>
+        </p14:section>
+        <p14:section name="Closing" id="{C756B71F-4A16-4C74-8800-DC17D9CE8EC6}">
+          <p14:sldIdLst>
+            <p14:sldId id="304"/>
+            <p14:sldId id="303"/>
+          </p14:sldIdLst>
+        </p14:section>
+        <p14:section name="Appendix" id="{92D20F5D-082C-47E6-8594-401CF0C2BC6D}">
+          <p14:sldIdLst>
+            <p14:sldId id="307"/>
+            <p14:sldId id="308"/>
+            <p14:sldId id="309"/>
+            <p14:sldId id="310"/>
           </p14:sldIdLst>
         </p14:section>
       </p14:sectionLst>
@@ -278,9 +346,9 @@
           <a:p>
             <a:fld id="{1D1A64AC-4BB9-4336-82F3-6637AF9F1BD5}" type="datetimeFigureOut">
               <a:rPr lang="en-US" smtClean="0"/>
-              <a:t>12/23/2021</a:t>
+              <a:t>12/27/2021</a:t>
             </a:fld>
-            <a:endParaRPr lang="en-US"/>
+            <a:endParaRPr lang="en-US" dirty="0"/>
           </a:p>
         </p:txBody>
       </p:sp>
@@ -305,7 +373,7 @@
           <a:bodyPr/>
           <a:lstStyle/>
           <a:p>
-            <a:endParaRPr lang="en-US"/>
+            <a:endParaRPr lang="en-US" dirty="0"/>
           </a:p>
         </p:txBody>
       </p:sp>
@@ -334,7 +402,7 @@
               <a:rPr lang="en-US" smtClean="0"/>
               <a:t>‹#›</a:t>
             </a:fld>
-            <a:endParaRPr lang="en-US"/>
+            <a:endParaRPr lang="en-US" dirty="0"/>
           </a:p>
         </p:txBody>
       </p:sp>
@@ -476,9 +544,9 @@
           <a:p>
             <a:fld id="{1D1A64AC-4BB9-4336-82F3-6637AF9F1BD5}" type="datetimeFigureOut">
               <a:rPr lang="en-US" smtClean="0"/>
-              <a:t>12/23/2021</a:t>
+              <a:t>12/27/2021</a:t>
             </a:fld>
-            <a:endParaRPr lang="en-US"/>
+            <a:endParaRPr lang="en-US" dirty="0"/>
           </a:p>
         </p:txBody>
       </p:sp>
@@ -503,7 +571,7 @@
           <a:bodyPr/>
           <a:lstStyle/>
           <a:p>
-            <a:endParaRPr lang="en-US"/>
+            <a:endParaRPr lang="en-US" dirty="0"/>
           </a:p>
         </p:txBody>
       </p:sp>
@@ -532,7 +600,7 @@
               <a:rPr lang="en-US" smtClean="0"/>
               <a:t>‹#›</a:t>
             </a:fld>
-            <a:endParaRPr lang="en-US"/>
+            <a:endParaRPr lang="en-US" dirty="0"/>
           </a:p>
         </p:txBody>
       </p:sp>
@@ -684,9 +752,9 @@
           <a:p>
             <a:fld id="{1D1A64AC-4BB9-4336-82F3-6637AF9F1BD5}" type="datetimeFigureOut">
               <a:rPr lang="en-US" smtClean="0"/>
-              <a:t>12/23/2021</a:t>
+              <a:t>12/27/2021</a:t>
             </a:fld>
-            <a:endParaRPr lang="en-US"/>
+            <a:endParaRPr lang="en-US" dirty="0"/>
           </a:p>
         </p:txBody>
       </p:sp>
@@ -711,7 +779,7 @@
           <a:bodyPr/>
           <a:lstStyle/>
           <a:p>
-            <a:endParaRPr lang="en-US"/>
+            <a:endParaRPr lang="en-US" dirty="0"/>
           </a:p>
         </p:txBody>
       </p:sp>
@@ -740,7 +808,7 @@
               <a:rPr lang="en-US" smtClean="0"/>
               <a:t>‹#›</a:t>
             </a:fld>
-            <a:endParaRPr lang="en-US"/>
+            <a:endParaRPr lang="en-US" dirty="0"/>
           </a:p>
         </p:txBody>
       </p:sp>
@@ -916,9 +984,9 @@
           <a:p>
             <a:fld id="{1D1A64AC-4BB9-4336-82F3-6637AF9F1BD5}" type="datetimeFigureOut">
               <a:rPr lang="en-US" smtClean="0"/>
-              <a:t>12/23/2021</a:t>
+              <a:t>12/27/2021</a:t>
             </a:fld>
-            <a:endParaRPr lang="en-US"/>
+            <a:endParaRPr lang="en-US" dirty="0"/>
           </a:p>
         </p:txBody>
       </p:sp>
@@ -943,7 +1011,7 @@
           <a:bodyPr/>
           <a:lstStyle/>
           <a:p>
-            <a:endParaRPr lang="en-US"/>
+            <a:endParaRPr lang="en-US" dirty="0"/>
           </a:p>
         </p:txBody>
       </p:sp>
@@ -972,7 +1040,7 @@
               <a:rPr lang="en-US" smtClean="0"/>
               <a:t>‹#›</a:t>
             </a:fld>
-            <a:endParaRPr lang="en-US"/>
+            <a:endParaRPr lang="en-US" dirty="0"/>
           </a:p>
         </p:txBody>
       </p:sp>
@@ -1191,9 +1259,9 @@
           <a:p>
             <a:fld id="{1D1A64AC-4BB9-4336-82F3-6637AF9F1BD5}" type="datetimeFigureOut">
               <a:rPr lang="en-US" smtClean="0"/>
-              <a:t>12/23/2021</a:t>
+              <a:t>12/27/2021</a:t>
             </a:fld>
-            <a:endParaRPr lang="en-US"/>
+            <a:endParaRPr lang="en-US" dirty="0"/>
           </a:p>
         </p:txBody>
       </p:sp>
@@ -1218,7 +1286,7 @@
           <a:bodyPr/>
           <a:lstStyle/>
           <a:p>
-            <a:endParaRPr lang="en-US"/>
+            <a:endParaRPr lang="en-US" dirty="0"/>
           </a:p>
         </p:txBody>
       </p:sp>
@@ -1247,7 +1315,7 @@
               <a:rPr lang="en-US" smtClean="0"/>
               <a:t>‹#›</a:t>
             </a:fld>
-            <a:endParaRPr lang="en-US"/>
+            <a:endParaRPr lang="en-US" dirty="0"/>
           </a:p>
         </p:txBody>
       </p:sp>
@@ -1456,9 +1524,9 @@
           <a:p>
             <a:fld id="{1D1A64AC-4BB9-4336-82F3-6637AF9F1BD5}" type="datetimeFigureOut">
               <a:rPr lang="en-US" smtClean="0"/>
-              <a:t>12/23/2021</a:t>
+              <a:t>12/27/2021</a:t>
             </a:fld>
-            <a:endParaRPr lang="en-US"/>
+            <a:endParaRPr lang="en-US" dirty="0"/>
           </a:p>
         </p:txBody>
       </p:sp>
@@ -1483,7 +1551,7 @@
           <a:bodyPr/>
           <a:lstStyle/>
           <a:p>
-            <a:endParaRPr lang="en-US"/>
+            <a:endParaRPr lang="en-US" dirty="0"/>
           </a:p>
         </p:txBody>
       </p:sp>
@@ -1512,7 +1580,7 @@
               <a:rPr lang="en-US" smtClean="0"/>
               <a:t>‹#›</a:t>
             </a:fld>
-            <a:endParaRPr lang="en-US"/>
+            <a:endParaRPr lang="en-US" dirty="0"/>
           </a:p>
         </p:txBody>
       </p:sp>
@@ -1868,9 +1936,9 @@
           <a:p>
             <a:fld id="{1D1A64AC-4BB9-4336-82F3-6637AF9F1BD5}" type="datetimeFigureOut">
               <a:rPr lang="en-US" smtClean="0"/>
-              <a:t>12/23/2021</a:t>
+              <a:t>12/27/2021</a:t>
             </a:fld>
-            <a:endParaRPr lang="en-US"/>
+            <a:endParaRPr lang="en-US" dirty="0"/>
           </a:p>
         </p:txBody>
       </p:sp>
@@ -1895,7 +1963,7 @@
           <a:bodyPr/>
           <a:lstStyle/>
           <a:p>
-            <a:endParaRPr lang="en-US"/>
+            <a:endParaRPr lang="en-US" dirty="0"/>
           </a:p>
         </p:txBody>
       </p:sp>
@@ -1924,7 +1992,7 @@
               <a:rPr lang="en-US" smtClean="0"/>
               <a:t>‹#›</a:t>
             </a:fld>
-            <a:endParaRPr lang="en-US"/>
+            <a:endParaRPr lang="en-US" dirty="0"/>
           </a:p>
         </p:txBody>
       </p:sp>
@@ -2009,9 +2077,9 @@
           <a:p>
             <a:fld id="{1D1A64AC-4BB9-4336-82F3-6637AF9F1BD5}" type="datetimeFigureOut">
               <a:rPr lang="en-US" smtClean="0"/>
-              <a:t>12/23/2021</a:t>
+              <a:t>12/27/2021</a:t>
             </a:fld>
-            <a:endParaRPr lang="en-US"/>
+            <a:endParaRPr lang="en-US" dirty="0"/>
           </a:p>
         </p:txBody>
       </p:sp>
@@ -2036,7 +2104,7 @@
           <a:bodyPr/>
           <a:lstStyle/>
           <a:p>
-            <a:endParaRPr lang="en-US"/>
+            <a:endParaRPr lang="en-US" dirty="0"/>
           </a:p>
         </p:txBody>
       </p:sp>
@@ -2065,7 +2133,7 @@
               <a:rPr lang="en-US" smtClean="0"/>
               <a:t>‹#›</a:t>
             </a:fld>
-            <a:endParaRPr lang="en-US"/>
+            <a:endParaRPr lang="en-US" dirty="0"/>
           </a:p>
         </p:txBody>
       </p:sp>
@@ -2122,9 +2190,9 @@
           <a:p>
             <a:fld id="{1D1A64AC-4BB9-4336-82F3-6637AF9F1BD5}" type="datetimeFigureOut">
               <a:rPr lang="en-US" smtClean="0"/>
-              <a:t>12/23/2021</a:t>
+              <a:t>12/27/2021</a:t>
             </a:fld>
-            <a:endParaRPr lang="en-US"/>
+            <a:endParaRPr lang="en-US" dirty="0"/>
           </a:p>
         </p:txBody>
       </p:sp>
@@ -2149,7 +2217,7 @@
           <a:bodyPr/>
           <a:lstStyle/>
           <a:p>
-            <a:endParaRPr lang="en-US"/>
+            <a:endParaRPr lang="en-US" dirty="0"/>
           </a:p>
         </p:txBody>
       </p:sp>
@@ -2178,7 +2246,7 @@
               <a:rPr lang="en-US" smtClean="0"/>
               <a:t>‹#›</a:t>
             </a:fld>
-            <a:endParaRPr lang="en-US"/>
+            <a:endParaRPr lang="en-US" dirty="0"/>
           </a:p>
         </p:txBody>
       </p:sp>
@@ -2433,9 +2501,9 @@
           <a:p>
             <a:fld id="{1D1A64AC-4BB9-4336-82F3-6637AF9F1BD5}" type="datetimeFigureOut">
               <a:rPr lang="en-US" smtClean="0"/>
-              <a:t>12/23/2021</a:t>
+              <a:t>12/27/2021</a:t>
             </a:fld>
-            <a:endParaRPr lang="en-US"/>
+            <a:endParaRPr lang="en-US" dirty="0"/>
           </a:p>
         </p:txBody>
       </p:sp>
@@ -2460,7 +2528,7 @@
           <a:bodyPr/>
           <a:lstStyle/>
           <a:p>
-            <a:endParaRPr lang="en-US"/>
+            <a:endParaRPr lang="en-US" dirty="0"/>
           </a:p>
         </p:txBody>
       </p:sp>
@@ -2489,7 +2557,7 @@
               <a:rPr lang="en-US" smtClean="0"/>
               <a:t>‹#›</a:t>
             </a:fld>
-            <a:endParaRPr lang="en-US"/>
+            <a:endParaRPr lang="en-US" dirty="0"/>
           </a:p>
         </p:txBody>
       </p:sp>
@@ -2623,7 +2691,7 @@
             </a:lvl9pPr>
           </a:lstStyle>
           <a:p>
-            <a:endParaRPr lang="en-US"/>
+            <a:endParaRPr lang="en-US" dirty="0"/>
           </a:p>
         </p:txBody>
       </p:sp>
@@ -2721,9 +2789,9 @@
           <a:p>
             <a:fld id="{1D1A64AC-4BB9-4336-82F3-6637AF9F1BD5}" type="datetimeFigureOut">
               <a:rPr lang="en-US" smtClean="0"/>
-              <a:t>12/23/2021</a:t>
+              <a:t>12/27/2021</a:t>
             </a:fld>
-            <a:endParaRPr lang="en-US"/>
+            <a:endParaRPr lang="en-US" dirty="0"/>
           </a:p>
         </p:txBody>
       </p:sp>
@@ -2748,7 +2816,7 @@
           <a:bodyPr/>
           <a:lstStyle/>
           <a:p>
-            <a:endParaRPr lang="en-US"/>
+            <a:endParaRPr lang="en-US" dirty="0"/>
           </a:p>
         </p:txBody>
       </p:sp>
@@ -2777,7 +2845,7 @@
               <a:rPr lang="en-US" smtClean="0"/>
               <a:t>‹#›</a:t>
             </a:fld>
-            <a:endParaRPr lang="en-US"/>
+            <a:endParaRPr lang="en-US" dirty="0"/>
           </a:p>
         </p:txBody>
       </p:sp>
@@ -2962,9 +3030,9 @@
           <a:p>
             <a:fld id="{1D1A64AC-4BB9-4336-82F3-6637AF9F1BD5}" type="datetimeFigureOut">
               <a:rPr lang="en-US" smtClean="0"/>
-              <a:t>12/23/2021</a:t>
+              <a:t>12/27/2021</a:t>
             </a:fld>
-            <a:endParaRPr lang="en-US"/>
+            <a:endParaRPr lang="en-US" dirty="0"/>
           </a:p>
         </p:txBody>
       </p:sp>
@@ -3007,7 +3075,7 @@
             </a:lvl1pPr>
           </a:lstStyle>
           <a:p>
-            <a:endParaRPr lang="en-US"/>
+            <a:endParaRPr lang="en-US" dirty="0"/>
           </a:p>
         </p:txBody>
       </p:sp>
@@ -3054,7 +3122,7 @@
               <a:rPr lang="en-US" smtClean="0"/>
               <a:t>‹#›</a:t>
             </a:fld>
-            <a:endParaRPr lang="en-US"/>
+            <a:endParaRPr lang="en-US" dirty="0"/>
           </a:p>
         </p:txBody>
       </p:sp>
@@ -3492,6 +3560,20 @@
               </a:rPr>
               <a:t>School District Testing Analysis</a:t>
             </a:r>
+            <a:br>
+              <a:rPr lang="en-US" dirty="0">
+                <a:latin typeface="Red Hat Display"/>
+              </a:rPr>
+            </a:br>
+            <a:r>
+              <a:rPr lang="en-US" sz="2000" dirty="0">
+                <a:latin typeface="Red Hat Display"/>
+              </a:rPr>
+              <a:t>(Mock dataset)</a:t>
+            </a:r>
+            <a:endParaRPr lang="en-US" dirty="0">
+              <a:latin typeface="Red Hat Display"/>
+            </a:endParaRPr>
           </a:p>
         </p:txBody>
       </p:sp>
@@ -3535,7 +3617,7 @@
               <a:rPr lang="en-US" sz="2800" dirty="0">
                 <a:latin typeface="Red Hat Display"/>
               </a:rPr>
-              <a:t>Hybrid Data Analyst</a:t>
+              <a:t>Hybrid Analyst</a:t>
             </a:r>
           </a:p>
           <a:p>
@@ -3543,6 +3625,16 @@
               <a:latin typeface="Red Hat Display"/>
             </a:endParaRPr>
           </a:p>
+          <a:p>
+            <a:endParaRPr lang="en-US" sz="2800" dirty="0">
+              <a:latin typeface="Red Hat Display"/>
+            </a:endParaRPr>
+          </a:p>
+          <a:p>
+            <a:endParaRPr lang="en-US" sz="2800" dirty="0">
+              <a:latin typeface="Red Hat Display"/>
+            </a:endParaRPr>
+          </a:p>
         </p:txBody>
       </p:sp>
       <p:sp>
@@ -3559,7 +3651,7 @@
         </p:nvSpPr>
         <p:spPr>
           <a:xfrm>
-            <a:off x="279918" y="6400800"/>
+            <a:off x="1" y="6121531"/>
             <a:ext cx="7420707" cy="523220"/>
           </a:xfrm>
           <a:prstGeom prst="rect">
@@ -3637,7 +3729,7 @@
 </p:sld>
 </file>
 
-<file path=ppt/slides/slide2.xml><?xml version="1.0" encoding="utf-8"?>
+<file path=ppt/slides/slide10.xml><?xml version="1.0" encoding="utf-8"?>
 <p:sld xmlns:a="http://schemas.openxmlformats.org/drawingml/2006/main" xmlns:r="http://schemas.openxmlformats.org/officeDocument/2006/relationships" xmlns:p="http://schemas.openxmlformats.org/presentationml/2006/main">
   <p:cSld>
     <p:bg>
@@ -3712,8 +3804,13 @@
           <a:p>
             <a:r>
               <a:rPr lang="en-US" dirty="0"/>
-              <a:t>Overview</a:t>
-            </a:r>
+              <a:t>District results – 86</a:t>
+            </a:r>
+            <a:r>
+              <a:rPr lang="en-US" sz="4400" dirty="0"/>
+              <a:t>% passing reading</a:t>
+            </a:r>
+            <a:endParaRPr lang="en-US" dirty="0"/>
           </a:p>
         </p:txBody>
       </p:sp>
@@ -3742,36 +3839,48 @@
           <a:p>
             <a:r>
               <a:rPr lang="en-US" sz="3600" dirty="0"/>
-              <a:t>Success metrics</a:t>
+              <a:t>Charter average – 97%, Traditional average – 81%</a:t>
             </a:r>
           </a:p>
           <a:p>
             <a:endParaRPr lang="en-US" sz="3600" dirty="0"/>
           </a:p>
-          <a:p>
-            <a:r>
-              <a:rPr lang="en-US" sz="3600" dirty="0"/>
-              <a:t>Recommended next steps</a:t>
-            </a:r>
-          </a:p>
-          <a:p>
-            <a:endParaRPr lang="en-US" sz="3600" dirty="0"/>
-          </a:p>
-          <a:p>
-            <a:r>
-              <a:rPr lang="en-US" sz="3600" dirty="0"/>
-              <a:t>Dataset analyzed</a:t>
-            </a:r>
-          </a:p>
-          <a:p>
-            <a:endParaRPr lang="en-US" sz="3600" dirty="0"/>
-          </a:p>
-        </p:txBody>
-      </p:sp>
+        </p:txBody>
+      </p:sp>
+      <p:pic>
+        <p:nvPicPr>
+          <p:cNvPr id="5" name="Picture 4">
+            <a:extLst>
+              <a:ext uri="{FF2B5EF4-FFF2-40B4-BE49-F238E27FC236}">
+                <a16:creationId xmlns:a16="http://schemas.microsoft.com/office/drawing/2014/main" id="{96477CBF-4B5C-4F43-9081-842801B62B31}"/>
+              </a:ext>
+            </a:extLst>
+          </p:cNvPr>
+          <p:cNvPicPr>
+            <a:picLocks noChangeAspect="1"/>
+          </p:cNvPicPr>
+          <p:nvPr/>
+        </p:nvPicPr>
+        <p:blipFill>
+          <a:blip r:embed="rId2"/>
+          <a:stretch>
+            <a:fillRect/>
+          </a:stretch>
+        </p:blipFill>
+        <p:spPr>
+          <a:xfrm>
+            <a:off x="838200" y="2424112"/>
+            <a:ext cx="10515600" cy="3991471"/>
+          </a:xfrm>
+          <a:prstGeom prst="rect">
+            <a:avLst/>
+          </a:prstGeom>
+        </p:spPr>
+      </p:pic>
     </p:spTree>
     <p:extLst>
       <p:ext uri="{BB962C8B-B14F-4D97-AF65-F5344CB8AC3E}">
-        <p14:creationId xmlns:p14="http://schemas.microsoft.com/office/powerpoint/2010/main" val="1542692981"/>
+        <p14:creationId xmlns:p14="http://schemas.microsoft.com/office/powerpoint/2010/main" val="1741339701"/>
       </p:ext>
     </p:extLst>
   </p:cSld>
@@ -3781,7 +3890,7 @@
 </p:sld>
 </file>
 
-<file path=ppt/slides/slide3.xml><?xml version="1.0" encoding="utf-8"?>
+<file path=ppt/slides/slide11.xml><?xml version="1.0" encoding="utf-8"?>
 <p:sld xmlns:a="http://schemas.openxmlformats.org/drawingml/2006/main" xmlns:r="http://schemas.openxmlformats.org/officeDocument/2006/relationships" xmlns:p="http://schemas.openxmlformats.org/presentationml/2006/main">
   <p:cSld>
     <p:bg>
@@ -3856,8 +3965,13 @@
           <a:p>
             <a:r>
               <a:rPr lang="en-US" dirty="0"/>
-              <a:t>Success Metrics</a:t>
-            </a:r>
+              <a:t>District results – 65</a:t>
+            </a:r>
+            <a:r>
+              <a:rPr lang="en-US" sz="4400" dirty="0"/>
+              <a:t>% passing both</a:t>
+            </a:r>
+            <a:endParaRPr lang="en-US" dirty="0"/>
           </a:p>
         </p:txBody>
       </p:sp>
@@ -3886,42 +4000,48 @@
           <a:p>
             <a:r>
               <a:rPr lang="en-US" sz="3600" dirty="0"/>
-              <a:t>Average math score</a:t>
-            </a:r>
-          </a:p>
-          <a:p>
-            <a:r>
-              <a:rPr lang="en-US" sz="3600" dirty="0"/>
-              <a:t>Average reading score</a:t>
+              <a:t>Charter average – 90%, Traditional average – 54%</a:t>
             </a:r>
           </a:p>
           <a:p>
             <a:endParaRPr lang="en-US" sz="3600" dirty="0"/>
           </a:p>
-          <a:p>
-            <a:r>
-              <a:rPr lang="en-US" sz="3600" dirty="0"/>
-              <a:t>% passing math (≥ 70%)</a:t>
-            </a:r>
-          </a:p>
-          <a:p>
-            <a:r>
-              <a:rPr lang="en-US" sz="3600" dirty="0"/>
-              <a:t>% passing reading (≥ 70%)</a:t>
-            </a:r>
-          </a:p>
-          <a:p>
-            <a:r>
-              <a:rPr lang="en-US" sz="3600" dirty="0"/>
-              <a:t>% passing both</a:t>
-            </a:r>
-          </a:p>
-        </p:txBody>
-      </p:sp>
+        </p:txBody>
+      </p:sp>
+      <p:pic>
+        <p:nvPicPr>
+          <p:cNvPr id="6" name="Picture 5">
+            <a:extLst>
+              <a:ext uri="{FF2B5EF4-FFF2-40B4-BE49-F238E27FC236}">
+                <a16:creationId xmlns:a16="http://schemas.microsoft.com/office/drawing/2014/main" id="{0D45854D-3570-4256-996D-836EBEF12304}"/>
+              </a:ext>
+            </a:extLst>
+          </p:cNvPr>
+          <p:cNvPicPr>
+            <a:picLocks noChangeAspect="1"/>
+          </p:cNvPicPr>
+          <p:nvPr/>
+        </p:nvPicPr>
+        <p:blipFill>
+          <a:blip r:embed="rId2"/>
+          <a:stretch>
+            <a:fillRect/>
+          </a:stretch>
+        </p:blipFill>
+        <p:spPr>
+          <a:xfrm>
+            <a:off x="838200" y="2349013"/>
+            <a:ext cx="10616082" cy="4143862"/>
+          </a:xfrm>
+          <a:prstGeom prst="rect">
+            <a:avLst/>
+          </a:prstGeom>
+        </p:spPr>
+      </p:pic>
     </p:spTree>
     <p:extLst>
       <p:ext uri="{BB962C8B-B14F-4D97-AF65-F5344CB8AC3E}">
-        <p14:creationId xmlns:p14="http://schemas.microsoft.com/office/powerpoint/2010/main" val="2188416658"/>
+        <p14:creationId xmlns:p14="http://schemas.microsoft.com/office/powerpoint/2010/main" val="224781677"/>
       </p:ext>
     </p:extLst>
   </p:cSld>
@@ -3931,7 +4051,163 @@
 </p:sld>
 </file>
 
-<file path=ppt/slides/slide4.xml><?xml version="1.0" encoding="utf-8"?>
+<file path=ppt/slides/slide12.xml><?xml version="1.0" encoding="utf-8"?>
+<p:sld xmlns:a="http://schemas.openxmlformats.org/drawingml/2006/main" xmlns:r="http://schemas.openxmlformats.org/officeDocument/2006/relationships" xmlns:p="http://schemas.openxmlformats.org/presentationml/2006/main">
+  <p:cSld>
+    <p:bg>
+      <p:bgPr>
+        <a:gradFill flip="none" rotWithShape="1">
+          <a:gsLst>
+            <a:gs pos="0">
+              <a:schemeClr val="accent1">
+                <a:lumMod val="5000"/>
+                <a:lumOff val="95000"/>
+              </a:schemeClr>
+            </a:gs>
+            <a:gs pos="74000">
+              <a:schemeClr val="accent1">
+                <a:lumMod val="45000"/>
+                <a:lumOff val="55000"/>
+              </a:schemeClr>
+            </a:gs>
+            <a:gs pos="83000">
+              <a:schemeClr val="accent1">
+                <a:lumMod val="45000"/>
+                <a:lumOff val="55000"/>
+              </a:schemeClr>
+            </a:gs>
+            <a:gs pos="100000">
+              <a:schemeClr val="accent1">
+                <a:lumMod val="30000"/>
+                <a:lumOff val="70000"/>
+              </a:schemeClr>
+            </a:gs>
+          </a:gsLst>
+          <a:lin ang="5400000" scaled="1"/>
+          <a:tileRect/>
+        </a:gradFill>
+        <a:effectLst/>
+      </p:bgPr>
+    </p:bg>
+    <p:spTree>
+      <p:nvGrpSpPr>
+        <p:cNvPr id="1" name=""/>
+        <p:cNvGrpSpPr/>
+        <p:nvPr/>
+      </p:nvGrpSpPr>
+      <p:grpSpPr>
+        <a:xfrm>
+          <a:off x="0" y="0"/>
+          <a:ext cx="0" cy="0"/>
+          <a:chOff x="0" y="0"/>
+          <a:chExt cx="0" cy="0"/>
+        </a:xfrm>
+      </p:grpSpPr>
+      <p:sp>
+        <p:nvSpPr>
+          <p:cNvPr id="2" name="Title 1">
+            <a:extLst>
+              <a:ext uri="{FF2B5EF4-FFF2-40B4-BE49-F238E27FC236}">
+                <a16:creationId xmlns:a16="http://schemas.microsoft.com/office/drawing/2014/main" id="{3EFB1119-6DAB-476F-9541-ABA9503B44FF}"/>
+              </a:ext>
+            </a:extLst>
+          </p:cNvPr>
+          <p:cNvSpPr>
+            <a:spLocks noGrp="1"/>
+          </p:cNvSpPr>
+          <p:nvPr>
+            <p:ph type="title"/>
+          </p:nvPr>
+        </p:nvSpPr>
+        <p:spPr/>
+        <p:txBody>
+          <a:bodyPr/>
+          <a:lstStyle/>
+          <a:p>
+            <a:r>
+              <a:rPr lang="en-US" dirty="0"/>
+              <a:t>Average budget - $629 per student</a:t>
+            </a:r>
+          </a:p>
+        </p:txBody>
+      </p:sp>
+      <p:sp>
+        <p:nvSpPr>
+          <p:cNvPr id="3" name="Content Placeholder 2">
+            <a:extLst>
+              <a:ext uri="{FF2B5EF4-FFF2-40B4-BE49-F238E27FC236}">
+                <a16:creationId xmlns:a16="http://schemas.microsoft.com/office/drawing/2014/main" id="{304380FF-F4C6-46D9-95C8-F4A1742EB433}"/>
+              </a:ext>
+            </a:extLst>
+          </p:cNvPr>
+          <p:cNvSpPr>
+            <a:spLocks noGrp="1"/>
+          </p:cNvSpPr>
+          <p:nvPr>
+            <p:ph idx="1"/>
+          </p:nvPr>
+        </p:nvSpPr>
+        <p:spPr/>
+        <p:txBody>
+          <a:bodyPr>
+            <a:normAutofit/>
+          </a:bodyPr>
+          <a:lstStyle/>
+          <a:p>
+            <a:r>
+              <a:rPr lang="en-US" sz="3600" dirty="0"/>
+              <a:t>Charter average – $599, Traditional average – $643</a:t>
+            </a:r>
+          </a:p>
+          <a:p>
+            <a:endParaRPr lang="en-US" sz="3600" dirty="0"/>
+          </a:p>
+        </p:txBody>
+      </p:sp>
+      <p:pic>
+        <p:nvPicPr>
+          <p:cNvPr id="8" name="Picture 7">
+            <a:extLst>
+              <a:ext uri="{FF2B5EF4-FFF2-40B4-BE49-F238E27FC236}">
+                <a16:creationId xmlns:a16="http://schemas.microsoft.com/office/drawing/2014/main" id="{086254F8-B866-47B5-B6DE-E185E8A89986}"/>
+              </a:ext>
+            </a:extLst>
+          </p:cNvPr>
+          <p:cNvPicPr>
+            <a:picLocks noChangeAspect="1"/>
+          </p:cNvPicPr>
+          <p:nvPr/>
+        </p:nvPicPr>
+        <p:blipFill>
+          <a:blip r:embed="rId2"/>
+          <a:stretch>
+            <a:fillRect/>
+          </a:stretch>
+        </p:blipFill>
+        <p:spPr>
+          <a:xfrm>
+            <a:off x="838200" y="2338388"/>
+            <a:ext cx="10669712" cy="4154487"/>
+          </a:xfrm>
+          <a:prstGeom prst="rect">
+            <a:avLst/>
+          </a:prstGeom>
+        </p:spPr>
+      </p:pic>
+    </p:spTree>
+    <p:extLst>
+      <p:ext uri="{BB962C8B-B14F-4D97-AF65-F5344CB8AC3E}">
+        <p14:creationId xmlns:p14="http://schemas.microsoft.com/office/powerpoint/2010/main" val="4060307267"/>
+      </p:ext>
+    </p:extLst>
+  </p:cSld>
+  <p:clrMapOvr>
+    <a:masterClrMapping/>
+  </p:clrMapOvr>
+</p:sld>
+</file>
+
+<file path=ppt/slides/slide13.xml><?xml version="1.0" encoding="utf-8"?>
 <p:sld xmlns:a="http://schemas.openxmlformats.org/drawingml/2006/main" xmlns:r="http://schemas.openxmlformats.org/officeDocument/2006/relationships" xmlns:p="http://schemas.openxmlformats.org/presentationml/2006/main">
   <p:cSld>
     <p:spTree>
@@ -3953,6 +4229,2347 @@
           <p:cNvPr id="2" name="Title 1">
             <a:extLst>
               <a:ext uri="{FF2B5EF4-FFF2-40B4-BE49-F238E27FC236}">
+                <a16:creationId xmlns:a16="http://schemas.microsoft.com/office/drawing/2014/main" id="{9CC7AC6A-BC0F-4478-8E9C-D5C981FEEF40}"/>
+              </a:ext>
+            </a:extLst>
+          </p:cNvPr>
+          <p:cNvSpPr>
+            <a:spLocks noGrp="1"/>
+          </p:cNvSpPr>
+          <p:nvPr>
+            <p:ph type="title"/>
+          </p:nvPr>
+        </p:nvSpPr>
+        <p:spPr/>
+        <p:txBody>
+          <a:bodyPr/>
+          <a:lstStyle/>
+          <a:p>
+            <a:r>
+              <a:rPr lang="en-US" dirty="0"/>
+              <a:t>Performance by school type</a:t>
+            </a:r>
+          </a:p>
+        </p:txBody>
+      </p:sp>
+      <p:pic>
+        <p:nvPicPr>
+          <p:cNvPr id="7170" name="Picture 2">
+            <a:extLst>
+              <a:ext uri="{FF2B5EF4-FFF2-40B4-BE49-F238E27FC236}">
+                <a16:creationId xmlns:a16="http://schemas.microsoft.com/office/drawing/2014/main" id="{5D1D14E1-8794-49FE-9796-0A9ED12638F7}"/>
+              </a:ext>
+            </a:extLst>
+          </p:cNvPr>
+          <p:cNvPicPr>
+            <a:picLocks noGrp="1" noChangeAspect="1" noChangeArrowheads="1"/>
+          </p:cNvPicPr>
+          <p:nvPr>
+            <p:ph idx="1"/>
+          </p:nvPr>
+        </p:nvPicPr>
+        <p:blipFill>
+          <a:blip r:embed="rId2">
+            <a:extLst>
+              <a:ext uri="{28A0092B-C50C-407E-A947-70E740481C1C}">
+                <a14:useLocalDpi xmlns:a14="http://schemas.microsoft.com/office/drawing/2010/main" val="0"/>
+              </a:ext>
+            </a:extLst>
+          </a:blip>
+          <a:srcRect/>
+          <a:stretch>
+            <a:fillRect/>
+          </a:stretch>
+        </p:blipFill>
+        <p:spPr bwMode="auto">
+          <a:xfrm>
+            <a:off x="838199" y="1690688"/>
+            <a:ext cx="9596495" cy="1562466"/>
+          </a:xfrm>
+          <a:prstGeom prst="rect">
+            <a:avLst/>
+          </a:prstGeom>
+          <a:noFill/>
+          <a:extLst>
+            <a:ext uri="{909E8E84-426E-40DD-AFC4-6F175D3DCCD1}">
+              <a14:hiddenFill xmlns:a14="http://schemas.microsoft.com/office/drawing/2010/main">
+                <a:solidFill>
+                  <a:srgbClr val="FFFFFF"/>
+                </a:solidFill>
+              </a14:hiddenFill>
+            </a:ext>
+          </a:extLst>
+        </p:spPr>
+      </p:pic>
+    </p:spTree>
+    <p:extLst>
+      <p:ext uri="{BB962C8B-B14F-4D97-AF65-F5344CB8AC3E}">
+        <p14:creationId xmlns:p14="http://schemas.microsoft.com/office/powerpoint/2010/main" val="1078528662"/>
+      </p:ext>
+    </p:extLst>
+  </p:cSld>
+  <p:clrMapOvr>
+    <a:masterClrMapping/>
+  </p:clrMapOvr>
+</p:sld>
+</file>
+
+<file path=ppt/slides/slide14.xml><?xml version="1.0" encoding="utf-8"?>
+<p:sld xmlns:a="http://schemas.openxmlformats.org/drawingml/2006/main" xmlns:r="http://schemas.openxmlformats.org/officeDocument/2006/relationships" xmlns:p="http://schemas.openxmlformats.org/presentationml/2006/main">
+  <p:cSld>
+    <p:spTree>
+      <p:nvGrpSpPr>
+        <p:cNvPr id="1" name=""/>
+        <p:cNvGrpSpPr/>
+        <p:nvPr/>
+      </p:nvGrpSpPr>
+      <p:grpSpPr>
+        <a:xfrm>
+          <a:off x="0" y="0"/>
+          <a:ext cx="0" cy="0"/>
+          <a:chOff x="0" y="0"/>
+          <a:chExt cx="0" cy="0"/>
+        </a:xfrm>
+      </p:grpSpPr>
+      <p:sp>
+        <p:nvSpPr>
+          <p:cNvPr id="2" name="Title 1">
+            <a:extLst>
+              <a:ext uri="{FF2B5EF4-FFF2-40B4-BE49-F238E27FC236}">
+                <a16:creationId xmlns:a16="http://schemas.microsoft.com/office/drawing/2014/main" id="{9CC7AC6A-BC0F-4478-8E9C-D5C981FEEF40}"/>
+              </a:ext>
+            </a:extLst>
+          </p:cNvPr>
+          <p:cNvSpPr>
+            <a:spLocks noGrp="1"/>
+          </p:cNvSpPr>
+          <p:nvPr>
+            <p:ph type="title"/>
+          </p:nvPr>
+        </p:nvSpPr>
+        <p:spPr/>
+        <p:txBody>
+          <a:bodyPr/>
+          <a:lstStyle/>
+          <a:p>
+            <a:r>
+              <a:rPr lang="en-US" dirty="0"/>
+              <a:t>Performance by school spending</a:t>
+            </a:r>
+          </a:p>
+        </p:txBody>
+      </p:sp>
+      <p:pic>
+        <p:nvPicPr>
+          <p:cNvPr id="5122" name="Picture 2" descr="Scores_by_student_spending_original">
+            <a:extLst>
+              <a:ext uri="{FF2B5EF4-FFF2-40B4-BE49-F238E27FC236}">
+                <a16:creationId xmlns:a16="http://schemas.microsoft.com/office/drawing/2014/main" id="{DFA3E6FB-DE88-4AE0-9A8D-4A76E719CA9B}"/>
+              </a:ext>
+            </a:extLst>
+          </p:cNvPr>
+          <p:cNvPicPr>
+            <a:picLocks noGrp="1" noChangeAspect="1" noChangeArrowheads="1"/>
+          </p:cNvPicPr>
+          <p:nvPr>
+            <p:ph idx="1"/>
+          </p:nvPr>
+        </p:nvPicPr>
+        <p:blipFill>
+          <a:blip r:embed="rId2">
+            <a:extLst>
+              <a:ext uri="{28A0092B-C50C-407E-A947-70E740481C1C}">
+                <a14:useLocalDpi xmlns:a14="http://schemas.microsoft.com/office/drawing/2010/main" val="0"/>
+              </a:ext>
+            </a:extLst>
+          </a:blip>
+          <a:srcRect/>
+          <a:stretch>
+            <a:fillRect/>
+          </a:stretch>
+        </p:blipFill>
+        <p:spPr bwMode="auto">
+          <a:xfrm>
+            <a:off x="838200" y="1690688"/>
+            <a:ext cx="9929160" cy="1931743"/>
+          </a:xfrm>
+          <a:prstGeom prst="rect">
+            <a:avLst/>
+          </a:prstGeom>
+          <a:noFill/>
+          <a:extLst>
+            <a:ext uri="{909E8E84-426E-40DD-AFC4-6F175D3DCCD1}">
+              <a14:hiddenFill xmlns:a14="http://schemas.microsoft.com/office/drawing/2010/main">
+                <a:solidFill>
+                  <a:srgbClr val="FFFFFF"/>
+                </a:solidFill>
+              </a14:hiddenFill>
+            </a:ext>
+          </a:extLst>
+        </p:spPr>
+      </p:pic>
+    </p:spTree>
+    <p:extLst>
+      <p:ext uri="{BB962C8B-B14F-4D97-AF65-F5344CB8AC3E}">
+        <p14:creationId xmlns:p14="http://schemas.microsoft.com/office/powerpoint/2010/main" val="1394594586"/>
+      </p:ext>
+    </p:extLst>
+  </p:cSld>
+  <p:clrMapOvr>
+    <a:masterClrMapping/>
+  </p:clrMapOvr>
+</p:sld>
+</file>
+
+<file path=ppt/slides/slide15.xml><?xml version="1.0" encoding="utf-8"?>
+<p:sld xmlns:a="http://schemas.openxmlformats.org/drawingml/2006/main" xmlns:r="http://schemas.openxmlformats.org/officeDocument/2006/relationships" xmlns:p="http://schemas.openxmlformats.org/presentationml/2006/main">
+  <p:cSld>
+    <p:spTree>
+      <p:nvGrpSpPr>
+        <p:cNvPr id="1" name=""/>
+        <p:cNvGrpSpPr/>
+        <p:nvPr/>
+      </p:nvGrpSpPr>
+      <p:grpSpPr>
+        <a:xfrm>
+          <a:off x="0" y="0"/>
+          <a:ext cx="0" cy="0"/>
+          <a:chOff x="0" y="0"/>
+          <a:chExt cx="0" cy="0"/>
+        </a:xfrm>
+      </p:grpSpPr>
+      <p:sp>
+        <p:nvSpPr>
+          <p:cNvPr id="2" name="Title 1">
+            <a:extLst>
+              <a:ext uri="{FF2B5EF4-FFF2-40B4-BE49-F238E27FC236}">
+                <a16:creationId xmlns:a16="http://schemas.microsoft.com/office/drawing/2014/main" id="{9CC7AC6A-BC0F-4478-8E9C-D5C981FEEF40}"/>
+              </a:ext>
+            </a:extLst>
+          </p:cNvPr>
+          <p:cNvSpPr>
+            <a:spLocks noGrp="1"/>
+          </p:cNvSpPr>
+          <p:nvPr>
+            <p:ph type="title"/>
+          </p:nvPr>
+        </p:nvSpPr>
+        <p:spPr/>
+        <p:txBody>
+          <a:bodyPr/>
+          <a:lstStyle/>
+          <a:p>
+            <a:r>
+              <a:rPr lang="en-US" dirty="0"/>
+              <a:t>Performance by school size</a:t>
+            </a:r>
+          </a:p>
+        </p:txBody>
+      </p:sp>
+      <p:pic>
+        <p:nvPicPr>
+          <p:cNvPr id="6146" name="Picture 2" descr="Scores_by_school_size_original">
+            <a:extLst>
+              <a:ext uri="{FF2B5EF4-FFF2-40B4-BE49-F238E27FC236}">
+                <a16:creationId xmlns:a16="http://schemas.microsoft.com/office/drawing/2014/main" id="{5BF5FB9F-CC5D-45AE-8332-16117D414853}"/>
+              </a:ext>
+            </a:extLst>
+          </p:cNvPr>
+          <p:cNvPicPr>
+            <a:picLocks noGrp="1" noChangeAspect="1" noChangeArrowheads="1"/>
+          </p:cNvPicPr>
+          <p:nvPr>
+            <p:ph idx="1"/>
+          </p:nvPr>
+        </p:nvPicPr>
+        <p:blipFill>
+          <a:blip r:embed="rId2">
+            <a:extLst>
+              <a:ext uri="{28A0092B-C50C-407E-A947-70E740481C1C}">
+                <a14:useLocalDpi xmlns:a14="http://schemas.microsoft.com/office/drawing/2010/main" val="0"/>
+              </a:ext>
+            </a:extLst>
+          </a:blip>
+          <a:srcRect/>
+          <a:stretch>
+            <a:fillRect/>
+          </a:stretch>
+        </p:blipFill>
+        <p:spPr bwMode="auto">
+          <a:xfrm>
+            <a:off x="838200" y="1690688"/>
+            <a:ext cx="10215653" cy="1878989"/>
+          </a:xfrm>
+          <a:prstGeom prst="rect">
+            <a:avLst/>
+          </a:prstGeom>
+          <a:noFill/>
+          <a:extLst>
+            <a:ext uri="{909E8E84-426E-40DD-AFC4-6F175D3DCCD1}">
+              <a14:hiddenFill xmlns:a14="http://schemas.microsoft.com/office/drawing/2010/main">
+                <a:solidFill>
+                  <a:srgbClr val="FFFFFF"/>
+                </a:solidFill>
+              </a14:hiddenFill>
+            </a:ext>
+          </a:extLst>
+        </p:spPr>
+      </p:pic>
+    </p:spTree>
+    <p:extLst>
+      <p:ext uri="{BB962C8B-B14F-4D97-AF65-F5344CB8AC3E}">
+        <p14:creationId xmlns:p14="http://schemas.microsoft.com/office/powerpoint/2010/main" val="3045326624"/>
+      </p:ext>
+    </p:extLst>
+  </p:cSld>
+  <p:clrMapOvr>
+    <a:masterClrMapping/>
+  </p:clrMapOvr>
+</p:sld>
+</file>
+
+<file path=ppt/slides/slide16.xml><?xml version="1.0" encoding="utf-8"?>
+<p:sld xmlns:a="http://schemas.openxmlformats.org/drawingml/2006/main" xmlns:r="http://schemas.openxmlformats.org/officeDocument/2006/relationships" xmlns:p="http://schemas.openxmlformats.org/presentationml/2006/main">
+  <p:cSld>
+    <p:bg>
+      <p:bgPr>
+        <a:gradFill flip="none" rotWithShape="1">
+          <a:gsLst>
+            <a:gs pos="0">
+              <a:schemeClr val="accent1">
+                <a:lumMod val="5000"/>
+                <a:lumOff val="95000"/>
+              </a:schemeClr>
+            </a:gs>
+            <a:gs pos="74000">
+              <a:schemeClr val="accent1">
+                <a:lumMod val="45000"/>
+                <a:lumOff val="55000"/>
+              </a:schemeClr>
+            </a:gs>
+            <a:gs pos="83000">
+              <a:schemeClr val="accent1">
+                <a:lumMod val="45000"/>
+                <a:lumOff val="55000"/>
+              </a:schemeClr>
+            </a:gs>
+            <a:gs pos="100000">
+              <a:schemeClr val="accent1">
+                <a:lumMod val="30000"/>
+                <a:lumOff val="70000"/>
+              </a:schemeClr>
+            </a:gs>
+          </a:gsLst>
+          <a:lin ang="5400000" scaled="1"/>
+          <a:tileRect/>
+        </a:gradFill>
+        <a:effectLst/>
+      </p:bgPr>
+    </p:bg>
+    <p:spTree>
+      <p:nvGrpSpPr>
+        <p:cNvPr id="1" name=""/>
+        <p:cNvGrpSpPr/>
+        <p:nvPr/>
+      </p:nvGrpSpPr>
+      <p:grpSpPr>
+        <a:xfrm>
+          <a:off x="0" y="0"/>
+          <a:ext cx="0" cy="0"/>
+          <a:chOff x="0" y="0"/>
+          <a:chExt cx="0" cy="0"/>
+        </a:xfrm>
+      </p:grpSpPr>
+      <p:sp>
+        <p:nvSpPr>
+          <p:cNvPr id="2" name="Title 1">
+            <a:extLst>
+              <a:ext uri="{FF2B5EF4-FFF2-40B4-BE49-F238E27FC236}">
+                <a16:creationId xmlns:a16="http://schemas.microsoft.com/office/drawing/2014/main" id="{3EFB1119-6DAB-476F-9541-ABA9503B44FF}"/>
+              </a:ext>
+            </a:extLst>
+          </p:cNvPr>
+          <p:cNvSpPr>
+            <a:spLocks noGrp="1"/>
+          </p:cNvSpPr>
+          <p:nvPr>
+            <p:ph type="title"/>
+          </p:nvPr>
+        </p:nvSpPr>
+        <p:spPr/>
+        <p:txBody>
+          <a:bodyPr/>
+          <a:lstStyle/>
+          <a:p>
+            <a:r>
+              <a:rPr lang="en-US" dirty="0"/>
+              <a:t>Recommended Next Steps</a:t>
+            </a:r>
+          </a:p>
+        </p:txBody>
+      </p:sp>
+      <p:sp>
+        <p:nvSpPr>
+          <p:cNvPr id="3" name="Content Placeholder 2">
+            <a:extLst>
+              <a:ext uri="{FF2B5EF4-FFF2-40B4-BE49-F238E27FC236}">
+                <a16:creationId xmlns:a16="http://schemas.microsoft.com/office/drawing/2014/main" id="{304380FF-F4C6-46D9-95C8-F4A1742EB433}"/>
+              </a:ext>
+            </a:extLst>
+          </p:cNvPr>
+          <p:cNvSpPr>
+            <a:spLocks noGrp="1"/>
+          </p:cNvSpPr>
+          <p:nvPr>
+            <p:ph idx="1"/>
+          </p:nvPr>
+        </p:nvSpPr>
+        <p:spPr/>
+        <p:txBody>
+          <a:bodyPr>
+            <a:normAutofit/>
+          </a:bodyPr>
+          <a:lstStyle/>
+          <a:p>
+            <a:r>
+              <a:rPr lang="en-US" sz="3600" dirty="0"/>
+              <a:t>Regression analysis</a:t>
+            </a:r>
+          </a:p>
+          <a:p>
+            <a:pPr lvl="1"/>
+            <a:r>
+              <a:rPr lang="en-US" sz="2800" dirty="0"/>
+              <a:t>Are differences caused by other variables?</a:t>
+            </a:r>
+          </a:p>
+          <a:p>
+            <a:r>
+              <a:rPr lang="en-US" sz="3600" dirty="0"/>
+              <a:t>Team to study various approaches and make recommendations for future optimizations</a:t>
+            </a:r>
+            <a:endParaRPr lang="en-US" sz="3200" dirty="0"/>
+          </a:p>
+        </p:txBody>
+      </p:sp>
+    </p:spTree>
+    <p:extLst>
+      <p:ext uri="{BB962C8B-B14F-4D97-AF65-F5344CB8AC3E}">
+        <p14:creationId xmlns:p14="http://schemas.microsoft.com/office/powerpoint/2010/main" val="2025277746"/>
+      </p:ext>
+    </p:extLst>
+  </p:cSld>
+  <p:clrMapOvr>
+    <a:masterClrMapping/>
+  </p:clrMapOvr>
+</p:sld>
+</file>
+
+<file path=ppt/slides/slide17.xml><?xml version="1.0" encoding="utf-8"?>
+<p:sld xmlns:a="http://schemas.openxmlformats.org/drawingml/2006/main" xmlns:r="http://schemas.openxmlformats.org/officeDocument/2006/relationships" xmlns:p="http://schemas.openxmlformats.org/presentationml/2006/main">
+  <p:cSld>
+    <p:bg>
+      <p:bgPr>
+        <a:gradFill flip="none" rotWithShape="1">
+          <a:gsLst>
+            <a:gs pos="0">
+              <a:schemeClr val="accent1">
+                <a:lumMod val="5000"/>
+                <a:lumOff val="95000"/>
+              </a:schemeClr>
+            </a:gs>
+            <a:gs pos="74000">
+              <a:schemeClr val="accent1">
+                <a:lumMod val="45000"/>
+                <a:lumOff val="55000"/>
+              </a:schemeClr>
+            </a:gs>
+            <a:gs pos="83000">
+              <a:schemeClr val="accent1">
+                <a:lumMod val="45000"/>
+                <a:lumOff val="55000"/>
+              </a:schemeClr>
+            </a:gs>
+            <a:gs pos="100000">
+              <a:schemeClr val="accent1">
+                <a:lumMod val="30000"/>
+                <a:lumOff val="70000"/>
+              </a:schemeClr>
+            </a:gs>
+          </a:gsLst>
+          <a:lin ang="5400000" scaled="1"/>
+          <a:tileRect/>
+        </a:gradFill>
+        <a:effectLst/>
+      </p:bgPr>
+    </p:bg>
+    <p:spTree>
+      <p:nvGrpSpPr>
+        <p:cNvPr id="1" name=""/>
+        <p:cNvGrpSpPr/>
+        <p:nvPr/>
+      </p:nvGrpSpPr>
+      <p:grpSpPr>
+        <a:xfrm>
+          <a:off x="0" y="0"/>
+          <a:ext cx="0" cy="0"/>
+          <a:chOff x="0" y="0"/>
+          <a:chExt cx="0" cy="0"/>
+        </a:xfrm>
+      </p:grpSpPr>
+      <p:sp>
+        <p:nvSpPr>
+          <p:cNvPr id="2" name="Title 1">
+            <a:extLst>
+              <a:ext uri="{FF2B5EF4-FFF2-40B4-BE49-F238E27FC236}">
+                <a16:creationId xmlns:a16="http://schemas.microsoft.com/office/drawing/2014/main" id="{3EFB1119-6DAB-476F-9541-ABA9503B44FF}"/>
+              </a:ext>
+            </a:extLst>
+          </p:cNvPr>
+          <p:cNvSpPr>
+            <a:spLocks noGrp="1"/>
+          </p:cNvSpPr>
+          <p:nvPr>
+            <p:ph type="title"/>
+          </p:nvPr>
+        </p:nvSpPr>
+        <p:spPr/>
+        <p:txBody>
+          <a:bodyPr/>
+          <a:lstStyle/>
+          <a:p>
+            <a:r>
+              <a:rPr lang="en-US" dirty="0"/>
+              <a:t>Dataset Analyzed</a:t>
+            </a:r>
+          </a:p>
+        </p:txBody>
+      </p:sp>
+      <p:sp>
+        <p:nvSpPr>
+          <p:cNvPr id="3" name="Content Placeholder 2">
+            <a:extLst>
+              <a:ext uri="{FF2B5EF4-FFF2-40B4-BE49-F238E27FC236}">
+                <a16:creationId xmlns:a16="http://schemas.microsoft.com/office/drawing/2014/main" id="{304380FF-F4C6-46D9-95C8-F4A1742EB433}"/>
+              </a:ext>
+            </a:extLst>
+          </p:cNvPr>
+          <p:cNvSpPr>
+            <a:spLocks noGrp="1"/>
+          </p:cNvSpPr>
+          <p:nvPr>
+            <p:ph idx="1"/>
+          </p:nvPr>
+        </p:nvSpPr>
+        <p:spPr/>
+        <p:txBody>
+          <a:bodyPr>
+            <a:normAutofit/>
+          </a:bodyPr>
+          <a:lstStyle/>
+          <a:p>
+            <a:r>
+              <a:rPr lang="en-US" sz="3600" dirty="0"/>
+              <a:t>Student file – 39,170 individual student records</a:t>
+            </a:r>
+          </a:p>
+          <a:p>
+            <a:pPr lvl="1"/>
+            <a:r>
+              <a:rPr lang="en-US" sz="3200" dirty="0"/>
+              <a:t>Student ID</a:t>
+            </a:r>
+          </a:p>
+          <a:p>
+            <a:pPr lvl="1"/>
+            <a:r>
+              <a:rPr lang="en-US" sz="3200" dirty="0"/>
+              <a:t>Name</a:t>
+            </a:r>
+          </a:p>
+          <a:p>
+            <a:pPr lvl="1"/>
+            <a:r>
+              <a:rPr lang="en-US" sz="3200" dirty="0"/>
+              <a:t>Gender</a:t>
+            </a:r>
+          </a:p>
+          <a:p>
+            <a:pPr lvl="1"/>
+            <a:r>
+              <a:rPr lang="en-US" sz="3200" dirty="0"/>
+              <a:t>Grade</a:t>
+            </a:r>
+          </a:p>
+          <a:p>
+            <a:pPr lvl="1"/>
+            <a:r>
+              <a:rPr lang="en-US" sz="3200" dirty="0"/>
+              <a:t>High School</a:t>
+            </a:r>
+          </a:p>
+          <a:p>
+            <a:pPr lvl="1"/>
+            <a:r>
+              <a:rPr lang="en-US" sz="3200" dirty="0"/>
+              <a:t>Reading score</a:t>
+            </a:r>
+          </a:p>
+          <a:p>
+            <a:pPr lvl="1"/>
+            <a:r>
+              <a:rPr lang="en-US" sz="3200" dirty="0"/>
+              <a:t>Math score</a:t>
+            </a:r>
+          </a:p>
+        </p:txBody>
+      </p:sp>
+    </p:spTree>
+    <p:extLst>
+      <p:ext uri="{BB962C8B-B14F-4D97-AF65-F5344CB8AC3E}">
+        <p14:creationId xmlns:p14="http://schemas.microsoft.com/office/powerpoint/2010/main" val="1277202695"/>
+      </p:ext>
+    </p:extLst>
+  </p:cSld>
+  <p:clrMapOvr>
+    <a:masterClrMapping/>
+  </p:clrMapOvr>
+</p:sld>
+</file>
+
+<file path=ppt/slides/slide18.xml><?xml version="1.0" encoding="utf-8"?>
+<p:sld xmlns:a="http://schemas.openxmlformats.org/drawingml/2006/main" xmlns:r="http://schemas.openxmlformats.org/officeDocument/2006/relationships" xmlns:p="http://schemas.openxmlformats.org/presentationml/2006/main">
+  <p:cSld>
+    <p:bg>
+      <p:bgPr>
+        <a:gradFill flip="none" rotWithShape="1">
+          <a:gsLst>
+            <a:gs pos="0">
+              <a:schemeClr val="accent1">
+                <a:lumMod val="5000"/>
+                <a:lumOff val="95000"/>
+              </a:schemeClr>
+            </a:gs>
+            <a:gs pos="74000">
+              <a:schemeClr val="accent1">
+                <a:lumMod val="45000"/>
+                <a:lumOff val="55000"/>
+              </a:schemeClr>
+            </a:gs>
+            <a:gs pos="83000">
+              <a:schemeClr val="accent1">
+                <a:lumMod val="45000"/>
+                <a:lumOff val="55000"/>
+              </a:schemeClr>
+            </a:gs>
+            <a:gs pos="100000">
+              <a:schemeClr val="accent1">
+                <a:lumMod val="30000"/>
+                <a:lumOff val="70000"/>
+              </a:schemeClr>
+            </a:gs>
+          </a:gsLst>
+          <a:lin ang="5400000" scaled="1"/>
+          <a:tileRect/>
+        </a:gradFill>
+        <a:effectLst/>
+      </p:bgPr>
+    </p:bg>
+    <p:spTree>
+      <p:nvGrpSpPr>
+        <p:cNvPr id="1" name=""/>
+        <p:cNvGrpSpPr/>
+        <p:nvPr/>
+      </p:nvGrpSpPr>
+      <p:grpSpPr>
+        <a:xfrm>
+          <a:off x="0" y="0"/>
+          <a:ext cx="0" cy="0"/>
+          <a:chOff x="0" y="0"/>
+          <a:chExt cx="0" cy="0"/>
+        </a:xfrm>
+      </p:grpSpPr>
+      <p:sp>
+        <p:nvSpPr>
+          <p:cNvPr id="2" name="Title 1">
+            <a:extLst>
+              <a:ext uri="{FF2B5EF4-FFF2-40B4-BE49-F238E27FC236}">
+                <a16:creationId xmlns:a16="http://schemas.microsoft.com/office/drawing/2014/main" id="{3EFB1119-6DAB-476F-9541-ABA9503B44FF}"/>
+              </a:ext>
+            </a:extLst>
+          </p:cNvPr>
+          <p:cNvSpPr>
+            <a:spLocks noGrp="1"/>
+          </p:cNvSpPr>
+          <p:nvPr>
+            <p:ph type="title"/>
+          </p:nvPr>
+        </p:nvSpPr>
+        <p:spPr/>
+        <p:txBody>
+          <a:bodyPr/>
+          <a:lstStyle/>
+          <a:p>
+            <a:r>
+              <a:rPr lang="en-US" dirty="0"/>
+              <a:t>Dataset Analyzed</a:t>
+            </a:r>
+          </a:p>
+        </p:txBody>
+      </p:sp>
+      <p:sp>
+        <p:nvSpPr>
+          <p:cNvPr id="3" name="Content Placeholder 2">
+            <a:extLst>
+              <a:ext uri="{FF2B5EF4-FFF2-40B4-BE49-F238E27FC236}">
+                <a16:creationId xmlns:a16="http://schemas.microsoft.com/office/drawing/2014/main" id="{304380FF-F4C6-46D9-95C8-F4A1742EB433}"/>
+              </a:ext>
+            </a:extLst>
+          </p:cNvPr>
+          <p:cNvSpPr>
+            <a:spLocks noGrp="1"/>
+          </p:cNvSpPr>
+          <p:nvPr>
+            <p:ph idx="1"/>
+          </p:nvPr>
+        </p:nvSpPr>
+        <p:spPr/>
+        <p:txBody>
+          <a:bodyPr>
+            <a:normAutofit/>
+          </a:bodyPr>
+          <a:lstStyle/>
+          <a:p>
+            <a:r>
+              <a:rPr lang="en-US" sz="3600" dirty="0"/>
+              <a:t>School file -15 school records</a:t>
+            </a:r>
+          </a:p>
+          <a:p>
+            <a:pPr lvl="1"/>
+            <a:r>
+              <a:rPr lang="en-US" sz="3200" dirty="0"/>
+              <a:t>School ID</a:t>
+            </a:r>
+          </a:p>
+          <a:p>
+            <a:pPr lvl="1"/>
+            <a:r>
+              <a:rPr lang="en-US" sz="3200" dirty="0"/>
+              <a:t>Name</a:t>
+            </a:r>
+          </a:p>
+          <a:p>
+            <a:pPr lvl="1"/>
+            <a:r>
+              <a:rPr lang="en-US" sz="3200" dirty="0"/>
+              <a:t>Type (charter or traditional)</a:t>
+            </a:r>
+          </a:p>
+          <a:p>
+            <a:pPr lvl="1"/>
+            <a:r>
+              <a:rPr lang="en-US" sz="3200" dirty="0"/>
+              <a:t>Student population</a:t>
+            </a:r>
+          </a:p>
+          <a:p>
+            <a:pPr lvl="1"/>
+            <a:r>
+              <a:rPr lang="en-US" sz="3200" dirty="0"/>
+              <a:t>Total budget</a:t>
+            </a:r>
+          </a:p>
+        </p:txBody>
+      </p:sp>
+    </p:spTree>
+    <p:extLst>
+      <p:ext uri="{BB962C8B-B14F-4D97-AF65-F5344CB8AC3E}">
+        <p14:creationId xmlns:p14="http://schemas.microsoft.com/office/powerpoint/2010/main" val="283376497"/>
+      </p:ext>
+    </p:extLst>
+  </p:cSld>
+  <p:clrMapOvr>
+    <a:masterClrMapping/>
+  </p:clrMapOvr>
+</p:sld>
+</file>
+
+<file path=ppt/slides/slide19.xml><?xml version="1.0" encoding="utf-8"?>
+<p:sld xmlns:a="http://schemas.openxmlformats.org/drawingml/2006/main" xmlns:r="http://schemas.openxmlformats.org/officeDocument/2006/relationships" xmlns:p="http://schemas.openxmlformats.org/presentationml/2006/main">
+  <p:cSld>
+    <p:bg>
+      <p:bgPr>
+        <a:gradFill flip="none" rotWithShape="1">
+          <a:gsLst>
+            <a:gs pos="0">
+              <a:schemeClr val="accent1">
+                <a:lumMod val="5000"/>
+                <a:lumOff val="95000"/>
+              </a:schemeClr>
+            </a:gs>
+            <a:gs pos="74000">
+              <a:schemeClr val="accent1">
+                <a:lumMod val="45000"/>
+                <a:lumOff val="55000"/>
+              </a:schemeClr>
+            </a:gs>
+            <a:gs pos="83000">
+              <a:schemeClr val="accent1">
+                <a:lumMod val="45000"/>
+                <a:lumOff val="55000"/>
+              </a:schemeClr>
+            </a:gs>
+            <a:gs pos="100000">
+              <a:schemeClr val="accent1">
+                <a:lumMod val="30000"/>
+                <a:lumOff val="70000"/>
+              </a:schemeClr>
+            </a:gs>
+          </a:gsLst>
+          <a:lin ang="5400000" scaled="1"/>
+          <a:tileRect/>
+        </a:gradFill>
+        <a:effectLst/>
+      </p:bgPr>
+    </p:bg>
+    <p:spTree>
+      <p:nvGrpSpPr>
+        <p:cNvPr id="1" name=""/>
+        <p:cNvGrpSpPr/>
+        <p:nvPr/>
+      </p:nvGrpSpPr>
+      <p:grpSpPr>
+        <a:xfrm>
+          <a:off x="0" y="0"/>
+          <a:ext cx="0" cy="0"/>
+          <a:chOff x="0" y="0"/>
+          <a:chExt cx="0" cy="0"/>
+        </a:xfrm>
+      </p:grpSpPr>
+      <p:sp>
+        <p:nvSpPr>
+          <p:cNvPr id="2" name="Title 1">
+            <a:extLst>
+              <a:ext uri="{FF2B5EF4-FFF2-40B4-BE49-F238E27FC236}">
+                <a16:creationId xmlns:a16="http://schemas.microsoft.com/office/drawing/2014/main" id="{3EFB1119-6DAB-476F-9541-ABA9503B44FF}"/>
+              </a:ext>
+            </a:extLst>
+          </p:cNvPr>
+          <p:cNvSpPr>
+            <a:spLocks noGrp="1"/>
+          </p:cNvSpPr>
+          <p:nvPr>
+            <p:ph type="title"/>
+          </p:nvPr>
+        </p:nvSpPr>
+        <p:spPr/>
+        <p:txBody>
+          <a:bodyPr/>
+          <a:lstStyle/>
+          <a:p>
+            <a:r>
+              <a:rPr lang="en-US" dirty="0"/>
+              <a:t>Dataset Analyzed – school averages</a:t>
+            </a:r>
+          </a:p>
+        </p:txBody>
+      </p:sp>
+      <p:graphicFrame>
+        <p:nvGraphicFramePr>
+          <p:cNvPr id="4" name="Table 4">
+            <a:extLst>
+              <a:ext uri="{FF2B5EF4-FFF2-40B4-BE49-F238E27FC236}">
+                <a16:creationId xmlns:a16="http://schemas.microsoft.com/office/drawing/2014/main" id="{95C442A3-7810-4C8C-8FA0-B18E224BA036}"/>
+              </a:ext>
+            </a:extLst>
+          </p:cNvPr>
+          <p:cNvGraphicFramePr>
+            <a:graphicFrameLocks noGrp="1"/>
+          </p:cNvGraphicFramePr>
+          <p:nvPr>
+            <p:ph idx="1"/>
+            <p:extLst>
+              <p:ext uri="{D42A27DB-BD31-4B8C-83A1-F6EECF244321}">
+                <p14:modId xmlns:p14="http://schemas.microsoft.com/office/powerpoint/2010/main" val="3595695329"/>
+              </p:ext>
+            </p:extLst>
+          </p:nvPr>
+        </p:nvGraphicFramePr>
+        <p:xfrm>
+          <a:off x="838200" y="1825625"/>
+          <a:ext cx="7936231" cy="1483360"/>
+        </p:xfrm>
+        <a:graphic>
+          <a:graphicData uri="http://schemas.openxmlformats.org/drawingml/2006/table">
+            <a:tbl>
+              <a:tblPr firstRow="1" bandRow="1">
+                <a:tableStyleId>{5C22544A-7EE6-4342-B048-85BDC9FD1C3A}</a:tableStyleId>
+              </a:tblPr>
+              <a:tblGrid>
+                <a:gridCol w="2103120">
+                  <a:extLst>
+                    <a:ext uri="{9D8B030D-6E8A-4147-A177-3AD203B41FA5}">
+                      <a16:colId xmlns:a16="http://schemas.microsoft.com/office/drawing/2014/main" val="2162938750"/>
+                    </a:ext>
+                  </a:extLst>
+                </a:gridCol>
+                <a:gridCol w="467043">
+                  <a:extLst>
+                    <a:ext uri="{9D8B030D-6E8A-4147-A177-3AD203B41FA5}">
+                      <a16:colId xmlns:a16="http://schemas.microsoft.com/office/drawing/2014/main" val="2660047874"/>
+                    </a:ext>
+                  </a:extLst>
+                </a:gridCol>
+                <a:gridCol w="1863979">
+                  <a:extLst>
+                    <a:ext uri="{9D8B030D-6E8A-4147-A177-3AD203B41FA5}">
+                      <a16:colId xmlns:a16="http://schemas.microsoft.com/office/drawing/2014/main" val="2284183308"/>
+                    </a:ext>
+                  </a:extLst>
+                </a:gridCol>
+                <a:gridCol w="1304163">
+                  <a:extLst>
+                    <a:ext uri="{9D8B030D-6E8A-4147-A177-3AD203B41FA5}">
+                      <a16:colId xmlns:a16="http://schemas.microsoft.com/office/drawing/2014/main" val="1894807309"/>
+                    </a:ext>
+                  </a:extLst>
+                </a:gridCol>
+                <a:gridCol w="2197926">
+                  <a:extLst>
+                    <a:ext uri="{9D8B030D-6E8A-4147-A177-3AD203B41FA5}">
+                      <a16:colId xmlns:a16="http://schemas.microsoft.com/office/drawing/2014/main" val="344128639"/>
+                    </a:ext>
+                  </a:extLst>
+                </a:gridCol>
+              </a:tblGrid>
+              <a:tr h="370840">
+                <a:tc>
+                  <a:txBody>
+                    <a:bodyPr/>
+                    <a:lstStyle/>
+                    <a:p>
+                      <a:r>
+                        <a:rPr lang="en-US" dirty="0"/>
+                        <a:t>Type</a:t>
+                      </a:r>
+                    </a:p>
+                  </a:txBody>
+                  <a:tcPr/>
+                </a:tc>
+                <a:tc>
+                  <a:txBody>
+                    <a:bodyPr/>
+                    <a:lstStyle/>
+                    <a:p>
+                      <a:r>
+                        <a:rPr lang="en-US" dirty="0"/>
+                        <a:t>#</a:t>
+                      </a:r>
+                    </a:p>
+                  </a:txBody>
+                  <a:tcPr/>
+                </a:tc>
+                <a:tc>
+                  <a:txBody>
+                    <a:bodyPr/>
+                    <a:lstStyle/>
+                    <a:p>
+                      <a:r>
+                        <a:rPr lang="en-US" dirty="0"/>
+                        <a:t>Avg # of students</a:t>
+                      </a:r>
+                    </a:p>
+                  </a:txBody>
+                  <a:tcPr/>
+                </a:tc>
+                <a:tc>
+                  <a:txBody>
+                    <a:bodyPr/>
+                    <a:lstStyle/>
+                    <a:p>
+                      <a:r>
+                        <a:rPr lang="en-US" dirty="0"/>
+                        <a:t>Avg budget</a:t>
+                      </a:r>
+                    </a:p>
+                  </a:txBody>
+                  <a:tcPr/>
+                </a:tc>
+                <a:tc>
+                  <a:txBody>
+                    <a:bodyPr/>
+                    <a:lstStyle/>
+                    <a:p>
+                      <a:r>
+                        <a:rPr lang="en-US" dirty="0"/>
+                        <a:t>Avg per pupil budget</a:t>
+                      </a:r>
+                    </a:p>
+                  </a:txBody>
+                  <a:tcPr/>
+                </a:tc>
+                <a:extLst>
+                  <a:ext uri="{0D108BD9-81ED-4DB2-BD59-A6C34878D82A}">
+                    <a16:rowId xmlns:a16="http://schemas.microsoft.com/office/drawing/2014/main" val="252774690"/>
+                  </a:ext>
+                </a:extLst>
+              </a:tr>
+              <a:tr h="370840">
+                <a:tc>
+                  <a:txBody>
+                    <a:bodyPr/>
+                    <a:lstStyle/>
+                    <a:p>
+                      <a:r>
+                        <a:rPr lang="en-US" dirty="0"/>
+                        <a:t>Charter</a:t>
+                      </a:r>
+                    </a:p>
+                  </a:txBody>
+                  <a:tcPr/>
+                </a:tc>
+                <a:tc>
+                  <a:txBody>
+                    <a:bodyPr/>
+                    <a:lstStyle/>
+                    <a:p>
+                      <a:pPr algn="r"/>
+                      <a:r>
+                        <a:rPr lang="en-US" dirty="0"/>
+                        <a:t>8</a:t>
+                      </a:r>
+                    </a:p>
+                  </a:txBody>
+                  <a:tcPr/>
+                </a:tc>
+                <a:tc>
+                  <a:txBody>
+                    <a:bodyPr/>
+                    <a:lstStyle/>
+                    <a:p>
+                      <a:pPr algn="r"/>
+                      <a:r>
+                        <a:rPr lang="en-US" dirty="0"/>
+                        <a:t>1,500</a:t>
+                      </a:r>
+                    </a:p>
+                  </a:txBody>
+                  <a:tcPr/>
+                </a:tc>
+                <a:tc>
+                  <a:txBody>
+                    <a:bodyPr/>
+                    <a:lstStyle/>
+                    <a:p>
+                      <a:pPr algn="r"/>
+                      <a:r>
+                        <a:rPr lang="en-US" dirty="0"/>
+                        <a:t>$910,000</a:t>
+                      </a:r>
+                    </a:p>
+                  </a:txBody>
+                  <a:tcPr/>
+                </a:tc>
+                <a:tc>
+                  <a:txBody>
+                    <a:bodyPr/>
+                    <a:lstStyle/>
+                    <a:p>
+                      <a:pPr algn="r"/>
+                      <a:r>
+                        <a:rPr lang="en-US" dirty="0"/>
+                        <a:t>$600</a:t>
+                      </a:r>
+                    </a:p>
+                  </a:txBody>
+                  <a:tcPr/>
+                </a:tc>
+                <a:extLst>
+                  <a:ext uri="{0D108BD9-81ED-4DB2-BD59-A6C34878D82A}">
+                    <a16:rowId xmlns:a16="http://schemas.microsoft.com/office/drawing/2014/main" val="826626519"/>
+                  </a:ext>
+                </a:extLst>
+              </a:tr>
+              <a:tr h="370840">
+                <a:tc>
+                  <a:txBody>
+                    <a:bodyPr/>
+                    <a:lstStyle/>
+                    <a:p>
+                      <a:r>
+                        <a:rPr lang="en-US" dirty="0"/>
+                        <a:t>Traditional</a:t>
+                      </a:r>
+                    </a:p>
+                  </a:txBody>
+                  <a:tcPr/>
+                </a:tc>
+                <a:tc>
+                  <a:txBody>
+                    <a:bodyPr/>
+                    <a:lstStyle/>
+                    <a:p>
+                      <a:pPr algn="r"/>
+                      <a:r>
+                        <a:rPr lang="en-US" dirty="0"/>
+                        <a:t>7</a:t>
+                      </a:r>
+                    </a:p>
+                  </a:txBody>
+                  <a:tcPr/>
+                </a:tc>
+                <a:tc>
+                  <a:txBody>
+                    <a:bodyPr/>
+                    <a:lstStyle/>
+                    <a:p>
+                      <a:pPr algn="r"/>
+                      <a:r>
+                        <a:rPr lang="en-US" dirty="0"/>
+                        <a:t>3,900</a:t>
+                      </a:r>
+                    </a:p>
+                  </a:txBody>
+                  <a:tcPr/>
+                </a:tc>
+                <a:tc>
+                  <a:txBody>
+                    <a:bodyPr/>
+                    <a:lstStyle/>
+                    <a:p>
+                      <a:pPr algn="r"/>
+                      <a:r>
+                        <a:rPr lang="en-US" dirty="0"/>
+                        <a:t>$2,480,000</a:t>
+                      </a:r>
+                    </a:p>
+                  </a:txBody>
+                  <a:tcPr/>
+                </a:tc>
+                <a:tc>
+                  <a:txBody>
+                    <a:bodyPr/>
+                    <a:lstStyle/>
+                    <a:p>
+                      <a:pPr algn="r"/>
+                      <a:r>
+                        <a:rPr lang="en-US" dirty="0"/>
+                        <a:t>$644</a:t>
+                      </a:r>
+                    </a:p>
+                  </a:txBody>
+                  <a:tcPr/>
+                </a:tc>
+                <a:extLst>
+                  <a:ext uri="{0D108BD9-81ED-4DB2-BD59-A6C34878D82A}">
+                    <a16:rowId xmlns:a16="http://schemas.microsoft.com/office/drawing/2014/main" val="2977581941"/>
+                  </a:ext>
+                </a:extLst>
+              </a:tr>
+              <a:tr h="370840">
+                <a:tc>
+                  <a:txBody>
+                    <a:bodyPr/>
+                    <a:lstStyle/>
+                    <a:p>
+                      <a:r>
+                        <a:rPr lang="en-US" dirty="0"/>
+                        <a:t>Total</a:t>
+                      </a:r>
+                    </a:p>
+                  </a:txBody>
+                  <a:tcPr/>
+                </a:tc>
+                <a:tc>
+                  <a:txBody>
+                    <a:bodyPr/>
+                    <a:lstStyle/>
+                    <a:p>
+                      <a:pPr algn="r"/>
+                      <a:r>
+                        <a:rPr lang="en-US" dirty="0"/>
+                        <a:t>15</a:t>
+                      </a:r>
+                    </a:p>
+                  </a:txBody>
+                  <a:tcPr/>
+                </a:tc>
+                <a:tc>
+                  <a:txBody>
+                    <a:bodyPr/>
+                    <a:lstStyle/>
+                    <a:p>
+                      <a:pPr algn="r"/>
+                      <a:r>
+                        <a:rPr lang="en-US" dirty="0"/>
+                        <a:t>2,600</a:t>
+                      </a:r>
+                    </a:p>
+                  </a:txBody>
+                  <a:tcPr/>
+                </a:tc>
+                <a:tc>
+                  <a:txBody>
+                    <a:bodyPr/>
+                    <a:lstStyle/>
+                    <a:p>
+                      <a:pPr algn="r"/>
+                      <a:r>
+                        <a:rPr lang="en-US" dirty="0"/>
+                        <a:t>$1,640,000</a:t>
+                      </a:r>
+                    </a:p>
+                  </a:txBody>
+                  <a:tcPr/>
+                </a:tc>
+                <a:tc>
+                  <a:txBody>
+                    <a:bodyPr/>
+                    <a:lstStyle/>
+                    <a:p>
+                      <a:pPr algn="r"/>
+                      <a:r>
+                        <a:rPr lang="en-US" dirty="0"/>
+                        <a:t>$620</a:t>
+                      </a:r>
+                    </a:p>
+                  </a:txBody>
+                  <a:tcPr/>
+                </a:tc>
+                <a:extLst>
+                  <a:ext uri="{0D108BD9-81ED-4DB2-BD59-A6C34878D82A}">
+                    <a16:rowId xmlns:a16="http://schemas.microsoft.com/office/drawing/2014/main" val="830565368"/>
+                  </a:ext>
+                </a:extLst>
+              </a:tr>
+            </a:tbl>
+          </a:graphicData>
+        </a:graphic>
+      </p:graphicFrame>
+    </p:spTree>
+    <p:extLst>
+      <p:ext uri="{BB962C8B-B14F-4D97-AF65-F5344CB8AC3E}">
+        <p14:creationId xmlns:p14="http://schemas.microsoft.com/office/powerpoint/2010/main" val="3046335602"/>
+      </p:ext>
+    </p:extLst>
+  </p:cSld>
+  <p:clrMapOvr>
+    <a:masterClrMapping/>
+  </p:clrMapOvr>
+</p:sld>
+</file>
+
+<file path=ppt/slides/slide2.xml><?xml version="1.0" encoding="utf-8"?>
+<p:sld xmlns:a="http://schemas.openxmlformats.org/drawingml/2006/main" xmlns:r="http://schemas.openxmlformats.org/officeDocument/2006/relationships" xmlns:p="http://schemas.openxmlformats.org/presentationml/2006/main">
+  <p:cSld>
+    <p:bg>
+      <p:bgPr>
+        <a:gradFill flip="none" rotWithShape="1">
+          <a:gsLst>
+            <a:gs pos="0">
+              <a:schemeClr val="accent1">
+                <a:lumMod val="5000"/>
+                <a:lumOff val="95000"/>
+              </a:schemeClr>
+            </a:gs>
+            <a:gs pos="74000">
+              <a:schemeClr val="accent1">
+                <a:lumMod val="45000"/>
+                <a:lumOff val="55000"/>
+              </a:schemeClr>
+            </a:gs>
+            <a:gs pos="83000">
+              <a:schemeClr val="accent1">
+                <a:lumMod val="45000"/>
+                <a:lumOff val="55000"/>
+              </a:schemeClr>
+            </a:gs>
+            <a:gs pos="100000">
+              <a:schemeClr val="accent1">
+                <a:lumMod val="30000"/>
+                <a:lumOff val="70000"/>
+              </a:schemeClr>
+            </a:gs>
+          </a:gsLst>
+          <a:lin ang="5400000" scaled="1"/>
+          <a:tileRect/>
+        </a:gradFill>
+        <a:effectLst/>
+      </p:bgPr>
+    </p:bg>
+    <p:spTree>
+      <p:nvGrpSpPr>
+        <p:cNvPr id="1" name=""/>
+        <p:cNvGrpSpPr/>
+        <p:nvPr/>
+      </p:nvGrpSpPr>
+      <p:grpSpPr>
+        <a:xfrm>
+          <a:off x="0" y="0"/>
+          <a:ext cx="0" cy="0"/>
+          <a:chOff x="0" y="0"/>
+          <a:chExt cx="0" cy="0"/>
+        </a:xfrm>
+      </p:grpSpPr>
+      <p:sp>
+        <p:nvSpPr>
+          <p:cNvPr id="2" name="Title 1">
+            <a:extLst>
+              <a:ext uri="{FF2B5EF4-FFF2-40B4-BE49-F238E27FC236}">
+                <a16:creationId xmlns:a16="http://schemas.microsoft.com/office/drawing/2014/main" id="{3EFB1119-6DAB-476F-9541-ABA9503B44FF}"/>
+              </a:ext>
+            </a:extLst>
+          </p:cNvPr>
+          <p:cNvSpPr>
+            <a:spLocks noGrp="1"/>
+          </p:cNvSpPr>
+          <p:nvPr>
+            <p:ph type="title"/>
+          </p:nvPr>
+        </p:nvSpPr>
+        <p:spPr/>
+        <p:txBody>
+          <a:bodyPr/>
+          <a:lstStyle/>
+          <a:p>
+            <a:r>
+              <a:rPr lang="en-US" dirty="0"/>
+              <a:t>Overview</a:t>
+            </a:r>
+          </a:p>
+        </p:txBody>
+      </p:sp>
+      <p:sp>
+        <p:nvSpPr>
+          <p:cNvPr id="3" name="Content Placeholder 2">
+            <a:extLst>
+              <a:ext uri="{FF2B5EF4-FFF2-40B4-BE49-F238E27FC236}">
+                <a16:creationId xmlns:a16="http://schemas.microsoft.com/office/drawing/2014/main" id="{304380FF-F4C6-46D9-95C8-F4A1742EB433}"/>
+              </a:ext>
+            </a:extLst>
+          </p:cNvPr>
+          <p:cNvSpPr>
+            <a:spLocks noGrp="1"/>
+          </p:cNvSpPr>
+          <p:nvPr>
+            <p:ph idx="1"/>
+          </p:nvPr>
+        </p:nvSpPr>
+        <p:spPr/>
+        <p:txBody>
+          <a:bodyPr>
+            <a:normAutofit/>
+          </a:bodyPr>
+          <a:lstStyle/>
+          <a:p>
+            <a:r>
+              <a:rPr lang="en-US" sz="3600" dirty="0"/>
+              <a:t>District summary</a:t>
+            </a:r>
+          </a:p>
+          <a:p>
+            <a:r>
+              <a:rPr lang="en-US" sz="3600" dirty="0"/>
+              <a:t>Key observations</a:t>
+            </a:r>
+          </a:p>
+          <a:p>
+            <a:r>
+              <a:rPr lang="en-US" sz="3600" dirty="0"/>
+              <a:t>Success metrics</a:t>
+            </a:r>
+          </a:p>
+          <a:p>
+            <a:r>
+              <a:rPr lang="en-US" sz="3600" dirty="0"/>
+              <a:t>Recommended next steps</a:t>
+            </a:r>
+          </a:p>
+          <a:p>
+            <a:r>
+              <a:rPr lang="en-US" sz="3600" dirty="0"/>
+              <a:t>Dataset analyzed</a:t>
+            </a:r>
+          </a:p>
+          <a:p>
+            <a:endParaRPr lang="en-US" sz="3600" dirty="0"/>
+          </a:p>
+        </p:txBody>
+      </p:sp>
+    </p:spTree>
+    <p:extLst>
+      <p:ext uri="{BB962C8B-B14F-4D97-AF65-F5344CB8AC3E}">
+        <p14:creationId xmlns:p14="http://schemas.microsoft.com/office/powerpoint/2010/main" val="1542692981"/>
+      </p:ext>
+    </p:extLst>
+  </p:cSld>
+  <p:clrMapOvr>
+    <a:masterClrMapping/>
+  </p:clrMapOvr>
+</p:sld>
+</file>
+
+<file path=ppt/slides/slide20.xml><?xml version="1.0" encoding="utf-8"?>
+<p:sld xmlns:a="http://schemas.openxmlformats.org/drawingml/2006/main" xmlns:r="http://schemas.openxmlformats.org/officeDocument/2006/relationships" xmlns:p="http://schemas.openxmlformats.org/presentationml/2006/main">
+  <p:cSld>
+    <p:bg>
+      <p:bgPr>
+        <a:gradFill flip="none" rotWithShape="1">
+          <a:gsLst>
+            <a:gs pos="0">
+              <a:schemeClr val="accent1">
+                <a:lumMod val="5000"/>
+                <a:lumOff val="95000"/>
+              </a:schemeClr>
+            </a:gs>
+            <a:gs pos="74000">
+              <a:schemeClr val="accent1">
+                <a:lumMod val="45000"/>
+                <a:lumOff val="55000"/>
+              </a:schemeClr>
+            </a:gs>
+            <a:gs pos="83000">
+              <a:schemeClr val="accent1">
+                <a:lumMod val="45000"/>
+                <a:lumOff val="55000"/>
+              </a:schemeClr>
+            </a:gs>
+            <a:gs pos="100000">
+              <a:schemeClr val="accent1">
+                <a:lumMod val="30000"/>
+                <a:lumOff val="70000"/>
+              </a:schemeClr>
+            </a:gs>
+          </a:gsLst>
+          <a:lin ang="5400000" scaled="1"/>
+          <a:tileRect/>
+        </a:gradFill>
+        <a:effectLst/>
+      </p:bgPr>
+    </p:bg>
+    <p:spTree>
+      <p:nvGrpSpPr>
+        <p:cNvPr id="1" name=""/>
+        <p:cNvGrpSpPr/>
+        <p:nvPr/>
+      </p:nvGrpSpPr>
+      <p:grpSpPr>
+        <a:xfrm>
+          <a:off x="0" y="0"/>
+          <a:ext cx="0" cy="0"/>
+          <a:chOff x="0" y="0"/>
+          <a:chExt cx="0" cy="0"/>
+        </a:xfrm>
+      </p:grpSpPr>
+      <p:sp>
+        <p:nvSpPr>
+          <p:cNvPr id="2" name="Title 1">
+            <a:extLst>
+              <a:ext uri="{FF2B5EF4-FFF2-40B4-BE49-F238E27FC236}">
+                <a16:creationId xmlns:a16="http://schemas.microsoft.com/office/drawing/2014/main" id="{3EFB1119-6DAB-476F-9541-ABA9503B44FF}"/>
+              </a:ext>
+            </a:extLst>
+          </p:cNvPr>
+          <p:cNvSpPr>
+            <a:spLocks noGrp="1"/>
+          </p:cNvSpPr>
+          <p:nvPr>
+            <p:ph type="title"/>
+          </p:nvPr>
+        </p:nvSpPr>
+        <p:spPr/>
+        <p:txBody>
+          <a:bodyPr/>
+          <a:lstStyle/>
+          <a:p>
+            <a:r>
+              <a:rPr lang="en-US" dirty="0"/>
+              <a:t>Analysis project</a:t>
+            </a:r>
+          </a:p>
+        </p:txBody>
+      </p:sp>
+      <p:sp>
+        <p:nvSpPr>
+          <p:cNvPr id="3" name="Content Placeholder 2">
+            <a:extLst>
+              <a:ext uri="{FF2B5EF4-FFF2-40B4-BE49-F238E27FC236}">
+                <a16:creationId xmlns:a16="http://schemas.microsoft.com/office/drawing/2014/main" id="{304380FF-F4C6-46D9-95C8-F4A1742EB433}"/>
+              </a:ext>
+            </a:extLst>
+          </p:cNvPr>
+          <p:cNvSpPr>
+            <a:spLocks noGrp="1"/>
+          </p:cNvSpPr>
+          <p:nvPr>
+            <p:ph idx="1"/>
+          </p:nvPr>
+        </p:nvSpPr>
+        <p:spPr/>
+        <p:txBody>
+          <a:bodyPr>
+            <a:normAutofit/>
+          </a:bodyPr>
+          <a:lstStyle/>
+          <a:p>
+            <a:r>
+              <a:rPr lang="en-US" sz="3600" dirty="0"/>
+              <a:t>Aggregation of data to get success metrics</a:t>
+            </a:r>
+          </a:p>
+          <a:p>
+            <a:r>
+              <a:rPr lang="en-US" sz="3600" dirty="0"/>
+              <a:t>Joining of files to get type/school performance, budget summaries</a:t>
+            </a:r>
+            <a:endParaRPr lang="en-US" sz="3200" dirty="0"/>
+          </a:p>
+        </p:txBody>
+      </p:sp>
+    </p:spTree>
+    <p:extLst>
+      <p:ext uri="{BB962C8B-B14F-4D97-AF65-F5344CB8AC3E}">
+        <p14:creationId xmlns:p14="http://schemas.microsoft.com/office/powerpoint/2010/main" val="2122951435"/>
+      </p:ext>
+    </p:extLst>
+  </p:cSld>
+  <p:clrMapOvr>
+    <a:masterClrMapping/>
+  </p:clrMapOvr>
+</p:sld>
+</file>
+
+<file path=ppt/slides/slide21.xml><?xml version="1.0" encoding="utf-8"?>
+<p:sld xmlns:a="http://schemas.openxmlformats.org/drawingml/2006/main" xmlns:r="http://schemas.openxmlformats.org/officeDocument/2006/relationships" xmlns:p="http://schemas.openxmlformats.org/presentationml/2006/main">
+  <p:cSld>
+    <p:bg>
+      <p:bgPr>
+        <a:gradFill flip="none" rotWithShape="1">
+          <a:gsLst>
+            <a:gs pos="0">
+              <a:schemeClr val="accent1">
+                <a:lumMod val="5000"/>
+                <a:lumOff val="95000"/>
+              </a:schemeClr>
+            </a:gs>
+            <a:gs pos="74000">
+              <a:schemeClr val="accent1">
+                <a:lumMod val="45000"/>
+                <a:lumOff val="55000"/>
+              </a:schemeClr>
+            </a:gs>
+            <a:gs pos="83000">
+              <a:schemeClr val="accent1">
+                <a:lumMod val="45000"/>
+                <a:lumOff val="55000"/>
+              </a:schemeClr>
+            </a:gs>
+            <a:gs pos="100000">
+              <a:schemeClr val="accent1">
+                <a:lumMod val="30000"/>
+                <a:lumOff val="70000"/>
+              </a:schemeClr>
+            </a:gs>
+          </a:gsLst>
+          <a:lin ang="5400000" scaled="1"/>
+          <a:tileRect/>
+        </a:gradFill>
+        <a:effectLst/>
+      </p:bgPr>
+    </p:bg>
+    <p:spTree>
+      <p:nvGrpSpPr>
+        <p:cNvPr id="1" name=""/>
+        <p:cNvGrpSpPr/>
+        <p:nvPr/>
+      </p:nvGrpSpPr>
+      <p:grpSpPr>
+        <a:xfrm>
+          <a:off x="0" y="0"/>
+          <a:ext cx="0" cy="0"/>
+          <a:chOff x="0" y="0"/>
+          <a:chExt cx="0" cy="0"/>
+        </a:xfrm>
+      </p:grpSpPr>
+      <p:sp>
+        <p:nvSpPr>
+          <p:cNvPr id="2" name="Title 1">
+            <a:extLst>
+              <a:ext uri="{FF2B5EF4-FFF2-40B4-BE49-F238E27FC236}">
+                <a16:creationId xmlns:a16="http://schemas.microsoft.com/office/drawing/2014/main" id="{3EFB1119-6DAB-476F-9541-ABA9503B44FF}"/>
+              </a:ext>
+            </a:extLst>
+          </p:cNvPr>
+          <p:cNvSpPr>
+            <a:spLocks noGrp="1"/>
+          </p:cNvSpPr>
+          <p:nvPr>
+            <p:ph type="title"/>
+          </p:nvPr>
+        </p:nvSpPr>
+        <p:spPr/>
+        <p:txBody>
+          <a:bodyPr/>
+          <a:lstStyle/>
+          <a:p>
+            <a:r>
+              <a:rPr lang="en-US" dirty="0"/>
+              <a:t>Overview</a:t>
+            </a:r>
+          </a:p>
+        </p:txBody>
+      </p:sp>
+      <p:sp>
+        <p:nvSpPr>
+          <p:cNvPr id="3" name="Content Placeholder 2">
+            <a:extLst>
+              <a:ext uri="{FF2B5EF4-FFF2-40B4-BE49-F238E27FC236}">
+                <a16:creationId xmlns:a16="http://schemas.microsoft.com/office/drawing/2014/main" id="{304380FF-F4C6-46D9-95C8-F4A1742EB433}"/>
+              </a:ext>
+            </a:extLst>
+          </p:cNvPr>
+          <p:cNvSpPr>
+            <a:spLocks noGrp="1"/>
+          </p:cNvSpPr>
+          <p:nvPr>
+            <p:ph idx="1"/>
+          </p:nvPr>
+        </p:nvSpPr>
+        <p:spPr/>
+        <p:txBody>
+          <a:bodyPr>
+            <a:normAutofit/>
+          </a:bodyPr>
+          <a:lstStyle/>
+          <a:p>
+            <a:r>
+              <a:rPr lang="en-US" sz="3600" dirty="0"/>
+              <a:t>District summary</a:t>
+            </a:r>
+          </a:p>
+          <a:p>
+            <a:r>
+              <a:rPr lang="en-US" sz="3600" dirty="0"/>
+              <a:t>Key observations</a:t>
+            </a:r>
+          </a:p>
+          <a:p>
+            <a:r>
+              <a:rPr lang="en-US" sz="3600" dirty="0"/>
+              <a:t>Success metrics</a:t>
+            </a:r>
+          </a:p>
+          <a:p>
+            <a:r>
+              <a:rPr lang="en-US" sz="3600" dirty="0"/>
+              <a:t>Recommended next steps</a:t>
+            </a:r>
+          </a:p>
+          <a:p>
+            <a:r>
+              <a:rPr lang="en-US" sz="3600" dirty="0"/>
+              <a:t>Dataset analyzed</a:t>
+            </a:r>
+          </a:p>
+          <a:p>
+            <a:endParaRPr lang="en-US" sz="3600" dirty="0"/>
+          </a:p>
+        </p:txBody>
+      </p:sp>
+    </p:spTree>
+    <p:extLst>
+      <p:ext uri="{BB962C8B-B14F-4D97-AF65-F5344CB8AC3E}">
+        <p14:creationId xmlns:p14="http://schemas.microsoft.com/office/powerpoint/2010/main" val="2709021471"/>
+      </p:ext>
+    </p:extLst>
+  </p:cSld>
+  <p:clrMapOvr>
+    <a:masterClrMapping/>
+  </p:clrMapOvr>
+</p:sld>
+</file>
+
+<file path=ppt/slides/slide22.xml><?xml version="1.0" encoding="utf-8"?>
+<p:sld xmlns:a="http://schemas.openxmlformats.org/drawingml/2006/main" xmlns:r="http://schemas.openxmlformats.org/officeDocument/2006/relationships" xmlns:p="http://schemas.openxmlformats.org/presentationml/2006/main">
+  <p:cSld>
+    <p:bg>
+      <p:bgPr>
+        <a:gradFill>
+          <a:gsLst>
+            <a:gs pos="0">
+              <a:schemeClr val="accent1">
+                <a:lumMod val="5000"/>
+                <a:lumOff val="95000"/>
+              </a:schemeClr>
+            </a:gs>
+            <a:gs pos="74000">
+              <a:schemeClr val="accent1">
+                <a:lumMod val="45000"/>
+                <a:lumOff val="55000"/>
+              </a:schemeClr>
+            </a:gs>
+            <a:gs pos="83000">
+              <a:schemeClr val="accent1">
+                <a:lumMod val="45000"/>
+                <a:lumOff val="55000"/>
+              </a:schemeClr>
+            </a:gs>
+            <a:gs pos="100000">
+              <a:schemeClr val="accent1">
+                <a:lumMod val="30000"/>
+                <a:lumOff val="70000"/>
+              </a:schemeClr>
+            </a:gs>
+          </a:gsLst>
+          <a:lin ang="5400000" scaled="1"/>
+        </a:gradFill>
+        <a:effectLst/>
+      </p:bgPr>
+    </p:bg>
+    <p:spTree>
+      <p:nvGrpSpPr>
+        <p:cNvPr id="1" name=""/>
+        <p:cNvGrpSpPr/>
+        <p:nvPr/>
+      </p:nvGrpSpPr>
+      <p:grpSpPr>
+        <a:xfrm>
+          <a:off x="0" y="0"/>
+          <a:ext cx="0" cy="0"/>
+          <a:chOff x="0" y="0"/>
+          <a:chExt cx="0" cy="0"/>
+        </a:xfrm>
+      </p:grpSpPr>
+      <p:pic>
+        <p:nvPicPr>
+          <p:cNvPr id="1032" name="Picture 8">
+            <a:extLst>
+              <a:ext uri="{FF2B5EF4-FFF2-40B4-BE49-F238E27FC236}">
+                <a16:creationId xmlns:a16="http://schemas.microsoft.com/office/drawing/2014/main" id="{9FFA23C5-E485-4455-B723-10A35DFEF99D}"/>
+              </a:ext>
+            </a:extLst>
+          </p:cNvPr>
+          <p:cNvPicPr>
+            <a:picLocks noChangeAspect="1" noChangeArrowheads="1"/>
+          </p:cNvPicPr>
+          <p:nvPr/>
+        </p:nvPicPr>
+        <p:blipFill>
+          <a:blip r:embed="rId2">
+            <a:extLst>
+              <a:ext uri="{28A0092B-C50C-407E-A947-70E740481C1C}">
+                <a14:useLocalDpi xmlns:a14="http://schemas.microsoft.com/office/drawing/2010/main" val="0"/>
+              </a:ext>
+            </a:extLst>
+          </a:blip>
+          <a:srcRect/>
+          <a:stretch/>
+        </p:blipFill>
+        <p:spPr bwMode="auto">
+          <a:xfrm>
+            <a:off x="-1" y="-6979"/>
+            <a:ext cx="12192000" cy="8128000"/>
+          </a:xfrm>
+          <a:prstGeom prst="rect">
+            <a:avLst/>
+          </a:prstGeom>
+          <a:noFill/>
+          <a:extLst>
+            <a:ext uri="{909E8E84-426E-40DD-AFC4-6F175D3DCCD1}">
+              <a14:hiddenFill xmlns:a14="http://schemas.microsoft.com/office/drawing/2010/main">
+                <a:solidFill>
+                  <a:srgbClr val="FFFFFF"/>
+                </a:solidFill>
+              </a14:hiddenFill>
+            </a:ext>
+          </a:extLst>
+        </p:spPr>
+      </p:pic>
+      <p:sp>
+        <p:nvSpPr>
+          <p:cNvPr id="4" name="TextBox 3">
+            <a:extLst>
+              <a:ext uri="{FF2B5EF4-FFF2-40B4-BE49-F238E27FC236}">
+                <a16:creationId xmlns:a16="http://schemas.microsoft.com/office/drawing/2014/main" id="{D1F6733C-C17D-447A-89A4-F24644F21664}"/>
+              </a:ext>
+            </a:extLst>
+          </p:cNvPr>
+          <p:cNvSpPr txBox="1"/>
+          <p:nvPr/>
+        </p:nvSpPr>
+        <p:spPr>
+          <a:xfrm>
+            <a:off x="-1" y="6183078"/>
+            <a:ext cx="5451231" cy="677108"/>
+          </a:xfrm>
+          <a:prstGeom prst="rect">
+            <a:avLst/>
+          </a:prstGeom>
+          <a:noFill/>
+        </p:spPr>
+        <p:txBody>
+          <a:bodyPr wrap="square" rtlCol="0">
+            <a:spAutoFit/>
+          </a:bodyPr>
+          <a:lstStyle/>
+          <a:p>
+            <a:r>
+              <a:rPr lang="en-US" sz="2400" dirty="0">
+                <a:solidFill>
+                  <a:schemeClr val="bg1"/>
+                </a:solidFill>
+              </a:rPr>
+              <a:t>Open floor for questions &amp; observations</a:t>
+            </a:r>
+            <a:endParaRPr lang="en-US" sz="1400" dirty="0">
+              <a:solidFill>
+                <a:schemeClr val="bg1"/>
+              </a:solidFill>
+            </a:endParaRPr>
+          </a:p>
+          <a:p>
+            <a:r>
+              <a:rPr lang="en-US" sz="1400" dirty="0">
+                <a:solidFill>
+                  <a:schemeClr val="bg1"/>
+                </a:solidFill>
+              </a:rPr>
+              <a:t>Photo by </a:t>
+            </a:r>
+            <a:r>
+              <a:rPr lang="en-US" sz="1400" dirty="0">
+                <a:solidFill>
+                  <a:srgbClr val="0563C1"/>
+                </a:solidFill>
+                <a:hlinkClick r:id="rId3">
+                  <a:extLst>
+                    <a:ext uri="{A12FA001-AC4F-418D-AE19-62706E023703}">
+                      <ahyp:hlinkClr xmlns:ahyp="http://schemas.microsoft.com/office/drawing/2018/hyperlinkcolor" val="tx"/>
+                    </a:ext>
+                  </a:extLst>
+                </a:hlinkClick>
+              </a:rPr>
+              <a:t>Nguyen Dang Hoang </a:t>
+            </a:r>
+            <a:r>
+              <a:rPr lang="en-US" sz="1400" dirty="0">
+                <a:solidFill>
+                  <a:schemeClr val="bg1"/>
+                </a:solidFill>
+                <a:hlinkClick r:id="rId3">
+                  <a:extLst>
+                    <a:ext uri="{A12FA001-AC4F-418D-AE19-62706E023703}">
+                      <ahyp:hlinkClr xmlns:ahyp="http://schemas.microsoft.com/office/drawing/2018/hyperlinkcolor" val="tx"/>
+                    </a:ext>
+                  </a:extLst>
+                </a:hlinkClick>
+              </a:rPr>
+              <a:t>Nhu</a:t>
+            </a:r>
+            <a:r>
+              <a:rPr lang="en-US" sz="1400" dirty="0">
+                <a:solidFill>
+                  <a:schemeClr val="bg1"/>
+                </a:solidFill>
+              </a:rPr>
+              <a:t> on </a:t>
+            </a:r>
+            <a:r>
+              <a:rPr lang="en-US" sz="1400" dirty="0">
+                <a:solidFill>
+                  <a:schemeClr val="bg1"/>
+                </a:solidFill>
+                <a:hlinkClick r:id="rId4">
+                  <a:extLst>
+                    <a:ext uri="{A12FA001-AC4F-418D-AE19-62706E023703}">
+                      <ahyp:hlinkClr xmlns:ahyp="http://schemas.microsoft.com/office/drawing/2018/hyperlinkcolor" val="tx"/>
+                    </a:ext>
+                  </a:extLst>
+                </a:hlinkClick>
+              </a:rPr>
+              <a:t>Unsplash</a:t>
+            </a:r>
+            <a:r>
+              <a:rPr lang="en-US" sz="1400" dirty="0">
+                <a:solidFill>
+                  <a:schemeClr val="bg1"/>
+                </a:solidFill>
+              </a:rPr>
+              <a:t> </a:t>
+            </a:r>
+            <a:endParaRPr lang="en-US" sz="1400" dirty="0">
+              <a:solidFill>
+                <a:schemeClr val="bg1"/>
+              </a:solidFill>
+              <a:latin typeface="Red Hat Display"/>
+            </a:endParaRPr>
+          </a:p>
+        </p:txBody>
+      </p:sp>
+    </p:spTree>
+    <p:extLst>
+      <p:ext uri="{BB962C8B-B14F-4D97-AF65-F5344CB8AC3E}">
+        <p14:creationId xmlns:p14="http://schemas.microsoft.com/office/powerpoint/2010/main" val="3997987521"/>
+      </p:ext>
+    </p:extLst>
+  </p:cSld>
+  <p:clrMapOvr>
+    <a:masterClrMapping/>
+  </p:clrMapOvr>
+</p:sld>
+</file>
+
+<file path=ppt/slides/slide23.xml><?xml version="1.0" encoding="utf-8"?>
+<p:sld xmlns:a="http://schemas.openxmlformats.org/drawingml/2006/main" xmlns:r="http://schemas.openxmlformats.org/officeDocument/2006/relationships" xmlns:p="http://schemas.openxmlformats.org/presentationml/2006/main">
+  <p:cSld>
+    <p:spTree>
+      <p:nvGrpSpPr>
+        <p:cNvPr id="1" name=""/>
+        <p:cNvGrpSpPr/>
+        <p:nvPr/>
+      </p:nvGrpSpPr>
+      <p:grpSpPr>
+        <a:xfrm>
+          <a:off x="0" y="0"/>
+          <a:ext cx="0" cy="0"/>
+          <a:chOff x="0" y="0"/>
+          <a:chExt cx="0" cy="0"/>
+        </a:xfrm>
+      </p:grpSpPr>
+      <p:sp>
+        <p:nvSpPr>
+          <p:cNvPr id="2" name="Title 1">
+            <a:extLst>
+              <a:ext uri="{FF2B5EF4-FFF2-40B4-BE49-F238E27FC236}">
+                <a16:creationId xmlns:a16="http://schemas.microsoft.com/office/drawing/2014/main" id="{1A073648-C590-4552-B61B-849C75E9DBB4}"/>
+              </a:ext>
+            </a:extLst>
+          </p:cNvPr>
+          <p:cNvSpPr>
+            <a:spLocks noGrp="1"/>
+          </p:cNvSpPr>
+          <p:nvPr>
+            <p:ph type="title"/>
+          </p:nvPr>
+        </p:nvSpPr>
+        <p:spPr/>
+        <p:txBody>
+          <a:bodyPr/>
+          <a:lstStyle/>
+          <a:p>
+            <a:r>
+              <a:rPr lang="en-US" dirty="0"/>
+              <a:t>Individual school details</a:t>
+            </a:r>
+          </a:p>
+        </p:txBody>
+      </p:sp>
+      <p:pic>
+        <p:nvPicPr>
+          <p:cNvPr id="1026" name="Picture 2">
+            <a:extLst>
+              <a:ext uri="{FF2B5EF4-FFF2-40B4-BE49-F238E27FC236}">
+                <a16:creationId xmlns:a16="http://schemas.microsoft.com/office/drawing/2014/main" id="{C75D2C44-FA81-4078-94A1-93F8D6537BA5}"/>
+              </a:ext>
+            </a:extLst>
+          </p:cNvPr>
+          <p:cNvPicPr>
+            <a:picLocks noGrp="1" noChangeAspect="1" noChangeArrowheads="1"/>
+          </p:cNvPicPr>
+          <p:nvPr>
+            <p:ph idx="1"/>
+          </p:nvPr>
+        </p:nvPicPr>
+        <p:blipFill>
+          <a:blip r:embed="rId2">
+            <a:extLst>
+              <a:ext uri="{28A0092B-C50C-407E-A947-70E740481C1C}">
+                <a14:useLocalDpi xmlns:a14="http://schemas.microsoft.com/office/drawing/2010/main" val="0"/>
+              </a:ext>
+            </a:extLst>
+          </a:blip>
+          <a:srcRect/>
+          <a:stretch>
+            <a:fillRect/>
+          </a:stretch>
+        </p:blipFill>
+        <p:spPr bwMode="auto">
+          <a:xfrm>
+            <a:off x="838201" y="1326956"/>
+            <a:ext cx="9053146" cy="5277977"/>
+          </a:xfrm>
+          <a:prstGeom prst="rect">
+            <a:avLst/>
+          </a:prstGeom>
+          <a:noFill/>
+          <a:extLst>
+            <a:ext uri="{909E8E84-426E-40DD-AFC4-6F175D3DCCD1}">
+              <a14:hiddenFill xmlns:a14="http://schemas.microsoft.com/office/drawing/2010/main">
+                <a:solidFill>
+                  <a:srgbClr val="FFFFFF"/>
+                </a:solidFill>
+              </a14:hiddenFill>
+            </a:ext>
+          </a:extLst>
+        </p:spPr>
+      </p:pic>
+    </p:spTree>
+    <p:extLst>
+      <p:ext uri="{BB962C8B-B14F-4D97-AF65-F5344CB8AC3E}">
+        <p14:creationId xmlns:p14="http://schemas.microsoft.com/office/powerpoint/2010/main" val="699166613"/>
+      </p:ext>
+    </p:extLst>
+  </p:cSld>
+  <p:clrMapOvr>
+    <a:masterClrMapping/>
+  </p:clrMapOvr>
+</p:sld>
+</file>
+
+<file path=ppt/slides/slide24.xml><?xml version="1.0" encoding="utf-8"?>
+<p:sld xmlns:a="http://schemas.openxmlformats.org/drawingml/2006/main" xmlns:r="http://schemas.openxmlformats.org/officeDocument/2006/relationships" xmlns:p="http://schemas.openxmlformats.org/presentationml/2006/main">
+  <p:cSld>
+    <p:spTree>
+      <p:nvGrpSpPr>
+        <p:cNvPr id="1" name=""/>
+        <p:cNvGrpSpPr/>
+        <p:nvPr/>
+      </p:nvGrpSpPr>
+      <p:grpSpPr>
+        <a:xfrm>
+          <a:off x="0" y="0"/>
+          <a:ext cx="0" cy="0"/>
+          <a:chOff x="0" y="0"/>
+          <a:chExt cx="0" cy="0"/>
+        </a:xfrm>
+      </p:grpSpPr>
+      <p:sp>
+        <p:nvSpPr>
+          <p:cNvPr id="2" name="Title 1">
+            <a:extLst>
+              <a:ext uri="{FF2B5EF4-FFF2-40B4-BE49-F238E27FC236}">
+                <a16:creationId xmlns:a16="http://schemas.microsoft.com/office/drawing/2014/main" id="{E071530C-0183-4055-AB85-F96E4340F23C}"/>
+              </a:ext>
+            </a:extLst>
+          </p:cNvPr>
+          <p:cNvSpPr>
+            <a:spLocks noGrp="1"/>
+          </p:cNvSpPr>
+          <p:nvPr>
+            <p:ph type="title"/>
+          </p:nvPr>
+        </p:nvSpPr>
+        <p:spPr/>
+        <p:txBody>
+          <a:bodyPr/>
+          <a:lstStyle/>
+          <a:p>
+            <a:r>
+              <a:rPr lang="en-US" dirty="0"/>
+              <a:t>Top schools (overall % passing)</a:t>
+            </a:r>
+          </a:p>
+        </p:txBody>
+      </p:sp>
+      <p:pic>
+        <p:nvPicPr>
+          <p:cNvPr id="2050" name="Picture 2">
+            <a:extLst>
+              <a:ext uri="{FF2B5EF4-FFF2-40B4-BE49-F238E27FC236}">
+                <a16:creationId xmlns:a16="http://schemas.microsoft.com/office/drawing/2014/main" id="{AC882C3F-B2D2-481D-8EBE-87FA63C058A6}"/>
+              </a:ext>
+            </a:extLst>
+          </p:cNvPr>
+          <p:cNvPicPr>
+            <a:picLocks noGrp="1" noChangeAspect="1" noChangeArrowheads="1"/>
+          </p:cNvPicPr>
+          <p:nvPr>
+            <p:ph idx="1"/>
+          </p:nvPr>
+        </p:nvPicPr>
+        <p:blipFill>
+          <a:blip r:embed="rId2">
+            <a:extLst>
+              <a:ext uri="{28A0092B-C50C-407E-A947-70E740481C1C}">
+                <a14:useLocalDpi xmlns:a14="http://schemas.microsoft.com/office/drawing/2010/main" val="0"/>
+              </a:ext>
+            </a:extLst>
+          </a:blip>
+          <a:srcRect/>
+          <a:stretch>
+            <a:fillRect/>
+          </a:stretch>
+        </p:blipFill>
+        <p:spPr bwMode="auto">
+          <a:xfrm>
+            <a:off x="838201" y="2668925"/>
+            <a:ext cx="10009282" cy="2536434"/>
+          </a:xfrm>
+          <a:prstGeom prst="rect">
+            <a:avLst/>
+          </a:prstGeom>
+          <a:noFill/>
+          <a:extLst>
+            <a:ext uri="{909E8E84-426E-40DD-AFC4-6F175D3DCCD1}">
+              <a14:hiddenFill xmlns:a14="http://schemas.microsoft.com/office/drawing/2010/main">
+                <a:solidFill>
+                  <a:srgbClr val="FFFFFF"/>
+                </a:solidFill>
+              </a14:hiddenFill>
+            </a:ext>
+          </a:extLst>
+        </p:spPr>
+      </p:pic>
+    </p:spTree>
+    <p:extLst>
+      <p:ext uri="{BB962C8B-B14F-4D97-AF65-F5344CB8AC3E}">
+        <p14:creationId xmlns:p14="http://schemas.microsoft.com/office/powerpoint/2010/main" val="542399680"/>
+      </p:ext>
+    </p:extLst>
+  </p:cSld>
+  <p:clrMapOvr>
+    <a:masterClrMapping/>
+  </p:clrMapOvr>
+</p:sld>
+</file>
+
+<file path=ppt/slides/slide25.xml><?xml version="1.0" encoding="utf-8"?>
+<p:sld xmlns:a="http://schemas.openxmlformats.org/drawingml/2006/main" xmlns:r="http://schemas.openxmlformats.org/officeDocument/2006/relationships" xmlns:p="http://schemas.openxmlformats.org/presentationml/2006/main">
+  <p:cSld>
+    <p:spTree>
+      <p:nvGrpSpPr>
+        <p:cNvPr id="1" name=""/>
+        <p:cNvGrpSpPr/>
+        <p:nvPr/>
+      </p:nvGrpSpPr>
+      <p:grpSpPr>
+        <a:xfrm>
+          <a:off x="0" y="0"/>
+          <a:ext cx="0" cy="0"/>
+          <a:chOff x="0" y="0"/>
+          <a:chExt cx="0" cy="0"/>
+        </a:xfrm>
+      </p:grpSpPr>
+      <p:sp>
+        <p:nvSpPr>
+          <p:cNvPr id="2" name="Title 1">
+            <a:extLst>
+              <a:ext uri="{FF2B5EF4-FFF2-40B4-BE49-F238E27FC236}">
+                <a16:creationId xmlns:a16="http://schemas.microsoft.com/office/drawing/2014/main" id="{16C92517-3414-4307-9C3A-185183513362}"/>
+              </a:ext>
+            </a:extLst>
+          </p:cNvPr>
+          <p:cNvSpPr>
+            <a:spLocks noGrp="1"/>
+          </p:cNvSpPr>
+          <p:nvPr>
+            <p:ph type="title"/>
+          </p:nvPr>
+        </p:nvSpPr>
+        <p:spPr/>
+        <p:txBody>
+          <a:bodyPr/>
+          <a:lstStyle/>
+          <a:p>
+            <a:r>
+              <a:rPr lang="en-US" dirty="0"/>
+              <a:t>Math scores by grade</a:t>
+            </a:r>
+          </a:p>
+        </p:txBody>
+      </p:sp>
+      <p:pic>
+        <p:nvPicPr>
+          <p:cNvPr id="3074" name="Picture 2" descr="Math_scores_by_grade_original">
+            <a:extLst>
+              <a:ext uri="{FF2B5EF4-FFF2-40B4-BE49-F238E27FC236}">
+                <a16:creationId xmlns:a16="http://schemas.microsoft.com/office/drawing/2014/main" id="{B1B0B1CB-4BDD-4FAE-8AEC-DA077521B239}"/>
+              </a:ext>
+            </a:extLst>
+          </p:cNvPr>
+          <p:cNvPicPr>
+            <a:picLocks noGrp="1" noChangeAspect="1" noChangeArrowheads="1"/>
+          </p:cNvPicPr>
+          <p:nvPr>
+            <p:ph idx="1"/>
+          </p:nvPr>
+        </p:nvPicPr>
+        <p:blipFill>
+          <a:blip r:embed="rId2">
+            <a:extLst>
+              <a:ext uri="{28A0092B-C50C-407E-A947-70E740481C1C}">
+                <a14:useLocalDpi xmlns:a14="http://schemas.microsoft.com/office/drawing/2010/main" val="0"/>
+              </a:ext>
+            </a:extLst>
+          </a:blip>
+          <a:srcRect/>
+          <a:stretch>
+            <a:fillRect/>
+          </a:stretch>
+        </p:blipFill>
+        <p:spPr bwMode="auto">
+          <a:xfrm>
+            <a:off x="838200" y="1690688"/>
+            <a:ext cx="3672254" cy="4769397"/>
+          </a:xfrm>
+          <a:prstGeom prst="rect">
+            <a:avLst/>
+          </a:prstGeom>
+          <a:noFill/>
+          <a:extLst>
+            <a:ext uri="{909E8E84-426E-40DD-AFC4-6F175D3DCCD1}">
+              <a14:hiddenFill xmlns:a14="http://schemas.microsoft.com/office/drawing/2010/main">
+                <a:solidFill>
+                  <a:srgbClr val="FFFFFF"/>
+                </a:solidFill>
+              </a14:hiddenFill>
+            </a:ext>
+          </a:extLst>
+        </p:spPr>
+      </p:pic>
+    </p:spTree>
+    <p:extLst>
+      <p:ext uri="{BB962C8B-B14F-4D97-AF65-F5344CB8AC3E}">
+        <p14:creationId xmlns:p14="http://schemas.microsoft.com/office/powerpoint/2010/main" val="3930131329"/>
+      </p:ext>
+    </p:extLst>
+  </p:cSld>
+  <p:clrMapOvr>
+    <a:masterClrMapping/>
+  </p:clrMapOvr>
+</p:sld>
+</file>
+
+<file path=ppt/slides/slide26.xml><?xml version="1.0" encoding="utf-8"?>
+<p:sld xmlns:a="http://schemas.openxmlformats.org/drawingml/2006/main" xmlns:r="http://schemas.openxmlformats.org/officeDocument/2006/relationships" xmlns:p="http://schemas.openxmlformats.org/presentationml/2006/main">
+  <p:cSld>
+    <p:spTree>
+      <p:nvGrpSpPr>
+        <p:cNvPr id="1" name=""/>
+        <p:cNvGrpSpPr/>
+        <p:nvPr/>
+      </p:nvGrpSpPr>
+      <p:grpSpPr>
+        <a:xfrm>
+          <a:off x="0" y="0"/>
+          <a:ext cx="0" cy="0"/>
+          <a:chOff x="0" y="0"/>
+          <a:chExt cx="0" cy="0"/>
+        </a:xfrm>
+      </p:grpSpPr>
+      <p:sp>
+        <p:nvSpPr>
+          <p:cNvPr id="2" name="Title 1">
+            <a:extLst>
+              <a:ext uri="{FF2B5EF4-FFF2-40B4-BE49-F238E27FC236}">
+                <a16:creationId xmlns:a16="http://schemas.microsoft.com/office/drawing/2014/main" id="{16C92517-3414-4307-9C3A-185183513362}"/>
+              </a:ext>
+            </a:extLst>
+          </p:cNvPr>
+          <p:cNvSpPr>
+            <a:spLocks noGrp="1"/>
+          </p:cNvSpPr>
+          <p:nvPr>
+            <p:ph type="title"/>
+          </p:nvPr>
+        </p:nvSpPr>
+        <p:spPr/>
+        <p:txBody>
+          <a:bodyPr/>
+          <a:lstStyle/>
+          <a:p>
+            <a:r>
+              <a:rPr lang="en-US" dirty="0"/>
+              <a:t>Reading scores by grade</a:t>
+            </a:r>
+          </a:p>
+        </p:txBody>
+      </p:sp>
+      <p:pic>
+        <p:nvPicPr>
+          <p:cNvPr id="4098" name="Picture 2">
+            <a:extLst>
+              <a:ext uri="{FF2B5EF4-FFF2-40B4-BE49-F238E27FC236}">
+                <a16:creationId xmlns:a16="http://schemas.microsoft.com/office/drawing/2014/main" id="{BFB28B0A-98F0-4D35-AC56-9ED98186F776}"/>
+              </a:ext>
+            </a:extLst>
+          </p:cNvPr>
+          <p:cNvPicPr>
+            <a:picLocks noGrp="1" noChangeAspect="1" noChangeArrowheads="1"/>
+          </p:cNvPicPr>
+          <p:nvPr>
+            <p:ph idx="1"/>
+          </p:nvPr>
+        </p:nvPicPr>
+        <p:blipFill>
+          <a:blip r:embed="rId2">
+            <a:extLst>
+              <a:ext uri="{28A0092B-C50C-407E-A947-70E740481C1C}">
+                <a14:useLocalDpi xmlns:a14="http://schemas.microsoft.com/office/drawing/2010/main" val="0"/>
+              </a:ext>
+            </a:extLst>
+          </a:blip>
+          <a:srcRect/>
+          <a:stretch>
+            <a:fillRect/>
+          </a:stretch>
+        </p:blipFill>
+        <p:spPr bwMode="auto">
+          <a:xfrm>
+            <a:off x="838200" y="1690687"/>
+            <a:ext cx="3584331" cy="4810061"/>
+          </a:xfrm>
+          <a:prstGeom prst="rect">
+            <a:avLst/>
+          </a:prstGeom>
+          <a:noFill/>
+          <a:extLst>
+            <a:ext uri="{909E8E84-426E-40DD-AFC4-6F175D3DCCD1}">
+              <a14:hiddenFill xmlns:a14="http://schemas.microsoft.com/office/drawing/2010/main">
+                <a:solidFill>
+                  <a:srgbClr val="FFFFFF"/>
+                </a:solidFill>
+              </a14:hiddenFill>
+            </a:ext>
+          </a:extLst>
+        </p:spPr>
+      </p:pic>
+    </p:spTree>
+    <p:extLst>
+      <p:ext uri="{BB962C8B-B14F-4D97-AF65-F5344CB8AC3E}">
+        <p14:creationId xmlns:p14="http://schemas.microsoft.com/office/powerpoint/2010/main" val="3294897902"/>
+      </p:ext>
+    </p:extLst>
+  </p:cSld>
+  <p:clrMapOvr>
+    <a:masterClrMapping/>
+  </p:clrMapOvr>
+</p:sld>
+</file>
+
+<file path=ppt/slides/slide3.xml><?xml version="1.0" encoding="utf-8"?>
+<p:sld xmlns:a="http://schemas.openxmlformats.org/drawingml/2006/main" xmlns:r="http://schemas.openxmlformats.org/officeDocument/2006/relationships" xmlns:p="http://schemas.openxmlformats.org/presentationml/2006/main">
+  <p:cSld>
+    <p:spTree>
+      <p:nvGrpSpPr>
+        <p:cNvPr id="1" name=""/>
+        <p:cNvGrpSpPr/>
+        <p:nvPr/>
+      </p:nvGrpSpPr>
+      <p:grpSpPr>
+        <a:xfrm>
+          <a:off x="0" y="0"/>
+          <a:ext cx="0" cy="0"/>
+          <a:chOff x="0" y="0"/>
+          <a:chExt cx="0" cy="0"/>
+        </a:xfrm>
+      </p:grpSpPr>
+      <p:sp>
+        <p:nvSpPr>
+          <p:cNvPr id="2" name="Title 1">
+            <a:extLst>
+              <a:ext uri="{FF2B5EF4-FFF2-40B4-BE49-F238E27FC236}">
                 <a16:creationId xmlns:a16="http://schemas.microsoft.com/office/drawing/2014/main" id="{5E97A834-2A44-4D6C-85AF-1976E35E2E86}"/>
               </a:ext>
             </a:extLst>
@@ -3992,7 +6609,7 @@
             <p:ph idx="1"/>
             <p:extLst>
               <p:ext uri="{D42A27DB-BD31-4B8C-83A1-F6EECF244321}">
-                <p14:modId xmlns:p14="http://schemas.microsoft.com/office/powerpoint/2010/main" val="845442918"/>
+                <p14:modId xmlns:p14="http://schemas.microsoft.com/office/powerpoint/2010/main" val="784020468"/>
               </p:ext>
             </p:extLst>
           </p:nvPr>
@@ -4163,7 +6780,7 @@
                     <a:p>
                       <a:r>
                         <a:rPr lang="en-US" dirty="0"/>
-                        <a:t>Mean math score</a:t>
+                        <a:t>Average math score</a:t>
                       </a:r>
                     </a:p>
                   </a:txBody>
@@ -4196,7 +6813,7 @@
                     <a:p>
                       <a:r>
                         <a:rPr lang="en-US" dirty="0"/>
-                        <a:t>Mean reading score</a:t>
+                        <a:t>Average reading score</a:t>
                       </a:r>
                     </a:p>
                   </a:txBody>
@@ -4308,7 +6925,7 @@
                     <a:p>
                       <a:r>
                         <a:rPr lang="en-US" dirty="0"/>
-                        <a:t>62.2%</a:t>
+                        <a:t>65.2%</a:t>
                       </a:r>
                     </a:p>
                   </a:txBody>
@@ -4337,9 +6954,44 @@
 </p:sld>
 </file>
 
-<file path=ppt/slides/slide5.xml><?xml version="1.0" encoding="utf-8"?>
+<file path=ppt/slides/slide4.xml><?xml version="1.0" encoding="utf-8"?>
 <p:sld xmlns:a="http://schemas.openxmlformats.org/drawingml/2006/main" xmlns:r="http://schemas.openxmlformats.org/officeDocument/2006/relationships" xmlns:p="http://schemas.openxmlformats.org/presentationml/2006/main">
   <p:cSld>
+    <p:bg>
+      <p:bgPr>
+        <a:gradFill flip="none" rotWithShape="1">
+          <a:gsLst>
+            <a:gs pos="0">
+              <a:schemeClr val="accent1">
+                <a:lumMod val="5000"/>
+                <a:lumOff val="95000"/>
+              </a:schemeClr>
+            </a:gs>
+            <a:gs pos="74000">
+              <a:schemeClr val="accent1">
+                <a:lumMod val="45000"/>
+                <a:lumOff val="55000"/>
+              </a:schemeClr>
+            </a:gs>
+            <a:gs pos="83000">
+              <a:schemeClr val="accent1">
+                <a:lumMod val="45000"/>
+                <a:lumOff val="55000"/>
+              </a:schemeClr>
+            </a:gs>
+            <a:gs pos="100000">
+              <a:schemeClr val="accent1">
+                <a:lumMod val="30000"/>
+                <a:lumOff val="70000"/>
+              </a:schemeClr>
+            </a:gs>
+          </a:gsLst>
+          <a:lin ang="5400000" scaled="1"/>
+          <a:tileRect/>
+        </a:gradFill>
+        <a:effectLst/>
+      </p:bgPr>
+    </p:bg>
     <p:spTree>
       <p:nvGrpSpPr>
         <p:cNvPr id="1" name=""/>
@@ -4359,7 +7011,7 @@
           <p:cNvPr id="2" name="Title 1">
             <a:extLst>
               <a:ext uri="{FF2B5EF4-FFF2-40B4-BE49-F238E27FC236}">
-                <a16:creationId xmlns:a16="http://schemas.microsoft.com/office/drawing/2014/main" id="{5E97A834-2A44-4D6C-85AF-1976E35E2E86}"/>
+                <a16:creationId xmlns:a16="http://schemas.microsoft.com/office/drawing/2014/main" id="{3EFB1119-6DAB-476F-9541-ABA9503B44FF}"/>
               </a:ext>
             </a:extLst>
           </p:cNvPr>
@@ -4377,17 +7029,17 @@
           <a:p>
             <a:r>
               <a:rPr lang="en-US" dirty="0"/>
-              <a:t>Key finding</a:t>
-            </a:r>
-          </a:p>
-        </p:txBody>
-      </p:sp>
-      <p:sp>
-        <p:nvSpPr>
-          <p:cNvPr id="4" name="Content Placeholder 3">
-            <a:extLst>
-              <a:ext uri="{FF2B5EF4-FFF2-40B4-BE49-F238E27FC236}">
-                <a16:creationId xmlns:a16="http://schemas.microsoft.com/office/drawing/2014/main" id="{881FAB4C-0B64-4E2E-B96B-7260C9B78EE8}"/>
+              <a:t>Key observations</a:t>
+            </a:r>
+          </a:p>
+        </p:txBody>
+      </p:sp>
+      <p:sp>
+        <p:nvSpPr>
+          <p:cNvPr id="3" name="Content Placeholder 2">
+            <a:extLst>
+              <a:ext uri="{FF2B5EF4-FFF2-40B4-BE49-F238E27FC236}">
+                <a16:creationId xmlns:a16="http://schemas.microsoft.com/office/drawing/2014/main" id="{304380FF-F4C6-46D9-95C8-F4A1742EB433}"/>
               </a:ext>
             </a:extLst>
           </p:cNvPr>
@@ -4406,16 +7058,28 @@
           <a:lstStyle/>
           <a:p>
             <a:r>
-              <a:rPr lang="en-US" sz="4400" dirty="0"/>
-              <a:t>Charter school students outperformed district school students</a:t>
-            </a:r>
+              <a:rPr lang="en-US" sz="3600" dirty="0"/>
+              <a:t>Our charter high schools had consistently higher scores than our traditional high schools</a:t>
+            </a:r>
+          </a:p>
+          <a:p>
+            <a:endParaRPr lang="en-US" sz="3600" dirty="0"/>
+          </a:p>
+          <a:p>
+            <a:r>
+              <a:rPr lang="en-US" sz="3600" dirty="0"/>
+              <a:t>Our charter schools have lower per pupil budgets </a:t>
+            </a:r>
+          </a:p>
+          <a:p>
+            <a:endParaRPr lang="en-US" sz="3600" dirty="0"/>
           </a:p>
         </p:txBody>
       </p:sp>
     </p:spTree>
     <p:extLst>
       <p:ext uri="{BB962C8B-B14F-4D97-AF65-F5344CB8AC3E}">
-        <p14:creationId xmlns:p14="http://schemas.microsoft.com/office/powerpoint/2010/main" val="3002724981"/>
+        <p14:creationId xmlns:p14="http://schemas.microsoft.com/office/powerpoint/2010/main" val="3469309868"/>
       </p:ext>
     </p:extLst>
   </p:cSld>
@@ -4425,9 +7089,44 @@
 </p:sld>
 </file>
 
-<file path=ppt/slides/slide6.xml><?xml version="1.0" encoding="utf-8"?>
+<file path=ppt/slides/slide5.xml><?xml version="1.0" encoding="utf-8"?>
 <p:sld xmlns:a="http://schemas.openxmlformats.org/drawingml/2006/main" xmlns:r="http://schemas.openxmlformats.org/officeDocument/2006/relationships" xmlns:p="http://schemas.openxmlformats.org/presentationml/2006/main">
   <p:cSld>
+    <p:bg>
+      <p:bgPr>
+        <a:gradFill flip="none" rotWithShape="1">
+          <a:gsLst>
+            <a:gs pos="0">
+              <a:schemeClr val="accent1">
+                <a:lumMod val="5000"/>
+                <a:lumOff val="95000"/>
+              </a:schemeClr>
+            </a:gs>
+            <a:gs pos="74000">
+              <a:schemeClr val="accent1">
+                <a:lumMod val="45000"/>
+                <a:lumOff val="55000"/>
+              </a:schemeClr>
+            </a:gs>
+            <a:gs pos="83000">
+              <a:schemeClr val="accent1">
+                <a:lumMod val="45000"/>
+                <a:lumOff val="55000"/>
+              </a:schemeClr>
+            </a:gs>
+            <a:gs pos="100000">
+              <a:schemeClr val="accent1">
+                <a:lumMod val="30000"/>
+                <a:lumOff val="70000"/>
+              </a:schemeClr>
+            </a:gs>
+          </a:gsLst>
+          <a:lin ang="5400000" scaled="1"/>
+          <a:tileRect/>
+        </a:gradFill>
+        <a:effectLst/>
+      </p:bgPr>
+    </p:bg>
     <p:spTree>
       <p:nvGrpSpPr>
         <p:cNvPr id="1" name=""/>
@@ -4447,7 +7146,7 @@
           <p:cNvPr id="2" name="Title 1">
             <a:extLst>
               <a:ext uri="{FF2B5EF4-FFF2-40B4-BE49-F238E27FC236}">
-                <a16:creationId xmlns:a16="http://schemas.microsoft.com/office/drawing/2014/main" id="{5E97A834-2A44-4D6C-85AF-1976E35E2E86}"/>
+                <a16:creationId xmlns:a16="http://schemas.microsoft.com/office/drawing/2014/main" id="{3EFB1119-6DAB-476F-9541-ABA9503B44FF}"/>
               </a:ext>
             </a:extLst>
           </p:cNvPr>
@@ -4465,26 +7164,386 @@
           <a:p>
             <a:r>
               <a:rPr lang="en-US" dirty="0"/>
-              <a:t>Mean math score by school type and school</a:t>
-            </a:r>
+              <a:t>Success Metrics</a:t>
+            </a:r>
+          </a:p>
+        </p:txBody>
+      </p:sp>
+      <p:sp>
+        <p:nvSpPr>
+          <p:cNvPr id="3" name="Content Placeholder 2">
+            <a:extLst>
+              <a:ext uri="{FF2B5EF4-FFF2-40B4-BE49-F238E27FC236}">
+                <a16:creationId xmlns:a16="http://schemas.microsoft.com/office/drawing/2014/main" id="{304380FF-F4C6-46D9-95C8-F4A1742EB433}"/>
+              </a:ext>
+            </a:extLst>
+          </p:cNvPr>
+          <p:cNvSpPr>
+            <a:spLocks noGrp="1"/>
+          </p:cNvSpPr>
+          <p:nvPr>
+            <p:ph idx="1"/>
+          </p:nvPr>
+        </p:nvSpPr>
+        <p:spPr/>
+        <p:txBody>
+          <a:bodyPr>
+            <a:normAutofit lnSpcReduction="10000"/>
+          </a:bodyPr>
+          <a:lstStyle/>
+          <a:p>
+            <a:r>
+              <a:rPr lang="en-US" sz="3600" dirty="0"/>
+              <a:t>Math</a:t>
+            </a:r>
+          </a:p>
+          <a:p>
+            <a:pPr lvl="1"/>
+            <a:r>
+              <a:rPr lang="en-US" sz="3200" dirty="0"/>
+              <a:t>Average score</a:t>
+            </a:r>
+          </a:p>
+          <a:p>
+            <a:pPr lvl="1">
+              <a:lnSpc>
+                <a:spcPct val="100000"/>
+              </a:lnSpc>
+            </a:pPr>
+            <a:r>
+              <a:rPr lang="en-US" sz="3200" dirty="0"/>
+              <a:t>% passing (≥ 70%)</a:t>
+            </a:r>
+          </a:p>
+          <a:p>
+            <a:r>
+              <a:rPr lang="en-US" sz="3600" dirty="0"/>
+              <a:t>Reading</a:t>
+            </a:r>
+          </a:p>
+          <a:p>
+            <a:pPr lvl="1"/>
+            <a:r>
+              <a:rPr lang="en-US" sz="3200" dirty="0"/>
+              <a:t>Average score</a:t>
+            </a:r>
+          </a:p>
+          <a:p>
+            <a:pPr lvl="1"/>
+            <a:r>
+              <a:rPr lang="en-US" sz="3200" dirty="0"/>
+              <a:t>% passing (≥ 70%)</a:t>
+            </a:r>
+          </a:p>
+          <a:p>
+            <a:r>
+              <a:rPr lang="en-US" sz="3600" dirty="0"/>
+              <a:t>Combined</a:t>
+            </a:r>
+          </a:p>
+          <a:p>
+            <a:pPr lvl="1">
+              <a:lnSpc>
+                <a:spcPct val="100000"/>
+              </a:lnSpc>
+            </a:pPr>
+            <a:r>
+              <a:rPr lang="en-US" sz="3200" dirty="0"/>
+              <a:t>% passing both</a:t>
+            </a:r>
+          </a:p>
+        </p:txBody>
+      </p:sp>
+    </p:spTree>
+    <p:extLst>
+      <p:ext uri="{BB962C8B-B14F-4D97-AF65-F5344CB8AC3E}">
+        <p14:creationId xmlns:p14="http://schemas.microsoft.com/office/powerpoint/2010/main" val="2188416658"/>
+      </p:ext>
+    </p:extLst>
+  </p:cSld>
+  <p:clrMapOvr>
+    <a:masterClrMapping/>
+  </p:clrMapOvr>
+</p:sld>
+</file>
+
+<file path=ppt/slides/slide6.xml><?xml version="1.0" encoding="utf-8"?>
+<p:sld xmlns:a="http://schemas.openxmlformats.org/drawingml/2006/main" xmlns:r="http://schemas.openxmlformats.org/officeDocument/2006/relationships" xmlns:p="http://schemas.openxmlformats.org/presentationml/2006/main">
+  <p:cSld>
+    <p:bg>
+      <p:bgPr>
+        <a:gradFill flip="none" rotWithShape="1">
+          <a:gsLst>
+            <a:gs pos="0">
+              <a:schemeClr val="accent1">
+                <a:lumMod val="5000"/>
+                <a:lumOff val="95000"/>
+              </a:schemeClr>
+            </a:gs>
+            <a:gs pos="74000">
+              <a:schemeClr val="accent1">
+                <a:lumMod val="45000"/>
+                <a:lumOff val="55000"/>
+              </a:schemeClr>
+            </a:gs>
+            <a:gs pos="83000">
+              <a:schemeClr val="accent1">
+                <a:lumMod val="45000"/>
+                <a:lumOff val="55000"/>
+              </a:schemeClr>
+            </a:gs>
+            <a:gs pos="100000">
+              <a:schemeClr val="accent1">
+                <a:lumMod val="30000"/>
+                <a:lumOff val="70000"/>
+              </a:schemeClr>
+            </a:gs>
+          </a:gsLst>
+          <a:lin ang="5400000" scaled="1"/>
+          <a:tileRect/>
+        </a:gradFill>
+        <a:effectLst/>
+      </p:bgPr>
+    </p:bg>
+    <p:spTree>
+      <p:nvGrpSpPr>
+        <p:cNvPr id="1" name=""/>
+        <p:cNvGrpSpPr/>
+        <p:nvPr/>
+      </p:nvGrpSpPr>
+      <p:grpSpPr>
+        <a:xfrm>
+          <a:off x="0" y="0"/>
+          <a:ext cx="0" cy="0"/>
+          <a:chOff x="0" y="0"/>
+          <a:chExt cx="0" cy="0"/>
+        </a:xfrm>
+      </p:grpSpPr>
+      <p:sp>
+        <p:nvSpPr>
+          <p:cNvPr id="2" name="Title 1">
+            <a:extLst>
+              <a:ext uri="{FF2B5EF4-FFF2-40B4-BE49-F238E27FC236}">
+                <a16:creationId xmlns:a16="http://schemas.microsoft.com/office/drawing/2014/main" id="{3EFB1119-6DAB-476F-9541-ABA9503B44FF}"/>
+              </a:ext>
+            </a:extLst>
+          </p:cNvPr>
+          <p:cNvSpPr>
+            <a:spLocks noGrp="1"/>
+          </p:cNvSpPr>
+          <p:nvPr>
+            <p:ph type="title"/>
+          </p:nvPr>
+        </p:nvSpPr>
+        <p:spPr/>
+        <p:txBody>
+          <a:bodyPr/>
+          <a:lstStyle/>
+          <a:p>
+            <a:r>
+              <a:rPr lang="en-US" dirty="0"/>
+              <a:t>Success Metrics</a:t>
+            </a:r>
+          </a:p>
+        </p:txBody>
+      </p:sp>
+      <p:sp>
+        <p:nvSpPr>
+          <p:cNvPr id="3" name="Content Placeholder 2">
+            <a:extLst>
+              <a:ext uri="{FF2B5EF4-FFF2-40B4-BE49-F238E27FC236}">
+                <a16:creationId xmlns:a16="http://schemas.microsoft.com/office/drawing/2014/main" id="{304380FF-F4C6-46D9-95C8-F4A1742EB433}"/>
+              </a:ext>
+            </a:extLst>
+          </p:cNvPr>
+          <p:cNvSpPr>
+            <a:spLocks noGrp="1"/>
+          </p:cNvSpPr>
+          <p:nvPr>
+            <p:ph idx="1"/>
+          </p:nvPr>
+        </p:nvSpPr>
+        <p:spPr/>
+        <p:txBody>
+          <a:bodyPr>
+            <a:normAutofit/>
+          </a:bodyPr>
+          <a:lstStyle/>
+          <a:p>
+            <a:r>
+              <a:rPr lang="en-US" sz="3600" dirty="0"/>
+              <a:t>Performance by </a:t>
+            </a:r>
+          </a:p>
+          <a:p>
+            <a:pPr lvl="1"/>
+            <a:r>
+              <a:rPr lang="en-US" sz="3200" dirty="0"/>
+              <a:t>type</a:t>
+            </a:r>
+            <a:endParaRPr lang="en-US" sz="2800" dirty="0"/>
+          </a:p>
+          <a:p>
+            <a:pPr lvl="1"/>
+            <a:r>
+              <a:rPr lang="en-US" sz="3200" dirty="0"/>
+              <a:t>spending</a:t>
+            </a:r>
+          </a:p>
+          <a:p>
+            <a:pPr lvl="1"/>
+            <a:r>
+              <a:rPr lang="en-US" sz="3200" dirty="0"/>
+              <a:t>size</a:t>
+            </a:r>
+          </a:p>
+          <a:p>
+            <a:r>
+              <a:rPr lang="en-US" sz="3600" dirty="0"/>
+              <a:t>Additional details in Appendix</a:t>
+            </a:r>
+          </a:p>
+        </p:txBody>
+      </p:sp>
+    </p:spTree>
+    <p:extLst>
+      <p:ext uri="{BB962C8B-B14F-4D97-AF65-F5344CB8AC3E}">
+        <p14:creationId xmlns:p14="http://schemas.microsoft.com/office/powerpoint/2010/main" val="508702524"/>
+      </p:ext>
+    </p:extLst>
+  </p:cSld>
+  <p:clrMapOvr>
+    <a:masterClrMapping/>
+  </p:clrMapOvr>
+</p:sld>
+</file>
+
+<file path=ppt/slides/slide7.xml><?xml version="1.0" encoding="utf-8"?>
+<p:sld xmlns:a="http://schemas.openxmlformats.org/drawingml/2006/main" xmlns:r="http://schemas.openxmlformats.org/officeDocument/2006/relationships" xmlns:p="http://schemas.openxmlformats.org/presentationml/2006/main">
+  <p:cSld>
+    <p:bg>
+      <p:bgPr>
+        <a:gradFill flip="none" rotWithShape="1">
+          <a:gsLst>
+            <a:gs pos="0">
+              <a:schemeClr val="accent1">
+                <a:lumMod val="5000"/>
+                <a:lumOff val="95000"/>
+              </a:schemeClr>
+            </a:gs>
+            <a:gs pos="74000">
+              <a:schemeClr val="accent1">
+                <a:lumMod val="45000"/>
+                <a:lumOff val="55000"/>
+              </a:schemeClr>
+            </a:gs>
+            <a:gs pos="83000">
+              <a:schemeClr val="accent1">
+                <a:lumMod val="45000"/>
+                <a:lumOff val="55000"/>
+              </a:schemeClr>
+            </a:gs>
+            <a:gs pos="100000">
+              <a:schemeClr val="accent1">
+                <a:lumMod val="30000"/>
+                <a:lumOff val="70000"/>
+              </a:schemeClr>
+            </a:gs>
+          </a:gsLst>
+          <a:lin ang="5400000" scaled="1"/>
+          <a:tileRect/>
+        </a:gradFill>
+        <a:effectLst/>
+      </p:bgPr>
+    </p:bg>
+    <p:spTree>
+      <p:nvGrpSpPr>
+        <p:cNvPr id="1" name=""/>
+        <p:cNvGrpSpPr/>
+        <p:nvPr/>
+      </p:nvGrpSpPr>
+      <p:grpSpPr>
+        <a:xfrm>
+          <a:off x="0" y="0"/>
+          <a:ext cx="0" cy="0"/>
+          <a:chOff x="0" y="0"/>
+          <a:chExt cx="0" cy="0"/>
+        </a:xfrm>
+      </p:grpSpPr>
+      <p:sp>
+        <p:nvSpPr>
+          <p:cNvPr id="2" name="Title 1">
+            <a:extLst>
+              <a:ext uri="{FF2B5EF4-FFF2-40B4-BE49-F238E27FC236}">
+                <a16:creationId xmlns:a16="http://schemas.microsoft.com/office/drawing/2014/main" id="{3EFB1119-6DAB-476F-9541-ABA9503B44FF}"/>
+              </a:ext>
+            </a:extLst>
+          </p:cNvPr>
+          <p:cNvSpPr>
+            <a:spLocks noGrp="1"/>
+          </p:cNvSpPr>
+          <p:nvPr>
+            <p:ph type="title"/>
+          </p:nvPr>
+        </p:nvSpPr>
+        <p:spPr/>
+        <p:txBody>
+          <a:bodyPr/>
+          <a:lstStyle/>
+          <a:p>
+            <a:r>
+              <a:rPr lang="en-US" dirty="0"/>
+              <a:t>District results – average math score 79</a:t>
+            </a:r>
+          </a:p>
+        </p:txBody>
+      </p:sp>
+      <p:sp>
+        <p:nvSpPr>
+          <p:cNvPr id="3" name="Content Placeholder 2">
+            <a:extLst>
+              <a:ext uri="{FF2B5EF4-FFF2-40B4-BE49-F238E27FC236}">
+                <a16:creationId xmlns:a16="http://schemas.microsoft.com/office/drawing/2014/main" id="{304380FF-F4C6-46D9-95C8-F4A1742EB433}"/>
+              </a:ext>
+            </a:extLst>
+          </p:cNvPr>
+          <p:cNvSpPr>
+            <a:spLocks noGrp="1"/>
+          </p:cNvSpPr>
+          <p:nvPr>
+            <p:ph idx="1"/>
+          </p:nvPr>
+        </p:nvSpPr>
+        <p:spPr/>
+        <p:txBody>
+          <a:bodyPr>
+            <a:normAutofit/>
+          </a:bodyPr>
+          <a:lstStyle/>
+          <a:p>
+            <a:r>
+              <a:rPr lang="en-US" sz="3600" dirty="0"/>
+              <a:t>Charter average – 83, Traditional average – 77</a:t>
+            </a:r>
+          </a:p>
+          <a:p>
+            <a:endParaRPr lang="en-US" sz="3600" dirty="0"/>
           </a:p>
         </p:txBody>
       </p:sp>
       <p:pic>
         <p:nvPicPr>
-          <p:cNvPr id="6" name="Content Placeholder 5">
-            <a:extLst>
-              <a:ext uri="{FF2B5EF4-FFF2-40B4-BE49-F238E27FC236}">
-                <a16:creationId xmlns:a16="http://schemas.microsoft.com/office/drawing/2014/main" id="{C3A4E2F6-6CDB-4AEB-80B2-1CB6668AF04C}"/>
+          <p:cNvPr id="5" name="Picture 4">
+            <a:extLst>
+              <a:ext uri="{FF2B5EF4-FFF2-40B4-BE49-F238E27FC236}">
+                <a16:creationId xmlns:a16="http://schemas.microsoft.com/office/drawing/2014/main" id="{3858132F-F7B5-441C-B6BE-8AF1BBA35E5B}"/>
               </a:ext>
             </a:extLst>
           </p:cNvPr>
           <p:cNvPicPr>
-            <a:picLocks noGrp="1" noChangeAspect="1"/>
+            <a:picLocks noChangeAspect="1"/>
           </p:cNvPicPr>
-          <p:nvPr>
-            <p:ph idx="1"/>
-          </p:nvPr>
+          <p:nvPr/>
         </p:nvPicPr>
         <p:blipFill>
           <a:blip r:embed="rId2"/>
@@ -4494,15 +7553,335 @@
         </p:blipFill>
         <p:spPr>
           <a:xfrm>
-            <a:off x="4288874" y="1608993"/>
-            <a:ext cx="3614251" cy="5103996"/>
+            <a:off x="838199" y="2786136"/>
+            <a:ext cx="10515599" cy="3390827"/>
           </a:xfrm>
+          <a:prstGeom prst="rect">
+            <a:avLst/>
+          </a:prstGeom>
         </p:spPr>
       </p:pic>
     </p:spTree>
     <p:extLst>
       <p:ext uri="{BB962C8B-B14F-4D97-AF65-F5344CB8AC3E}">
-        <p14:creationId xmlns:p14="http://schemas.microsoft.com/office/powerpoint/2010/main" val="384190929"/>
+        <p14:creationId xmlns:p14="http://schemas.microsoft.com/office/powerpoint/2010/main" val="55003292"/>
+      </p:ext>
+    </p:extLst>
+  </p:cSld>
+  <p:clrMapOvr>
+    <a:masterClrMapping/>
+  </p:clrMapOvr>
+</p:sld>
+</file>
+
+<file path=ppt/slides/slide8.xml><?xml version="1.0" encoding="utf-8"?>
+<p:sld xmlns:a="http://schemas.openxmlformats.org/drawingml/2006/main" xmlns:r="http://schemas.openxmlformats.org/officeDocument/2006/relationships" xmlns:p="http://schemas.openxmlformats.org/presentationml/2006/main">
+  <p:cSld>
+    <p:bg>
+      <p:bgPr>
+        <a:gradFill flip="none" rotWithShape="1">
+          <a:gsLst>
+            <a:gs pos="0">
+              <a:schemeClr val="accent1">
+                <a:lumMod val="5000"/>
+                <a:lumOff val="95000"/>
+              </a:schemeClr>
+            </a:gs>
+            <a:gs pos="74000">
+              <a:schemeClr val="accent1">
+                <a:lumMod val="45000"/>
+                <a:lumOff val="55000"/>
+              </a:schemeClr>
+            </a:gs>
+            <a:gs pos="83000">
+              <a:schemeClr val="accent1">
+                <a:lumMod val="45000"/>
+                <a:lumOff val="55000"/>
+              </a:schemeClr>
+            </a:gs>
+            <a:gs pos="100000">
+              <a:schemeClr val="accent1">
+                <a:lumMod val="30000"/>
+                <a:lumOff val="70000"/>
+              </a:schemeClr>
+            </a:gs>
+          </a:gsLst>
+          <a:lin ang="5400000" scaled="1"/>
+          <a:tileRect/>
+        </a:gradFill>
+        <a:effectLst/>
+      </p:bgPr>
+    </p:bg>
+    <p:spTree>
+      <p:nvGrpSpPr>
+        <p:cNvPr id="1" name=""/>
+        <p:cNvGrpSpPr/>
+        <p:nvPr/>
+      </p:nvGrpSpPr>
+      <p:grpSpPr>
+        <a:xfrm>
+          <a:off x="0" y="0"/>
+          <a:ext cx="0" cy="0"/>
+          <a:chOff x="0" y="0"/>
+          <a:chExt cx="0" cy="0"/>
+        </a:xfrm>
+      </p:grpSpPr>
+      <p:sp>
+        <p:nvSpPr>
+          <p:cNvPr id="2" name="Title 1">
+            <a:extLst>
+              <a:ext uri="{FF2B5EF4-FFF2-40B4-BE49-F238E27FC236}">
+                <a16:creationId xmlns:a16="http://schemas.microsoft.com/office/drawing/2014/main" id="{3EFB1119-6DAB-476F-9541-ABA9503B44FF}"/>
+              </a:ext>
+            </a:extLst>
+          </p:cNvPr>
+          <p:cNvSpPr>
+            <a:spLocks noGrp="1"/>
+          </p:cNvSpPr>
+          <p:nvPr>
+            <p:ph type="title"/>
+          </p:nvPr>
+        </p:nvSpPr>
+        <p:spPr/>
+        <p:txBody>
+          <a:bodyPr/>
+          <a:lstStyle/>
+          <a:p>
+            <a:r>
+              <a:rPr lang="en-US" dirty="0"/>
+              <a:t>District results – 75</a:t>
+            </a:r>
+            <a:r>
+              <a:rPr lang="en-US" sz="4400" dirty="0"/>
+              <a:t>% passing math</a:t>
+            </a:r>
+            <a:endParaRPr lang="en-US" dirty="0"/>
+          </a:p>
+        </p:txBody>
+      </p:sp>
+      <p:sp>
+        <p:nvSpPr>
+          <p:cNvPr id="3" name="Content Placeholder 2">
+            <a:extLst>
+              <a:ext uri="{FF2B5EF4-FFF2-40B4-BE49-F238E27FC236}">
+                <a16:creationId xmlns:a16="http://schemas.microsoft.com/office/drawing/2014/main" id="{304380FF-F4C6-46D9-95C8-F4A1742EB433}"/>
+              </a:ext>
+            </a:extLst>
+          </p:cNvPr>
+          <p:cNvSpPr>
+            <a:spLocks noGrp="1"/>
+          </p:cNvSpPr>
+          <p:nvPr>
+            <p:ph idx="1"/>
+          </p:nvPr>
+        </p:nvSpPr>
+        <p:spPr/>
+        <p:txBody>
+          <a:bodyPr>
+            <a:normAutofit/>
+          </a:bodyPr>
+          <a:lstStyle/>
+          <a:p>
+            <a:r>
+              <a:rPr lang="en-US" sz="3600" dirty="0"/>
+              <a:t>Charter average – 94%, Traditional average – 67%</a:t>
+            </a:r>
+          </a:p>
+          <a:p>
+            <a:endParaRPr lang="en-US" sz="3600" dirty="0"/>
+          </a:p>
+        </p:txBody>
+      </p:sp>
+      <p:pic>
+        <p:nvPicPr>
+          <p:cNvPr id="6" name="Picture 5">
+            <a:extLst>
+              <a:ext uri="{FF2B5EF4-FFF2-40B4-BE49-F238E27FC236}">
+                <a16:creationId xmlns:a16="http://schemas.microsoft.com/office/drawing/2014/main" id="{EEEBD42E-A690-4E4C-B9EC-8B140FC30959}"/>
+              </a:ext>
+            </a:extLst>
+          </p:cNvPr>
+          <p:cNvPicPr>
+            <a:picLocks noChangeAspect="1"/>
+          </p:cNvPicPr>
+          <p:nvPr/>
+        </p:nvPicPr>
+        <p:blipFill>
+          <a:blip r:embed="rId2"/>
+          <a:stretch>
+            <a:fillRect/>
+          </a:stretch>
+        </p:blipFill>
+        <p:spPr>
+          <a:xfrm>
+            <a:off x="911102" y="2365986"/>
+            <a:ext cx="10514948" cy="4126889"/>
+          </a:xfrm>
+          <a:prstGeom prst="rect">
+            <a:avLst/>
+          </a:prstGeom>
+        </p:spPr>
+      </p:pic>
+    </p:spTree>
+    <p:extLst>
+      <p:ext uri="{BB962C8B-B14F-4D97-AF65-F5344CB8AC3E}">
+        <p14:creationId xmlns:p14="http://schemas.microsoft.com/office/powerpoint/2010/main" val="3296231958"/>
+      </p:ext>
+    </p:extLst>
+  </p:cSld>
+  <p:clrMapOvr>
+    <a:masterClrMapping/>
+  </p:clrMapOvr>
+</p:sld>
+</file>
+
+<file path=ppt/slides/slide9.xml><?xml version="1.0" encoding="utf-8"?>
+<p:sld xmlns:a="http://schemas.openxmlformats.org/drawingml/2006/main" xmlns:r="http://schemas.openxmlformats.org/officeDocument/2006/relationships" xmlns:p="http://schemas.openxmlformats.org/presentationml/2006/main">
+  <p:cSld>
+    <p:bg>
+      <p:bgPr>
+        <a:gradFill flip="none" rotWithShape="1">
+          <a:gsLst>
+            <a:gs pos="0">
+              <a:schemeClr val="accent1">
+                <a:lumMod val="5000"/>
+                <a:lumOff val="95000"/>
+              </a:schemeClr>
+            </a:gs>
+            <a:gs pos="74000">
+              <a:schemeClr val="accent1">
+                <a:lumMod val="45000"/>
+                <a:lumOff val="55000"/>
+              </a:schemeClr>
+            </a:gs>
+            <a:gs pos="83000">
+              <a:schemeClr val="accent1">
+                <a:lumMod val="45000"/>
+                <a:lumOff val="55000"/>
+              </a:schemeClr>
+            </a:gs>
+            <a:gs pos="100000">
+              <a:schemeClr val="accent1">
+                <a:lumMod val="30000"/>
+                <a:lumOff val="70000"/>
+              </a:schemeClr>
+            </a:gs>
+          </a:gsLst>
+          <a:lin ang="5400000" scaled="1"/>
+          <a:tileRect/>
+        </a:gradFill>
+        <a:effectLst/>
+      </p:bgPr>
+    </p:bg>
+    <p:spTree>
+      <p:nvGrpSpPr>
+        <p:cNvPr id="1" name=""/>
+        <p:cNvGrpSpPr/>
+        <p:nvPr/>
+      </p:nvGrpSpPr>
+      <p:grpSpPr>
+        <a:xfrm>
+          <a:off x="0" y="0"/>
+          <a:ext cx="0" cy="0"/>
+          <a:chOff x="0" y="0"/>
+          <a:chExt cx="0" cy="0"/>
+        </a:xfrm>
+      </p:grpSpPr>
+      <p:sp>
+        <p:nvSpPr>
+          <p:cNvPr id="2" name="Title 1">
+            <a:extLst>
+              <a:ext uri="{FF2B5EF4-FFF2-40B4-BE49-F238E27FC236}">
+                <a16:creationId xmlns:a16="http://schemas.microsoft.com/office/drawing/2014/main" id="{3EFB1119-6DAB-476F-9541-ABA9503B44FF}"/>
+              </a:ext>
+            </a:extLst>
+          </p:cNvPr>
+          <p:cNvSpPr>
+            <a:spLocks noGrp="1"/>
+          </p:cNvSpPr>
+          <p:nvPr>
+            <p:ph type="title"/>
+          </p:nvPr>
+        </p:nvSpPr>
+        <p:spPr/>
+        <p:txBody>
+          <a:bodyPr/>
+          <a:lstStyle/>
+          <a:p>
+            <a:r>
+              <a:rPr lang="en-US" dirty="0"/>
+              <a:t>District results – average reading score 82</a:t>
+            </a:r>
+          </a:p>
+        </p:txBody>
+      </p:sp>
+      <p:sp>
+        <p:nvSpPr>
+          <p:cNvPr id="3" name="Content Placeholder 2">
+            <a:extLst>
+              <a:ext uri="{FF2B5EF4-FFF2-40B4-BE49-F238E27FC236}">
+                <a16:creationId xmlns:a16="http://schemas.microsoft.com/office/drawing/2014/main" id="{304380FF-F4C6-46D9-95C8-F4A1742EB433}"/>
+              </a:ext>
+            </a:extLst>
+          </p:cNvPr>
+          <p:cNvSpPr>
+            <a:spLocks noGrp="1"/>
+          </p:cNvSpPr>
+          <p:nvPr>
+            <p:ph idx="1"/>
+          </p:nvPr>
+        </p:nvSpPr>
+        <p:spPr/>
+        <p:txBody>
+          <a:bodyPr>
+            <a:normAutofit/>
+          </a:bodyPr>
+          <a:lstStyle/>
+          <a:p>
+            <a:r>
+              <a:rPr lang="en-US" sz="3600" dirty="0"/>
+              <a:t>Charter average – 84, Traditional average – 81</a:t>
+            </a:r>
+          </a:p>
+          <a:p>
+            <a:endParaRPr lang="en-US" sz="3600" dirty="0"/>
+          </a:p>
+        </p:txBody>
+      </p:sp>
+      <p:pic>
+        <p:nvPicPr>
+          <p:cNvPr id="9" name="Picture 8">
+            <a:extLst>
+              <a:ext uri="{FF2B5EF4-FFF2-40B4-BE49-F238E27FC236}">
+                <a16:creationId xmlns:a16="http://schemas.microsoft.com/office/drawing/2014/main" id="{8EBF54FC-5F8D-4927-93E3-B1D530015042}"/>
+              </a:ext>
+            </a:extLst>
+          </p:cNvPr>
+          <p:cNvPicPr>
+            <a:picLocks noChangeAspect="1"/>
+          </p:cNvPicPr>
+          <p:nvPr/>
+        </p:nvPicPr>
+        <p:blipFill>
+          <a:blip r:embed="rId2"/>
+          <a:stretch>
+            <a:fillRect/>
+          </a:stretch>
+        </p:blipFill>
+        <p:spPr>
+          <a:xfrm>
+            <a:off x="838199" y="2376488"/>
+            <a:ext cx="10657211" cy="4116387"/>
+          </a:xfrm>
+          <a:prstGeom prst="rect">
+            <a:avLst/>
+          </a:prstGeom>
+        </p:spPr>
+      </p:pic>
+    </p:spTree>
+    <p:extLst>
+      <p:ext uri="{BB962C8B-B14F-4D97-AF65-F5344CB8AC3E}">
+        <p14:creationId xmlns:p14="http://schemas.microsoft.com/office/powerpoint/2010/main" val="3479379018"/>
       </p:ext>
     </p:extLst>
   </p:cSld>

</xml_diff>

<commit_message>
Adding speaker notes for presentation
</commit_message>
<xml_diff>
--- a/School District Analysis.pptx
+++ b/School District Analysis.pptx
@@ -4,6 +4,9 @@
   <p:sldMasterIdLst>
     <p:sldMasterId id="2147483648" r:id="rId1"/>
   </p:sldMasterIdLst>
+  <p:notesMasterIdLst>
+    <p:notesMasterId r:id="rId28"/>
+  </p:notesMasterIdLst>
   <p:sldIdLst>
     <p:sldId id="256" r:id="rId2"/>
     <p:sldId id="260" r:id="rId3"/>
@@ -18,8 +21,8 @@
     <p:sldId id="297" r:id="rId12"/>
     <p:sldId id="298" r:id="rId13"/>
     <p:sldId id="314" r:id="rId14"/>
-    <p:sldId id="311" r:id="rId15"/>
-    <p:sldId id="312" r:id="rId16"/>
+    <p:sldId id="315" r:id="rId15"/>
+    <p:sldId id="316" r:id="rId16"/>
     <p:sldId id="302" r:id="rId17"/>
     <p:sldId id="299" r:id="rId18"/>
     <p:sldId id="305" r:id="rId19"/>
@@ -159,8 +162,8 @@
             <p14:sldId id="297"/>
             <p14:sldId id="298"/>
             <p14:sldId id="314"/>
-            <p14:sldId id="311"/>
-            <p14:sldId id="312"/>
+            <p14:sldId id="315"/>
+            <p14:sldId id="316"/>
           </p14:sldIdLst>
         </p14:section>
         <p14:section name="Recommend Next Steps" id="{16643B89-490A-40A5-AA18-871C7A901F60}">
@@ -197,6 +200,1837 @@
     </p:ext>
   </p:extLst>
 </p:presentation>
+</file>
+
+<file path=ppt/notesMasters/notesMaster1.xml><?xml version="1.0" encoding="utf-8"?>
+<p:notesMaster xmlns:a="http://schemas.openxmlformats.org/drawingml/2006/main" xmlns:r="http://schemas.openxmlformats.org/officeDocument/2006/relationships" xmlns:p="http://schemas.openxmlformats.org/presentationml/2006/main">
+  <p:cSld>
+    <p:bg>
+      <p:bgRef idx="1001">
+        <a:schemeClr val="bg1"/>
+      </p:bgRef>
+    </p:bg>
+    <p:spTree>
+      <p:nvGrpSpPr>
+        <p:cNvPr id="1" name=""/>
+        <p:cNvGrpSpPr/>
+        <p:nvPr/>
+      </p:nvGrpSpPr>
+      <p:grpSpPr>
+        <a:xfrm>
+          <a:off x="0" y="0"/>
+          <a:ext cx="0" cy="0"/>
+          <a:chOff x="0" y="0"/>
+          <a:chExt cx="0" cy="0"/>
+        </a:xfrm>
+      </p:grpSpPr>
+      <p:sp>
+        <p:nvSpPr>
+          <p:cNvPr id="2" name="Header Placeholder 1"/>
+          <p:cNvSpPr>
+            <a:spLocks noGrp="1"/>
+          </p:cNvSpPr>
+          <p:nvPr>
+            <p:ph type="hdr" sz="quarter"/>
+          </p:nvPr>
+        </p:nvSpPr>
+        <p:spPr>
+          <a:xfrm>
+            <a:off x="0" y="0"/>
+            <a:ext cx="2971800" cy="458788"/>
+          </a:xfrm>
+          <a:prstGeom prst="rect">
+            <a:avLst/>
+          </a:prstGeom>
+        </p:spPr>
+        <p:txBody>
+          <a:bodyPr vert="horz" lIns="91440" tIns="45720" rIns="91440" bIns="45720" rtlCol="0"/>
+          <a:lstStyle>
+            <a:lvl1pPr algn="l">
+              <a:defRPr sz="1200"/>
+            </a:lvl1pPr>
+          </a:lstStyle>
+          <a:p>
+            <a:endParaRPr lang="en-US"/>
+          </a:p>
+        </p:txBody>
+      </p:sp>
+      <p:sp>
+        <p:nvSpPr>
+          <p:cNvPr id="3" name="Date Placeholder 2"/>
+          <p:cNvSpPr>
+            <a:spLocks noGrp="1"/>
+          </p:cNvSpPr>
+          <p:nvPr>
+            <p:ph type="dt" idx="1"/>
+          </p:nvPr>
+        </p:nvSpPr>
+        <p:spPr>
+          <a:xfrm>
+            <a:off x="3884613" y="0"/>
+            <a:ext cx="2971800" cy="458788"/>
+          </a:xfrm>
+          <a:prstGeom prst="rect">
+            <a:avLst/>
+          </a:prstGeom>
+        </p:spPr>
+        <p:txBody>
+          <a:bodyPr vert="horz" lIns="91440" tIns="45720" rIns="91440" bIns="45720" rtlCol="0"/>
+          <a:lstStyle>
+            <a:lvl1pPr algn="r">
+              <a:defRPr sz="1200"/>
+            </a:lvl1pPr>
+          </a:lstStyle>
+          <a:p>
+            <a:fld id="{EB59E88F-A9B3-403E-BA38-27695F0DE67B}" type="datetimeFigureOut">
+              <a:rPr lang="en-US" smtClean="0"/>
+              <a:t>12/27/2021</a:t>
+            </a:fld>
+            <a:endParaRPr lang="en-US"/>
+          </a:p>
+        </p:txBody>
+      </p:sp>
+      <p:sp>
+        <p:nvSpPr>
+          <p:cNvPr id="4" name="Slide Image Placeholder 3"/>
+          <p:cNvSpPr>
+            <a:spLocks noGrp="1" noRot="1" noChangeAspect="1"/>
+          </p:cNvSpPr>
+          <p:nvPr>
+            <p:ph type="sldImg" idx="2"/>
+          </p:nvPr>
+        </p:nvSpPr>
+        <p:spPr>
+          <a:xfrm>
+            <a:off x="685800" y="1143000"/>
+            <a:ext cx="5486400" cy="3086100"/>
+          </a:xfrm>
+          <a:prstGeom prst="rect">
+            <a:avLst/>
+          </a:prstGeom>
+          <a:noFill/>
+          <a:ln w="12700">
+            <a:solidFill>
+              <a:prstClr val="black"/>
+            </a:solidFill>
+          </a:ln>
+        </p:spPr>
+        <p:txBody>
+          <a:bodyPr vert="horz" lIns="91440" tIns="45720" rIns="91440" bIns="45720" rtlCol="0" anchor="ctr"/>
+          <a:lstStyle/>
+          <a:p>
+            <a:endParaRPr lang="en-US"/>
+          </a:p>
+        </p:txBody>
+      </p:sp>
+      <p:sp>
+        <p:nvSpPr>
+          <p:cNvPr id="5" name="Notes Placeholder 4"/>
+          <p:cNvSpPr>
+            <a:spLocks noGrp="1"/>
+          </p:cNvSpPr>
+          <p:nvPr>
+            <p:ph type="body" sz="quarter" idx="3"/>
+          </p:nvPr>
+        </p:nvSpPr>
+        <p:spPr>
+          <a:xfrm>
+            <a:off x="685800" y="4400550"/>
+            <a:ext cx="5486400" cy="3600450"/>
+          </a:xfrm>
+          <a:prstGeom prst="rect">
+            <a:avLst/>
+          </a:prstGeom>
+        </p:spPr>
+        <p:txBody>
+          <a:bodyPr vert="horz" lIns="91440" tIns="45720" rIns="91440" bIns="45720" rtlCol="0"/>
+          <a:lstStyle/>
+          <a:p>
+            <a:pPr lvl="0"/>
+            <a:r>
+              <a:rPr lang="en-US"/>
+              <a:t>Click to edit Master text styles</a:t>
+            </a:r>
+          </a:p>
+          <a:p>
+            <a:pPr lvl="1"/>
+            <a:r>
+              <a:rPr lang="en-US"/>
+              <a:t>Second level</a:t>
+            </a:r>
+          </a:p>
+          <a:p>
+            <a:pPr lvl="2"/>
+            <a:r>
+              <a:rPr lang="en-US"/>
+              <a:t>Third level</a:t>
+            </a:r>
+          </a:p>
+          <a:p>
+            <a:pPr lvl="3"/>
+            <a:r>
+              <a:rPr lang="en-US"/>
+              <a:t>Fourth level</a:t>
+            </a:r>
+          </a:p>
+          <a:p>
+            <a:pPr lvl="4"/>
+            <a:r>
+              <a:rPr lang="en-US"/>
+              <a:t>Fifth level</a:t>
+            </a:r>
+          </a:p>
+        </p:txBody>
+      </p:sp>
+      <p:sp>
+        <p:nvSpPr>
+          <p:cNvPr id="6" name="Footer Placeholder 5"/>
+          <p:cNvSpPr>
+            <a:spLocks noGrp="1"/>
+          </p:cNvSpPr>
+          <p:nvPr>
+            <p:ph type="ftr" sz="quarter" idx="4"/>
+          </p:nvPr>
+        </p:nvSpPr>
+        <p:spPr>
+          <a:xfrm>
+            <a:off x="0" y="8685213"/>
+            <a:ext cx="2971800" cy="458787"/>
+          </a:xfrm>
+          <a:prstGeom prst="rect">
+            <a:avLst/>
+          </a:prstGeom>
+        </p:spPr>
+        <p:txBody>
+          <a:bodyPr vert="horz" lIns="91440" tIns="45720" rIns="91440" bIns="45720" rtlCol="0" anchor="b"/>
+          <a:lstStyle>
+            <a:lvl1pPr algn="l">
+              <a:defRPr sz="1200"/>
+            </a:lvl1pPr>
+          </a:lstStyle>
+          <a:p>
+            <a:endParaRPr lang="en-US"/>
+          </a:p>
+        </p:txBody>
+      </p:sp>
+      <p:sp>
+        <p:nvSpPr>
+          <p:cNvPr id="7" name="Slide Number Placeholder 6"/>
+          <p:cNvSpPr>
+            <a:spLocks noGrp="1"/>
+          </p:cNvSpPr>
+          <p:nvPr>
+            <p:ph type="sldNum" sz="quarter" idx="5"/>
+          </p:nvPr>
+        </p:nvSpPr>
+        <p:spPr>
+          <a:xfrm>
+            <a:off x="3884613" y="8685213"/>
+            <a:ext cx="2971800" cy="458787"/>
+          </a:xfrm>
+          <a:prstGeom prst="rect">
+            <a:avLst/>
+          </a:prstGeom>
+        </p:spPr>
+        <p:txBody>
+          <a:bodyPr vert="horz" lIns="91440" tIns="45720" rIns="91440" bIns="45720" rtlCol="0" anchor="b"/>
+          <a:lstStyle>
+            <a:lvl1pPr algn="r">
+              <a:defRPr sz="1200"/>
+            </a:lvl1pPr>
+          </a:lstStyle>
+          <a:p>
+            <a:fld id="{A7B5DF20-A866-4BB7-B325-DAFE65EFD4BA}" type="slidenum">
+              <a:rPr lang="en-US" smtClean="0"/>
+              <a:t>‹#›</a:t>
+            </a:fld>
+            <a:endParaRPr lang="en-US"/>
+          </a:p>
+        </p:txBody>
+      </p:sp>
+    </p:spTree>
+    <p:extLst>
+      <p:ext uri="{BB962C8B-B14F-4D97-AF65-F5344CB8AC3E}">
+        <p14:creationId xmlns:p14="http://schemas.microsoft.com/office/powerpoint/2010/main" val="1484179384"/>
+      </p:ext>
+    </p:extLst>
+  </p:cSld>
+  <p:clrMap bg1="lt1" tx1="dk1" bg2="lt2" tx2="dk2" accent1="accent1" accent2="accent2" accent3="accent3" accent4="accent4" accent5="accent5" accent6="accent6" hlink="hlink" folHlink="folHlink"/>
+  <p:notesStyle>
+    <a:lvl1pPr marL="0" algn="l" defTabSz="914400" rtl="0" eaLnBrk="1" latinLnBrk="0" hangingPunct="1">
+      <a:defRPr sz="1200" kern="1200">
+        <a:solidFill>
+          <a:schemeClr val="tx1"/>
+        </a:solidFill>
+        <a:latin typeface="+mn-lt"/>
+        <a:ea typeface="+mn-ea"/>
+        <a:cs typeface="+mn-cs"/>
+      </a:defRPr>
+    </a:lvl1pPr>
+    <a:lvl2pPr marL="457200" algn="l" defTabSz="914400" rtl="0" eaLnBrk="1" latinLnBrk="0" hangingPunct="1">
+      <a:defRPr sz="1200" kern="1200">
+        <a:solidFill>
+          <a:schemeClr val="tx1"/>
+        </a:solidFill>
+        <a:latin typeface="+mn-lt"/>
+        <a:ea typeface="+mn-ea"/>
+        <a:cs typeface="+mn-cs"/>
+      </a:defRPr>
+    </a:lvl2pPr>
+    <a:lvl3pPr marL="914400" algn="l" defTabSz="914400" rtl="0" eaLnBrk="1" latinLnBrk="0" hangingPunct="1">
+      <a:defRPr sz="1200" kern="1200">
+        <a:solidFill>
+          <a:schemeClr val="tx1"/>
+        </a:solidFill>
+        <a:latin typeface="+mn-lt"/>
+        <a:ea typeface="+mn-ea"/>
+        <a:cs typeface="+mn-cs"/>
+      </a:defRPr>
+    </a:lvl3pPr>
+    <a:lvl4pPr marL="1371600" algn="l" defTabSz="914400" rtl="0" eaLnBrk="1" latinLnBrk="0" hangingPunct="1">
+      <a:defRPr sz="1200" kern="1200">
+        <a:solidFill>
+          <a:schemeClr val="tx1"/>
+        </a:solidFill>
+        <a:latin typeface="+mn-lt"/>
+        <a:ea typeface="+mn-ea"/>
+        <a:cs typeface="+mn-cs"/>
+      </a:defRPr>
+    </a:lvl4pPr>
+    <a:lvl5pPr marL="1828800" algn="l" defTabSz="914400" rtl="0" eaLnBrk="1" latinLnBrk="0" hangingPunct="1">
+      <a:defRPr sz="1200" kern="1200">
+        <a:solidFill>
+          <a:schemeClr val="tx1"/>
+        </a:solidFill>
+        <a:latin typeface="+mn-lt"/>
+        <a:ea typeface="+mn-ea"/>
+        <a:cs typeface="+mn-cs"/>
+      </a:defRPr>
+    </a:lvl5pPr>
+    <a:lvl6pPr marL="2286000" algn="l" defTabSz="914400" rtl="0" eaLnBrk="1" latinLnBrk="0" hangingPunct="1">
+      <a:defRPr sz="1200" kern="1200">
+        <a:solidFill>
+          <a:schemeClr val="tx1"/>
+        </a:solidFill>
+        <a:latin typeface="+mn-lt"/>
+        <a:ea typeface="+mn-ea"/>
+        <a:cs typeface="+mn-cs"/>
+      </a:defRPr>
+    </a:lvl6pPr>
+    <a:lvl7pPr marL="2743200" algn="l" defTabSz="914400" rtl="0" eaLnBrk="1" latinLnBrk="0" hangingPunct="1">
+      <a:defRPr sz="1200" kern="1200">
+        <a:solidFill>
+          <a:schemeClr val="tx1"/>
+        </a:solidFill>
+        <a:latin typeface="+mn-lt"/>
+        <a:ea typeface="+mn-ea"/>
+        <a:cs typeface="+mn-cs"/>
+      </a:defRPr>
+    </a:lvl7pPr>
+    <a:lvl8pPr marL="3200400" algn="l" defTabSz="914400" rtl="0" eaLnBrk="1" latinLnBrk="0" hangingPunct="1">
+      <a:defRPr sz="1200" kern="1200">
+        <a:solidFill>
+          <a:schemeClr val="tx1"/>
+        </a:solidFill>
+        <a:latin typeface="+mn-lt"/>
+        <a:ea typeface="+mn-ea"/>
+        <a:cs typeface="+mn-cs"/>
+      </a:defRPr>
+    </a:lvl8pPr>
+    <a:lvl9pPr marL="3657600" algn="l" defTabSz="914400" rtl="0" eaLnBrk="1" latinLnBrk="0" hangingPunct="1">
+      <a:defRPr sz="1200" kern="1200">
+        <a:solidFill>
+          <a:schemeClr val="tx1"/>
+        </a:solidFill>
+        <a:latin typeface="+mn-lt"/>
+        <a:ea typeface="+mn-ea"/>
+        <a:cs typeface="+mn-cs"/>
+      </a:defRPr>
+    </a:lvl9pPr>
+  </p:notesStyle>
+</p:notesMaster>
+</file>
+
+<file path=ppt/notesSlides/notesSlide1.xml><?xml version="1.0" encoding="utf-8"?>
+<p:notes xmlns:a="http://schemas.openxmlformats.org/drawingml/2006/main" xmlns:r="http://schemas.openxmlformats.org/officeDocument/2006/relationships" xmlns:p="http://schemas.openxmlformats.org/presentationml/2006/main">
+  <p:cSld>
+    <p:spTree>
+      <p:nvGrpSpPr>
+        <p:cNvPr id="1" name=""/>
+        <p:cNvGrpSpPr/>
+        <p:nvPr/>
+      </p:nvGrpSpPr>
+      <p:grpSpPr>
+        <a:xfrm>
+          <a:off x="0" y="0"/>
+          <a:ext cx="0" cy="0"/>
+          <a:chOff x="0" y="0"/>
+          <a:chExt cx="0" cy="0"/>
+        </a:xfrm>
+      </p:grpSpPr>
+      <p:sp>
+        <p:nvSpPr>
+          <p:cNvPr id="2" name="Slide Image Placeholder 1"/>
+          <p:cNvSpPr>
+            <a:spLocks noGrp="1" noRot="1" noChangeAspect="1"/>
+          </p:cNvSpPr>
+          <p:nvPr>
+            <p:ph type="sldImg"/>
+          </p:nvPr>
+        </p:nvSpPr>
+        <p:spPr/>
+      </p:sp>
+      <p:sp>
+        <p:nvSpPr>
+          <p:cNvPr id="3" name="Notes Placeholder 2"/>
+          <p:cNvSpPr>
+            <a:spLocks noGrp="1"/>
+          </p:cNvSpPr>
+          <p:nvPr>
+            <p:ph type="body" idx="1"/>
+          </p:nvPr>
+        </p:nvSpPr>
+        <p:spPr/>
+        <p:txBody>
+          <a:bodyPr/>
+          <a:lstStyle/>
+          <a:p>
+            <a:r>
+              <a:rPr lang="en-US" dirty="0"/>
+              <a:t>Thank you Mr. Toastmaster</a:t>
+            </a:r>
+          </a:p>
+          <a:p>
+            <a:r>
+              <a:rPr lang="en-US" dirty="0"/>
+              <a:t>I’m Josh Stephens, Hybrid Analyst for the District.</a:t>
+            </a:r>
+          </a:p>
+          <a:p>
+            <a:r>
+              <a:rPr lang="en-US" dirty="0"/>
+              <a:t>Thank you members of the school board for being here today for the presentation of this analytical project.</a:t>
+            </a:r>
+          </a:p>
+        </p:txBody>
+      </p:sp>
+      <p:sp>
+        <p:nvSpPr>
+          <p:cNvPr id="4" name="Slide Number Placeholder 3"/>
+          <p:cNvSpPr>
+            <a:spLocks noGrp="1"/>
+          </p:cNvSpPr>
+          <p:nvPr>
+            <p:ph type="sldNum" sz="quarter" idx="5"/>
+          </p:nvPr>
+        </p:nvSpPr>
+        <p:spPr/>
+        <p:txBody>
+          <a:bodyPr/>
+          <a:lstStyle/>
+          <a:p>
+            <a:fld id="{A7B5DF20-A866-4BB7-B325-DAFE65EFD4BA}" type="slidenum">
+              <a:rPr lang="en-US" smtClean="0"/>
+              <a:t>1</a:t>
+            </a:fld>
+            <a:endParaRPr lang="en-US"/>
+          </a:p>
+        </p:txBody>
+      </p:sp>
+    </p:spTree>
+    <p:extLst>
+      <p:ext uri="{BB962C8B-B14F-4D97-AF65-F5344CB8AC3E}">
+        <p14:creationId xmlns:p14="http://schemas.microsoft.com/office/powerpoint/2010/main" val="912148670"/>
+      </p:ext>
+    </p:extLst>
+  </p:cSld>
+  <p:clrMapOvr>
+    <a:masterClrMapping/>
+  </p:clrMapOvr>
+</p:notes>
+</file>
+
+<file path=ppt/notesSlides/notesSlide10.xml><?xml version="1.0" encoding="utf-8"?>
+<p:notes xmlns:a="http://schemas.openxmlformats.org/drawingml/2006/main" xmlns:r="http://schemas.openxmlformats.org/officeDocument/2006/relationships" xmlns:p="http://schemas.openxmlformats.org/presentationml/2006/main">
+  <p:cSld>
+    <p:spTree>
+      <p:nvGrpSpPr>
+        <p:cNvPr id="1" name=""/>
+        <p:cNvGrpSpPr/>
+        <p:nvPr/>
+      </p:nvGrpSpPr>
+      <p:grpSpPr>
+        <a:xfrm>
+          <a:off x="0" y="0"/>
+          <a:ext cx="0" cy="0"/>
+          <a:chOff x="0" y="0"/>
+          <a:chExt cx="0" cy="0"/>
+        </a:xfrm>
+      </p:grpSpPr>
+      <p:sp>
+        <p:nvSpPr>
+          <p:cNvPr id="2" name="Slide Image Placeholder 1"/>
+          <p:cNvSpPr>
+            <a:spLocks noGrp="1" noRot="1" noChangeAspect="1"/>
+          </p:cNvSpPr>
+          <p:nvPr>
+            <p:ph type="sldImg"/>
+          </p:nvPr>
+        </p:nvSpPr>
+        <p:spPr/>
+      </p:sp>
+      <p:sp>
+        <p:nvSpPr>
+          <p:cNvPr id="3" name="Notes Placeholder 2"/>
+          <p:cNvSpPr>
+            <a:spLocks noGrp="1"/>
+          </p:cNvSpPr>
+          <p:nvPr>
+            <p:ph type="body" idx="1"/>
+          </p:nvPr>
+        </p:nvSpPr>
+        <p:spPr/>
+        <p:txBody>
+          <a:bodyPr/>
+          <a:lstStyle/>
+          <a:p>
+            <a:r>
+              <a:rPr lang="en-US" dirty="0"/>
+              <a:t>More students passed reading</a:t>
+            </a:r>
+          </a:p>
+          <a:p>
+            <a:r>
+              <a:rPr lang="en-US" dirty="0"/>
+              <a:t>Again, the data show consistent differences between passing rates</a:t>
+            </a:r>
+          </a:p>
+        </p:txBody>
+      </p:sp>
+      <p:sp>
+        <p:nvSpPr>
+          <p:cNvPr id="4" name="Slide Number Placeholder 3"/>
+          <p:cNvSpPr>
+            <a:spLocks noGrp="1"/>
+          </p:cNvSpPr>
+          <p:nvPr>
+            <p:ph type="sldNum" sz="quarter" idx="5"/>
+          </p:nvPr>
+        </p:nvSpPr>
+        <p:spPr/>
+        <p:txBody>
+          <a:bodyPr/>
+          <a:lstStyle/>
+          <a:p>
+            <a:fld id="{A7B5DF20-A866-4BB7-B325-DAFE65EFD4BA}" type="slidenum">
+              <a:rPr lang="en-US" smtClean="0"/>
+              <a:t>10</a:t>
+            </a:fld>
+            <a:endParaRPr lang="en-US"/>
+          </a:p>
+        </p:txBody>
+      </p:sp>
+    </p:spTree>
+    <p:extLst>
+      <p:ext uri="{BB962C8B-B14F-4D97-AF65-F5344CB8AC3E}">
+        <p14:creationId xmlns:p14="http://schemas.microsoft.com/office/powerpoint/2010/main" val="3820965986"/>
+      </p:ext>
+    </p:extLst>
+  </p:cSld>
+  <p:clrMapOvr>
+    <a:masterClrMapping/>
+  </p:clrMapOvr>
+</p:notes>
+</file>
+
+<file path=ppt/notesSlides/notesSlide11.xml><?xml version="1.0" encoding="utf-8"?>
+<p:notes xmlns:a="http://schemas.openxmlformats.org/drawingml/2006/main" xmlns:r="http://schemas.openxmlformats.org/officeDocument/2006/relationships" xmlns:p="http://schemas.openxmlformats.org/presentationml/2006/main">
+  <p:cSld>
+    <p:spTree>
+      <p:nvGrpSpPr>
+        <p:cNvPr id="1" name=""/>
+        <p:cNvGrpSpPr/>
+        <p:nvPr/>
+      </p:nvGrpSpPr>
+      <p:grpSpPr>
+        <a:xfrm>
+          <a:off x="0" y="0"/>
+          <a:ext cx="0" cy="0"/>
+          <a:chOff x="0" y="0"/>
+          <a:chExt cx="0" cy="0"/>
+        </a:xfrm>
+      </p:grpSpPr>
+      <p:sp>
+        <p:nvSpPr>
+          <p:cNvPr id="2" name="Slide Image Placeholder 1"/>
+          <p:cNvSpPr>
+            <a:spLocks noGrp="1" noRot="1" noChangeAspect="1"/>
+          </p:cNvSpPr>
+          <p:nvPr>
+            <p:ph type="sldImg"/>
+          </p:nvPr>
+        </p:nvSpPr>
+        <p:spPr/>
+      </p:sp>
+      <p:sp>
+        <p:nvSpPr>
+          <p:cNvPr id="3" name="Notes Placeholder 2"/>
+          <p:cNvSpPr>
+            <a:spLocks noGrp="1"/>
+          </p:cNvSpPr>
+          <p:nvPr>
+            <p:ph type="body" idx="1"/>
+          </p:nvPr>
+        </p:nvSpPr>
+        <p:spPr/>
+        <p:txBody>
+          <a:bodyPr/>
+          <a:lstStyle/>
+          <a:p>
+            <a:r>
+              <a:rPr lang="en-US" dirty="0"/>
+              <a:t>About two in three students passed both exams district wide</a:t>
+            </a:r>
+          </a:p>
+          <a:p>
+            <a:r>
+              <a:rPr lang="en-US" dirty="0"/>
+              <a:t>However, 9 in 10 passed in charter schools.</a:t>
+            </a:r>
+          </a:p>
+          <a:p>
+            <a:r>
+              <a:rPr lang="en-US" dirty="0"/>
+              <a:t>While 54% passed in traditional schools</a:t>
+            </a:r>
+          </a:p>
+        </p:txBody>
+      </p:sp>
+      <p:sp>
+        <p:nvSpPr>
+          <p:cNvPr id="4" name="Slide Number Placeholder 3"/>
+          <p:cNvSpPr>
+            <a:spLocks noGrp="1"/>
+          </p:cNvSpPr>
+          <p:nvPr>
+            <p:ph type="sldNum" sz="quarter" idx="5"/>
+          </p:nvPr>
+        </p:nvSpPr>
+        <p:spPr/>
+        <p:txBody>
+          <a:bodyPr/>
+          <a:lstStyle/>
+          <a:p>
+            <a:fld id="{A7B5DF20-A866-4BB7-B325-DAFE65EFD4BA}" type="slidenum">
+              <a:rPr lang="en-US" smtClean="0"/>
+              <a:t>11</a:t>
+            </a:fld>
+            <a:endParaRPr lang="en-US"/>
+          </a:p>
+        </p:txBody>
+      </p:sp>
+    </p:spTree>
+    <p:extLst>
+      <p:ext uri="{BB962C8B-B14F-4D97-AF65-F5344CB8AC3E}">
+        <p14:creationId xmlns:p14="http://schemas.microsoft.com/office/powerpoint/2010/main" val="1770980913"/>
+      </p:ext>
+    </p:extLst>
+  </p:cSld>
+  <p:clrMapOvr>
+    <a:masterClrMapping/>
+  </p:clrMapOvr>
+</p:notes>
+</file>
+
+<file path=ppt/notesSlides/notesSlide12.xml><?xml version="1.0" encoding="utf-8"?>
+<p:notes xmlns:a="http://schemas.openxmlformats.org/drawingml/2006/main" xmlns:r="http://schemas.openxmlformats.org/officeDocument/2006/relationships" xmlns:p="http://schemas.openxmlformats.org/presentationml/2006/main">
+  <p:cSld>
+    <p:spTree>
+      <p:nvGrpSpPr>
+        <p:cNvPr id="1" name=""/>
+        <p:cNvGrpSpPr/>
+        <p:nvPr/>
+      </p:nvGrpSpPr>
+      <p:grpSpPr>
+        <a:xfrm>
+          <a:off x="0" y="0"/>
+          <a:ext cx="0" cy="0"/>
+          <a:chOff x="0" y="0"/>
+          <a:chExt cx="0" cy="0"/>
+        </a:xfrm>
+      </p:grpSpPr>
+      <p:sp>
+        <p:nvSpPr>
+          <p:cNvPr id="2" name="Slide Image Placeholder 1"/>
+          <p:cNvSpPr>
+            <a:spLocks noGrp="1" noRot="1" noChangeAspect="1"/>
+          </p:cNvSpPr>
+          <p:nvPr>
+            <p:ph type="sldImg"/>
+          </p:nvPr>
+        </p:nvSpPr>
+        <p:spPr/>
+      </p:sp>
+      <p:sp>
+        <p:nvSpPr>
+          <p:cNvPr id="3" name="Notes Placeholder 2"/>
+          <p:cNvSpPr>
+            <a:spLocks noGrp="1"/>
+          </p:cNvSpPr>
+          <p:nvPr>
+            <p:ph type="body" idx="1"/>
+          </p:nvPr>
+        </p:nvSpPr>
+        <p:spPr/>
+        <p:txBody>
+          <a:bodyPr/>
+          <a:lstStyle/>
+          <a:p>
+            <a:r>
+              <a:rPr lang="en-US" dirty="0"/>
+              <a:t>Here we see the per student budgets for each school</a:t>
+            </a:r>
+          </a:p>
+          <a:p>
+            <a:r>
+              <a:rPr lang="en-US" dirty="0"/>
+              <a:t>The charter schools averaged budgets that were about 7% lower than the traditional schools</a:t>
+            </a:r>
+          </a:p>
+        </p:txBody>
+      </p:sp>
+      <p:sp>
+        <p:nvSpPr>
+          <p:cNvPr id="4" name="Slide Number Placeholder 3"/>
+          <p:cNvSpPr>
+            <a:spLocks noGrp="1"/>
+          </p:cNvSpPr>
+          <p:nvPr>
+            <p:ph type="sldNum" sz="quarter" idx="5"/>
+          </p:nvPr>
+        </p:nvSpPr>
+        <p:spPr/>
+        <p:txBody>
+          <a:bodyPr/>
+          <a:lstStyle/>
+          <a:p>
+            <a:fld id="{A7B5DF20-A866-4BB7-B325-DAFE65EFD4BA}" type="slidenum">
+              <a:rPr lang="en-US" smtClean="0"/>
+              <a:t>12</a:t>
+            </a:fld>
+            <a:endParaRPr lang="en-US"/>
+          </a:p>
+        </p:txBody>
+      </p:sp>
+    </p:spTree>
+    <p:extLst>
+      <p:ext uri="{BB962C8B-B14F-4D97-AF65-F5344CB8AC3E}">
+        <p14:creationId xmlns:p14="http://schemas.microsoft.com/office/powerpoint/2010/main" val="3348631629"/>
+      </p:ext>
+    </p:extLst>
+  </p:cSld>
+  <p:clrMapOvr>
+    <a:masterClrMapping/>
+  </p:clrMapOvr>
+</p:notes>
+</file>
+
+<file path=ppt/notesSlides/notesSlide13.xml><?xml version="1.0" encoding="utf-8"?>
+<p:notes xmlns:a="http://schemas.openxmlformats.org/drawingml/2006/main" xmlns:r="http://schemas.openxmlformats.org/officeDocument/2006/relationships" xmlns:p="http://schemas.openxmlformats.org/presentationml/2006/main">
+  <p:cSld>
+    <p:spTree>
+      <p:nvGrpSpPr>
+        <p:cNvPr id="1" name=""/>
+        <p:cNvGrpSpPr/>
+        <p:nvPr/>
+      </p:nvGrpSpPr>
+      <p:grpSpPr>
+        <a:xfrm>
+          <a:off x="0" y="0"/>
+          <a:ext cx="0" cy="0"/>
+          <a:chOff x="0" y="0"/>
+          <a:chExt cx="0" cy="0"/>
+        </a:xfrm>
+      </p:grpSpPr>
+      <p:sp>
+        <p:nvSpPr>
+          <p:cNvPr id="2" name="Slide Image Placeholder 1"/>
+          <p:cNvSpPr>
+            <a:spLocks noGrp="1" noRot="1" noChangeAspect="1"/>
+          </p:cNvSpPr>
+          <p:nvPr>
+            <p:ph type="sldImg"/>
+          </p:nvPr>
+        </p:nvSpPr>
+        <p:spPr/>
+      </p:sp>
+      <p:sp>
+        <p:nvSpPr>
+          <p:cNvPr id="3" name="Notes Placeholder 2"/>
+          <p:cNvSpPr>
+            <a:spLocks noGrp="1"/>
+          </p:cNvSpPr>
+          <p:nvPr>
+            <p:ph type="body" idx="1"/>
+          </p:nvPr>
+        </p:nvSpPr>
+        <p:spPr/>
+        <p:txBody>
+          <a:bodyPr/>
+          <a:lstStyle/>
+          <a:p>
+            <a:r>
+              <a:rPr lang="en-US" dirty="0"/>
+              <a:t>Here you’ll see average performance for all measures by charter and traditional schools</a:t>
+            </a:r>
+          </a:p>
+        </p:txBody>
+      </p:sp>
+      <p:sp>
+        <p:nvSpPr>
+          <p:cNvPr id="4" name="Slide Number Placeholder 3"/>
+          <p:cNvSpPr>
+            <a:spLocks noGrp="1"/>
+          </p:cNvSpPr>
+          <p:nvPr>
+            <p:ph type="sldNum" sz="quarter" idx="5"/>
+          </p:nvPr>
+        </p:nvSpPr>
+        <p:spPr/>
+        <p:txBody>
+          <a:bodyPr/>
+          <a:lstStyle/>
+          <a:p>
+            <a:fld id="{A7B5DF20-A866-4BB7-B325-DAFE65EFD4BA}" type="slidenum">
+              <a:rPr lang="en-US" smtClean="0"/>
+              <a:t>13</a:t>
+            </a:fld>
+            <a:endParaRPr lang="en-US"/>
+          </a:p>
+        </p:txBody>
+      </p:sp>
+    </p:spTree>
+    <p:extLst>
+      <p:ext uri="{BB962C8B-B14F-4D97-AF65-F5344CB8AC3E}">
+        <p14:creationId xmlns:p14="http://schemas.microsoft.com/office/powerpoint/2010/main" val="4192332731"/>
+      </p:ext>
+    </p:extLst>
+  </p:cSld>
+  <p:clrMapOvr>
+    <a:masterClrMapping/>
+  </p:clrMapOvr>
+</p:notes>
+</file>
+
+<file path=ppt/notesSlides/notesSlide14.xml><?xml version="1.0" encoding="utf-8"?>
+<p:notes xmlns:a="http://schemas.openxmlformats.org/drawingml/2006/main" xmlns:r="http://schemas.openxmlformats.org/officeDocument/2006/relationships" xmlns:p="http://schemas.openxmlformats.org/presentationml/2006/main">
+  <p:cSld>
+    <p:spTree>
+      <p:nvGrpSpPr>
+        <p:cNvPr id="1" name=""/>
+        <p:cNvGrpSpPr/>
+        <p:nvPr/>
+      </p:nvGrpSpPr>
+      <p:grpSpPr>
+        <a:xfrm>
+          <a:off x="0" y="0"/>
+          <a:ext cx="0" cy="0"/>
+          <a:chOff x="0" y="0"/>
+          <a:chExt cx="0" cy="0"/>
+        </a:xfrm>
+      </p:grpSpPr>
+      <p:sp>
+        <p:nvSpPr>
+          <p:cNvPr id="2" name="Slide Image Placeholder 1"/>
+          <p:cNvSpPr>
+            <a:spLocks noGrp="1" noRot="1" noChangeAspect="1"/>
+          </p:cNvSpPr>
+          <p:nvPr>
+            <p:ph type="sldImg"/>
+          </p:nvPr>
+        </p:nvSpPr>
+        <p:spPr/>
+      </p:sp>
+      <p:sp>
+        <p:nvSpPr>
+          <p:cNvPr id="3" name="Notes Placeholder 2"/>
+          <p:cNvSpPr>
+            <a:spLocks noGrp="1"/>
+          </p:cNvSpPr>
+          <p:nvPr>
+            <p:ph type="body" idx="1"/>
+          </p:nvPr>
+        </p:nvSpPr>
+        <p:spPr/>
+        <p:txBody>
+          <a:bodyPr/>
+          <a:lstStyle/>
+          <a:p>
+            <a:r>
+              <a:rPr lang="en-US" dirty="0"/>
+              <a:t>Here is the same data by school spending.  Note that as the spending increases, the averages actually decrease</a:t>
+            </a:r>
+          </a:p>
+        </p:txBody>
+      </p:sp>
+      <p:sp>
+        <p:nvSpPr>
+          <p:cNvPr id="4" name="Slide Number Placeholder 3"/>
+          <p:cNvSpPr>
+            <a:spLocks noGrp="1"/>
+          </p:cNvSpPr>
+          <p:nvPr>
+            <p:ph type="sldNum" sz="quarter" idx="5"/>
+          </p:nvPr>
+        </p:nvSpPr>
+        <p:spPr/>
+        <p:txBody>
+          <a:bodyPr/>
+          <a:lstStyle/>
+          <a:p>
+            <a:fld id="{A7B5DF20-A866-4BB7-B325-DAFE65EFD4BA}" type="slidenum">
+              <a:rPr lang="en-US" smtClean="0"/>
+              <a:t>14</a:t>
+            </a:fld>
+            <a:endParaRPr lang="en-US"/>
+          </a:p>
+        </p:txBody>
+      </p:sp>
+    </p:spTree>
+    <p:extLst>
+      <p:ext uri="{BB962C8B-B14F-4D97-AF65-F5344CB8AC3E}">
+        <p14:creationId xmlns:p14="http://schemas.microsoft.com/office/powerpoint/2010/main" val="371942045"/>
+      </p:ext>
+    </p:extLst>
+  </p:cSld>
+  <p:clrMapOvr>
+    <a:masterClrMapping/>
+  </p:clrMapOvr>
+</p:notes>
+</file>
+
+<file path=ppt/notesSlides/notesSlide15.xml><?xml version="1.0" encoding="utf-8"?>
+<p:notes xmlns:a="http://schemas.openxmlformats.org/drawingml/2006/main" xmlns:r="http://schemas.openxmlformats.org/officeDocument/2006/relationships" xmlns:p="http://schemas.openxmlformats.org/presentationml/2006/main">
+  <p:cSld>
+    <p:spTree>
+      <p:nvGrpSpPr>
+        <p:cNvPr id="1" name=""/>
+        <p:cNvGrpSpPr/>
+        <p:nvPr/>
+      </p:nvGrpSpPr>
+      <p:grpSpPr>
+        <a:xfrm>
+          <a:off x="0" y="0"/>
+          <a:ext cx="0" cy="0"/>
+          <a:chOff x="0" y="0"/>
+          <a:chExt cx="0" cy="0"/>
+        </a:xfrm>
+      </p:grpSpPr>
+      <p:sp>
+        <p:nvSpPr>
+          <p:cNvPr id="2" name="Slide Image Placeholder 1"/>
+          <p:cNvSpPr>
+            <a:spLocks noGrp="1" noRot="1" noChangeAspect="1"/>
+          </p:cNvSpPr>
+          <p:nvPr>
+            <p:ph type="sldImg"/>
+          </p:nvPr>
+        </p:nvSpPr>
+        <p:spPr/>
+      </p:sp>
+      <p:sp>
+        <p:nvSpPr>
+          <p:cNvPr id="3" name="Notes Placeholder 2"/>
+          <p:cNvSpPr>
+            <a:spLocks noGrp="1"/>
+          </p:cNvSpPr>
+          <p:nvPr>
+            <p:ph type="body" idx="1"/>
+          </p:nvPr>
+        </p:nvSpPr>
+        <p:spPr/>
+        <p:txBody>
+          <a:bodyPr/>
+          <a:lstStyle/>
+          <a:p>
+            <a:r>
+              <a:rPr lang="en-US" dirty="0"/>
+              <a:t>Now the data are by school sizes.  As schools get larger, the averages decrease</a:t>
+            </a:r>
+          </a:p>
+        </p:txBody>
+      </p:sp>
+      <p:sp>
+        <p:nvSpPr>
+          <p:cNvPr id="4" name="Slide Number Placeholder 3"/>
+          <p:cNvSpPr>
+            <a:spLocks noGrp="1"/>
+          </p:cNvSpPr>
+          <p:nvPr>
+            <p:ph type="sldNum" sz="quarter" idx="5"/>
+          </p:nvPr>
+        </p:nvSpPr>
+        <p:spPr/>
+        <p:txBody>
+          <a:bodyPr/>
+          <a:lstStyle/>
+          <a:p>
+            <a:fld id="{A7B5DF20-A866-4BB7-B325-DAFE65EFD4BA}" type="slidenum">
+              <a:rPr lang="en-US" smtClean="0"/>
+              <a:t>15</a:t>
+            </a:fld>
+            <a:endParaRPr lang="en-US"/>
+          </a:p>
+        </p:txBody>
+      </p:sp>
+    </p:spTree>
+    <p:extLst>
+      <p:ext uri="{BB962C8B-B14F-4D97-AF65-F5344CB8AC3E}">
+        <p14:creationId xmlns:p14="http://schemas.microsoft.com/office/powerpoint/2010/main" val="839046398"/>
+      </p:ext>
+    </p:extLst>
+  </p:cSld>
+  <p:clrMapOvr>
+    <a:masterClrMapping/>
+  </p:clrMapOvr>
+</p:notes>
+</file>
+
+<file path=ppt/notesSlides/notesSlide16.xml><?xml version="1.0" encoding="utf-8"?>
+<p:notes xmlns:a="http://schemas.openxmlformats.org/drawingml/2006/main" xmlns:r="http://schemas.openxmlformats.org/officeDocument/2006/relationships" xmlns:p="http://schemas.openxmlformats.org/presentationml/2006/main">
+  <p:cSld>
+    <p:spTree>
+      <p:nvGrpSpPr>
+        <p:cNvPr id="1" name=""/>
+        <p:cNvGrpSpPr/>
+        <p:nvPr/>
+      </p:nvGrpSpPr>
+      <p:grpSpPr>
+        <a:xfrm>
+          <a:off x="0" y="0"/>
+          <a:ext cx="0" cy="0"/>
+          <a:chOff x="0" y="0"/>
+          <a:chExt cx="0" cy="0"/>
+        </a:xfrm>
+      </p:grpSpPr>
+      <p:sp>
+        <p:nvSpPr>
+          <p:cNvPr id="2" name="Slide Image Placeholder 1"/>
+          <p:cNvSpPr>
+            <a:spLocks noGrp="1" noRot="1" noChangeAspect="1"/>
+          </p:cNvSpPr>
+          <p:nvPr>
+            <p:ph type="sldImg"/>
+          </p:nvPr>
+        </p:nvSpPr>
+        <p:spPr/>
+      </p:sp>
+      <p:sp>
+        <p:nvSpPr>
+          <p:cNvPr id="3" name="Notes Placeholder 2"/>
+          <p:cNvSpPr>
+            <a:spLocks noGrp="1"/>
+          </p:cNvSpPr>
+          <p:nvPr>
+            <p:ph type="body" idx="1"/>
+          </p:nvPr>
+        </p:nvSpPr>
+        <p:spPr/>
+        <p:txBody>
+          <a:bodyPr/>
+          <a:lstStyle/>
+          <a:p>
+            <a:r>
+              <a:rPr lang="en-US" dirty="0"/>
+              <a:t>For recommended next steps,</a:t>
+            </a:r>
+          </a:p>
+          <a:p>
+            <a:r>
+              <a:rPr lang="en-US" dirty="0"/>
+              <a:t>First I recommend that we perform a regression analysis to determine if the variances are a result of other variables or seem to be highly correlated to those mentioned in this presentation</a:t>
+            </a:r>
+          </a:p>
+          <a:p>
+            <a:r>
+              <a:rPr lang="en-US" dirty="0"/>
+              <a:t>Secondly, and in conjunction with the findings from the analysis, I recommend a team study various approaches that were used surrounding standardized testing in an attempt to socialize those that were highly effective</a:t>
+            </a:r>
+          </a:p>
+        </p:txBody>
+      </p:sp>
+      <p:sp>
+        <p:nvSpPr>
+          <p:cNvPr id="4" name="Slide Number Placeholder 3"/>
+          <p:cNvSpPr>
+            <a:spLocks noGrp="1"/>
+          </p:cNvSpPr>
+          <p:nvPr>
+            <p:ph type="sldNum" sz="quarter" idx="5"/>
+          </p:nvPr>
+        </p:nvSpPr>
+        <p:spPr/>
+        <p:txBody>
+          <a:bodyPr/>
+          <a:lstStyle/>
+          <a:p>
+            <a:fld id="{A7B5DF20-A866-4BB7-B325-DAFE65EFD4BA}" type="slidenum">
+              <a:rPr lang="en-US" smtClean="0"/>
+              <a:t>16</a:t>
+            </a:fld>
+            <a:endParaRPr lang="en-US"/>
+          </a:p>
+        </p:txBody>
+      </p:sp>
+    </p:spTree>
+    <p:extLst>
+      <p:ext uri="{BB962C8B-B14F-4D97-AF65-F5344CB8AC3E}">
+        <p14:creationId xmlns:p14="http://schemas.microsoft.com/office/powerpoint/2010/main" val="2937447980"/>
+      </p:ext>
+    </p:extLst>
+  </p:cSld>
+  <p:clrMapOvr>
+    <a:masterClrMapping/>
+  </p:clrMapOvr>
+</p:notes>
+</file>
+
+<file path=ppt/notesSlides/notesSlide2.xml><?xml version="1.0" encoding="utf-8"?>
+<p:notes xmlns:a="http://schemas.openxmlformats.org/drawingml/2006/main" xmlns:r="http://schemas.openxmlformats.org/officeDocument/2006/relationships" xmlns:p="http://schemas.openxmlformats.org/presentationml/2006/main">
+  <p:cSld>
+    <p:spTree>
+      <p:nvGrpSpPr>
+        <p:cNvPr id="1" name=""/>
+        <p:cNvGrpSpPr/>
+        <p:nvPr/>
+      </p:nvGrpSpPr>
+      <p:grpSpPr>
+        <a:xfrm>
+          <a:off x="0" y="0"/>
+          <a:ext cx="0" cy="0"/>
+          <a:chOff x="0" y="0"/>
+          <a:chExt cx="0" cy="0"/>
+        </a:xfrm>
+      </p:grpSpPr>
+      <p:sp>
+        <p:nvSpPr>
+          <p:cNvPr id="2" name="Slide Image Placeholder 1"/>
+          <p:cNvSpPr>
+            <a:spLocks noGrp="1" noRot="1" noChangeAspect="1"/>
+          </p:cNvSpPr>
+          <p:nvPr>
+            <p:ph type="sldImg"/>
+          </p:nvPr>
+        </p:nvSpPr>
+        <p:spPr/>
+      </p:sp>
+      <p:sp>
+        <p:nvSpPr>
+          <p:cNvPr id="3" name="Notes Placeholder 2"/>
+          <p:cNvSpPr>
+            <a:spLocks noGrp="1"/>
+          </p:cNvSpPr>
+          <p:nvPr>
+            <p:ph type="body" idx="1"/>
+          </p:nvPr>
+        </p:nvSpPr>
+        <p:spPr/>
+        <p:txBody>
+          <a:bodyPr/>
+          <a:lstStyle/>
+          <a:p>
+            <a:r>
+              <a:rPr lang="en-US" dirty="0"/>
+              <a:t>First is a brief overview of what we’ll cover this morning.  </a:t>
+            </a:r>
+          </a:p>
+          <a:p>
+            <a:r>
+              <a:rPr lang="en-US" dirty="0"/>
+              <a:t>After this meeting, the presentation along with the appendix and written analysis will be available.</a:t>
+            </a:r>
+          </a:p>
+        </p:txBody>
+      </p:sp>
+      <p:sp>
+        <p:nvSpPr>
+          <p:cNvPr id="4" name="Slide Number Placeholder 3"/>
+          <p:cNvSpPr>
+            <a:spLocks noGrp="1"/>
+          </p:cNvSpPr>
+          <p:nvPr>
+            <p:ph type="sldNum" sz="quarter" idx="5"/>
+          </p:nvPr>
+        </p:nvSpPr>
+        <p:spPr/>
+        <p:txBody>
+          <a:bodyPr/>
+          <a:lstStyle/>
+          <a:p>
+            <a:fld id="{A7B5DF20-A866-4BB7-B325-DAFE65EFD4BA}" type="slidenum">
+              <a:rPr lang="en-US" smtClean="0"/>
+              <a:t>2</a:t>
+            </a:fld>
+            <a:endParaRPr lang="en-US"/>
+          </a:p>
+        </p:txBody>
+      </p:sp>
+    </p:spTree>
+    <p:extLst>
+      <p:ext uri="{BB962C8B-B14F-4D97-AF65-F5344CB8AC3E}">
+        <p14:creationId xmlns:p14="http://schemas.microsoft.com/office/powerpoint/2010/main" val="3149942473"/>
+      </p:ext>
+    </p:extLst>
+  </p:cSld>
+  <p:clrMapOvr>
+    <a:masterClrMapping/>
+  </p:clrMapOvr>
+</p:notes>
+</file>
+
+<file path=ppt/notesSlides/notesSlide3.xml><?xml version="1.0" encoding="utf-8"?>
+<p:notes xmlns:a="http://schemas.openxmlformats.org/drawingml/2006/main" xmlns:r="http://schemas.openxmlformats.org/officeDocument/2006/relationships" xmlns:p="http://schemas.openxmlformats.org/presentationml/2006/main">
+  <p:cSld>
+    <p:spTree>
+      <p:nvGrpSpPr>
+        <p:cNvPr id="1" name=""/>
+        <p:cNvGrpSpPr/>
+        <p:nvPr/>
+      </p:nvGrpSpPr>
+      <p:grpSpPr>
+        <a:xfrm>
+          <a:off x="0" y="0"/>
+          <a:ext cx="0" cy="0"/>
+          <a:chOff x="0" y="0"/>
+          <a:chExt cx="0" cy="0"/>
+        </a:xfrm>
+      </p:grpSpPr>
+      <p:sp>
+        <p:nvSpPr>
+          <p:cNvPr id="2" name="Slide Image Placeholder 1"/>
+          <p:cNvSpPr>
+            <a:spLocks noGrp="1" noRot="1" noChangeAspect="1"/>
+          </p:cNvSpPr>
+          <p:nvPr>
+            <p:ph type="sldImg"/>
+          </p:nvPr>
+        </p:nvSpPr>
+        <p:spPr/>
+      </p:sp>
+      <p:sp>
+        <p:nvSpPr>
+          <p:cNvPr id="3" name="Notes Placeholder 2"/>
+          <p:cNvSpPr>
+            <a:spLocks noGrp="1"/>
+          </p:cNvSpPr>
+          <p:nvPr>
+            <p:ph type="body" idx="1"/>
+          </p:nvPr>
+        </p:nvSpPr>
+        <p:spPr/>
+        <p:txBody>
+          <a:bodyPr/>
+          <a:lstStyle/>
+          <a:p>
+            <a:r>
+              <a:rPr lang="en-US" dirty="0"/>
+              <a:t>Here you’ll see the district summary.</a:t>
+            </a:r>
+          </a:p>
+          <a:p>
+            <a:r>
+              <a:rPr lang="en-US" dirty="0"/>
+              <a:t>Scores for all 15 high schools were analyzed</a:t>
+            </a:r>
+          </a:p>
+        </p:txBody>
+      </p:sp>
+      <p:sp>
+        <p:nvSpPr>
+          <p:cNvPr id="4" name="Slide Number Placeholder 3"/>
+          <p:cNvSpPr>
+            <a:spLocks noGrp="1"/>
+          </p:cNvSpPr>
+          <p:nvPr>
+            <p:ph type="sldNum" sz="quarter" idx="5"/>
+          </p:nvPr>
+        </p:nvSpPr>
+        <p:spPr/>
+        <p:txBody>
+          <a:bodyPr/>
+          <a:lstStyle/>
+          <a:p>
+            <a:fld id="{A7B5DF20-A866-4BB7-B325-DAFE65EFD4BA}" type="slidenum">
+              <a:rPr lang="en-US" smtClean="0"/>
+              <a:t>3</a:t>
+            </a:fld>
+            <a:endParaRPr lang="en-US"/>
+          </a:p>
+        </p:txBody>
+      </p:sp>
+    </p:spTree>
+    <p:extLst>
+      <p:ext uri="{BB962C8B-B14F-4D97-AF65-F5344CB8AC3E}">
+        <p14:creationId xmlns:p14="http://schemas.microsoft.com/office/powerpoint/2010/main" val="928250110"/>
+      </p:ext>
+    </p:extLst>
+  </p:cSld>
+  <p:clrMapOvr>
+    <a:masterClrMapping/>
+  </p:clrMapOvr>
+</p:notes>
+</file>
+
+<file path=ppt/notesSlides/notesSlide4.xml><?xml version="1.0" encoding="utf-8"?>
+<p:notes xmlns:a="http://schemas.openxmlformats.org/drawingml/2006/main" xmlns:r="http://schemas.openxmlformats.org/officeDocument/2006/relationships" xmlns:p="http://schemas.openxmlformats.org/presentationml/2006/main">
+  <p:cSld>
+    <p:spTree>
+      <p:nvGrpSpPr>
+        <p:cNvPr id="1" name=""/>
+        <p:cNvGrpSpPr/>
+        <p:nvPr/>
+      </p:nvGrpSpPr>
+      <p:grpSpPr>
+        <a:xfrm>
+          <a:off x="0" y="0"/>
+          <a:ext cx="0" cy="0"/>
+          <a:chOff x="0" y="0"/>
+          <a:chExt cx="0" cy="0"/>
+        </a:xfrm>
+      </p:grpSpPr>
+      <p:sp>
+        <p:nvSpPr>
+          <p:cNvPr id="2" name="Slide Image Placeholder 1"/>
+          <p:cNvSpPr>
+            <a:spLocks noGrp="1" noRot="1" noChangeAspect="1"/>
+          </p:cNvSpPr>
+          <p:nvPr>
+            <p:ph type="sldImg"/>
+          </p:nvPr>
+        </p:nvSpPr>
+        <p:spPr/>
+      </p:sp>
+      <p:sp>
+        <p:nvSpPr>
+          <p:cNvPr id="3" name="Notes Placeholder 2"/>
+          <p:cNvSpPr>
+            <a:spLocks noGrp="1"/>
+          </p:cNvSpPr>
+          <p:nvPr>
+            <p:ph type="body" idx="1"/>
+          </p:nvPr>
+        </p:nvSpPr>
+        <p:spPr/>
+        <p:txBody>
+          <a:bodyPr/>
+          <a:lstStyle/>
+          <a:p>
+            <a:r>
+              <a:rPr lang="en-US" dirty="0"/>
+              <a:t>The charter schools high higher performance than traditional schools, with lower average budgets</a:t>
+            </a:r>
+          </a:p>
+          <a:p>
+            <a:r>
+              <a:rPr lang="en-US" dirty="0"/>
+              <a:t>During this presentation, I’d like you to keep these key observations in mind</a:t>
+            </a:r>
+          </a:p>
+        </p:txBody>
+      </p:sp>
+      <p:sp>
+        <p:nvSpPr>
+          <p:cNvPr id="4" name="Slide Number Placeholder 3"/>
+          <p:cNvSpPr>
+            <a:spLocks noGrp="1"/>
+          </p:cNvSpPr>
+          <p:nvPr>
+            <p:ph type="sldNum" sz="quarter" idx="5"/>
+          </p:nvPr>
+        </p:nvSpPr>
+        <p:spPr/>
+        <p:txBody>
+          <a:bodyPr/>
+          <a:lstStyle/>
+          <a:p>
+            <a:fld id="{A7B5DF20-A866-4BB7-B325-DAFE65EFD4BA}" type="slidenum">
+              <a:rPr lang="en-US" smtClean="0"/>
+              <a:t>4</a:t>
+            </a:fld>
+            <a:endParaRPr lang="en-US"/>
+          </a:p>
+        </p:txBody>
+      </p:sp>
+    </p:spTree>
+    <p:extLst>
+      <p:ext uri="{BB962C8B-B14F-4D97-AF65-F5344CB8AC3E}">
+        <p14:creationId xmlns:p14="http://schemas.microsoft.com/office/powerpoint/2010/main" val="4113486961"/>
+      </p:ext>
+    </p:extLst>
+  </p:cSld>
+  <p:clrMapOvr>
+    <a:masterClrMapping/>
+  </p:clrMapOvr>
+</p:notes>
+</file>
+
+<file path=ppt/notesSlides/notesSlide5.xml><?xml version="1.0" encoding="utf-8"?>
+<p:notes xmlns:a="http://schemas.openxmlformats.org/drawingml/2006/main" xmlns:r="http://schemas.openxmlformats.org/officeDocument/2006/relationships" xmlns:p="http://schemas.openxmlformats.org/presentationml/2006/main">
+  <p:cSld>
+    <p:spTree>
+      <p:nvGrpSpPr>
+        <p:cNvPr id="1" name=""/>
+        <p:cNvGrpSpPr/>
+        <p:nvPr/>
+      </p:nvGrpSpPr>
+      <p:grpSpPr>
+        <a:xfrm>
+          <a:off x="0" y="0"/>
+          <a:ext cx="0" cy="0"/>
+          <a:chOff x="0" y="0"/>
+          <a:chExt cx="0" cy="0"/>
+        </a:xfrm>
+      </p:grpSpPr>
+      <p:sp>
+        <p:nvSpPr>
+          <p:cNvPr id="2" name="Slide Image Placeholder 1"/>
+          <p:cNvSpPr>
+            <a:spLocks noGrp="1" noRot="1" noChangeAspect="1"/>
+          </p:cNvSpPr>
+          <p:nvPr>
+            <p:ph type="sldImg"/>
+          </p:nvPr>
+        </p:nvSpPr>
+        <p:spPr/>
+      </p:sp>
+      <p:sp>
+        <p:nvSpPr>
+          <p:cNvPr id="3" name="Notes Placeholder 2"/>
+          <p:cNvSpPr>
+            <a:spLocks noGrp="1"/>
+          </p:cNvSpPr>
+          <p:nvPr>
+            <p:ph type="body" idx="1"/>
+          </p:nvPr>
+        </p:nvSpPr>
+        <p:spPr/>
+        <p:txBody>
+          <a:bodyPr/>
+          <a:lstStyle/>
+          <a:p>
+            <a:r>
+              <a:rPr lang="en-US" dirty="0"/>
+              <a:t>Next, we’ll look at the various success metrics</a:t>
+            </a:r>
+          </a:p>
+        </p:txBody>
+      </p:sp>
+      <p:sp>
+        <p:nvSpPr>
+          <p:cNvPr id="4" name="Slide Number Placeholder 3"/>
+          <p:cNvSpPr>
+            <a:spLocks noGrp="1"/>
+          </p:cNvSpPr>
+          <p:nvPr>
+            <p:ph type="sldNum" sz="quarter" idx="5"/>
+          </p:nvPr>
+        </p:nvSpPr>
+        <p:spPr/>
+        <p:txBody>
+          <a:bodyPr/>
+          <a:lstStyle/>
+          <a:p>
+            <a:fld id="{A7B5DF20-A866-4BB7-B325-DAFE65EFD4BA}" type="slidenum">
+              <a:rPr lang="en-US" smtClean="0"/>
+              <a:t>5</a:t>
+            </a:fld>
+            <a:endParaRPr lang="en-US"/>
+          </a:p>
+        </p:txBody>
+      </p:sp>
+    </p:spTree>
+    <p:extLst>
+      <p:ext uri="{BB962C8B-B14F-4D97-AF65-F5344CB8AC3E}">
+        <p14:creationId xmlns:p14="http://schemas.microsoft.com/office/powerpoint/2010/main" val="1311460273"/>
+      </p:ext>
+    </p:extLst>
+  </p:cSld>
+  <p:clrMapOvr>
+    <a:masterClrMapping/>
+  </p:clrMapOvr>
+</p:notes>
+</file>
+
+<file path=ppt/notesSlides/notesSlide6.xml><?xml version="1.0" encoding="utf-8"?>
+<p:notes xmlns:a="http://schemas.openxmlformats.org/drawingml/2006/main" xmlns:r="http://schemas.openxmlformats.org/officeDocument/2006/relationships" xmlns:p="http://schemas.openxmlformats.org/presentationml/2006/main">
+  <p:cSld>
+    <p:spTree>
+      <p:nvGrpSpPr>
+        <p:cNvPr id="1" name=""/>
+        <p:cNvGrpSpPr/>
+        <p:nvPr/>
+      </p:nvGrpSpPr>
+      <p:grpSpPr>
+        <a:xfrm>
+          <a:off x="0" y="0"/>
+          <a:ext cx="0" cy="0"/>
+          <a:chOff x="0" y="0"/>
+          <a:chExt cx="0" cy="0"/>
+        </a:xfrm>
+      </p:grpSpPr>
+      <p:sp>
+        <p:nvSpPr>
+          <p:cNvPr id="2" name="Slide Image Placeholder 1"/>
+          <p:cNvSpPr>
+            <a:spLocks noGrp="1" noRot="1" noChangeAspect="1"/>
+          </p:cNvSpPr>
+          <p:nvPr>
+            <p:ph type="sldImg"/>
+          </p:nvPr>
+        </p:nvSpPr>
+        <p:spPr/>
+      </p:sp>
+      <p:sp>
+        <p:nvSpPr>
+          <p:cNvPr id="3" name="Notes Placeholder 2"/>
+          <p:cNvSpPr>
+            <a:spLocks noGrp="1"/>
+          </p:cNvSpPr>
+          <p:nvPr>
+            <p:ph type="body" idx="1"/>
+          </p:nvPr>
+        </p:nvSpPr>
+        <p:spPr/>
+        <p:txBody>
+          <a:bodyPr/>
+          <a:lstStyle/>
+          <a:p>
+            <a:r>
+              <a:rPr lang="en-US" dirty="0"/>
+              <a:t>We’ll also look briefly at average performance in a few different ways</a:t>
+            </a:r>
+          </a:p>
+        </p:txBody>
+      </p:sp>
+      <p:sp>
+        <p:nvSpPr>
+          <p:cNvPr id="4" name="Slide Number Placeholder 3"/>
+          <p:cNvSpPr>
+            <a:spLocks noGrp="1"/>
+          </p:cNvSpPr>
+          <p:nvPr>
+            <p:ph type="sldNum" sz="quarter" idx="5"/>
+          </p:nvPr>
+        </p:nvSpPr>
+        <p:spPr/>
+        <p:txBody>
+          <a:bodyPr/>
+          <a:lstStyle/>
+          <a:p>
+            <a:fld id="{A7B5DF20-A866-4BB7-B325-DAFE65EFD4BA}" type="slidenum">
+              <a:rPr lang="en-US" smtClean="0"/>
+              <a:t>6</a:t>
+            </a:fld>
+            <a:endParaRPr lang="en-US"/>
+          </a:p>
+        </p:txBody>
+      </p:sp>
+    </p:spTree>
+    <p:extLst>
+      <p:ext uri="{BB962C8B-B14F-4D97-AF65-F5344CB8AC3E}">
+        <p14:creationId xmlns:p14="http://schemas.microsoft.com/office/powerpoint/2010/main" val="4112271002"/>
+      </p:ext>
+    </p:extLst>
+  </p:cSld>
+  <p:clrMapOvr>
+    <a:masterClrMapping/>
+  </p:clrMapOvr>
+</p:notes>
+</file>
+
+<file path=ppt/notesSlides/notesSlide7.xml><?xml version="1.0" encoding="utf-8"?>
+<p:notes xmlns:a="http://schemas.openxmlformats.org/drawingml/2006/main" xmlns:r="http://schemas.openxmlformats.org/officeDocument/2006/relationships" xmlns:p="http://schemas.openxmlformats.org/presentationml/2006/main">
+  <p:cSld>
+    <p:spTree>
+      <p:nvGrpSpPr>
+        <p:cNvPr id="1" name=""/>
+        <p:cNvGrpSpPr/>
+        <p:nvPr/>
+      </p:nvGrpSpPr>
+      <p:grpSpPr>
+        <a:xfrm>
+          <a:off x="0" y="0"/>
+          <a:ext cx="0" cy="0"/>
+          <a:chOff x="0" y="0"/>
+          <a:chExt cx="0" cy="0"/>
+        </a:xfrm>
+      </p:grpSpPr>
+      <p:sp>
+        <p:nvSpPr>
+          <p:cNvPr id="2" name="Slide Image Placeholder 1"/>
+          <p:cNvSpPr>
+            <a:spLocks noGrp="1" noRot="1" noChangeAspect="1"/>
+          </p:cNvSpPr>
+          <p:nvPr>
+            <p:ph type="sldImg"/>
+          </p:nvPr>
+        </p:nvSpPr>
+        <p:spPr/>
+      </p:sp>
+      <p:sp>
+        <p:nvSpPr>
+          <p:cNvPr id="3" name="Notes Placeholder 2"/>
+          <p:cNvSpPr>
+            <a:spLocks noGrp="1"/>
+          </p:cNvSpPr>
+          <p:nvPr>
+            <p:ph type="body" idx="1"/>
+          </p:nvPr>
+        </p:nvSpPr>
+        <p:spPr/>
+        <p:txBody>
+          <a:bodyPr/>
+          <a:lstStyle/>
+          <a:p>
+            <a:r>
+              <a:rPr lang="en-US" dirty="0"/>
+              <a:t>The overall average score for math was 79</a:t>
+            </a:r>
+          </a:p>
+          <a:p>
+            <a:r>
+              <a:rPr lang="en-US" dirty="0"/>
+              <a:t>At the top of the chart, you’ll see blue lines for each of the charter schools, which averaged 83</a:t>
+            </a:r>
+          </a:p>
+          <a:p>
+            <a:r>
+              <a:rPr lang="en-US" dirty="0"/>
+              <a:t>The gray bars at the bottom, show performance for each of the traditional schools, which average 77</a:t>
+            </a:r>
+          </a:p>
+        </p:txBody>
+      </p:sp>
+      <p:sp>
+        <p:nvSpPr>
+          <p:cNvPr id="4" name="Slide Number Placeholder 3"/>
+          <p:cNvSpPr>
+            <a:spLocks noGrp="1"/>
+          </p:cNvSpPr>
+          <p:nvPr>
+            <p:ph type="sldNum" sz="quarter" idx="5"/>
+          </p:nvPr>
+        </p:nvSpPr>
+        <p:spPr/>
+        <p:txBody>
+          <a:bodyPr/>
+          <a:lstStyle/>
+          <a:p>
+            <a:fld id="{A7B5DF20-A866-4BB7-B325-DAFE65EFD4BA}" type="slidenum">
+              <a:rPr lang="en-US" smtClean="0"/>
+              <a:t>7</a:t>
+            </a:fld>
+            <a:endParaRPr lang="en-US"/>
+          </a:p>
+        </p:txBody>
+      </p:sp>
+    </p:spTree>
+    <p:extLst>
+      <p:ext uri="{BB962C8B-B14F-4D97-AF65-F5344CB8AC3E}">
+        <p14:creationId xmlns:p14="http://schemas.microsoft.com/office/powerpoint/2010/main" val="21862219"/>
+      </p:ext>
+    </p:extLst>
+  </p:cSld>
+  <p:clrMapOvr>
+    <a:masterClrMapping/>
+  </p:clrMapOvr>
+</p:notes>
+</file>
+
+<file path=ppt/notesSlides/notesSlide8.xml><?xml version="1.0" encoding="utf-8"?>
+<p:notes xmlns:a="http://schemas.openxmlformats.org/drawingml/2006/main" xmlns:r="http://schemas.openxmlformats.org/officeDocument/2006/relationships" xmlns:p="http://schemas.openxmlformats.org/presentationml/2006/main">
+  <p:cSld>
+    <p:spTree>
+      <p:nvGrpSpPr>
+        <p:cNvPr id="1" name=""/>
+        <p:cNvGrpSpPr/>
+        <p:nvPr/>
+      </p:nvGrpSpPr>
+      <p:grpSpPr>
+        <a:xfrm>
+          <a:off x="0" y="0"/>
+          <a:ext cx="0" cy="0"/>
+          <a:chOff x="0" y="0"/>
+          <a:chExt cx="0" cy="0"/>
+        </a:xfrm>
+      </p:grpSpPr>
+      <p:sp>
+        <p:nvSpPr>
+          <p:cNvPr id="2" name="Slide Image Placeholder 1"/>
+          <p:cNvSpPr>
+            <a:spLocks noGrp="1" noRot="1" noChangeAspect="1"/>
+          </p:cNvSpPr>
+          <p:nvPr>
+            <p:ph type="sldImg"/>
+          </p:nvPr>
+        </p:nvSpPr>
+        <p:spPr/>
+      </p:sp>
+      <p:sp>
+        <p:nvSpPr>
+          <p:cNvPr id="3" name="Notes Placeholder 2"/>
+          <p:cNvSpPr>
+            <a:spLocks noGrp="1"/>
+          </p:cNvSpPr>
+          <p:nvPr>
+            <p:ph type="body" idx="1"/>
+          </p:nvPr>
+        </p:nvSpPr>
+        <p:spPr/>
+        <p:txBody>
+          <a:bodyPr/>
+          <a:lstStyle/>
+          <a:p>
+            <a:r>
+              <a:rPr lang="en-US" dirty="0"/>
+              <a:t>75% of district students passed the math exam.</a:t>
+            </a:r>
+          </a:p>
+          <a:p>
+            <a:r>
+              <a:rPr lang="en-US" dirty="0"/>
+              <a:t>The data show a significant difference between passing rates at charter schools, 94%, and traditional schools, 67%</a:t>
+            </a:r>
+          </a:p>
+        </p:txBody>
+      </p:sp>
+      <p:sp>
+        <p:nvSpPr>
+          <p:cNvPr id="4" name="Slide Number Placeholder 3"/>
+          <p:cNvSpPr>
+            <a:spLocks noGrp="1"/>
+          </p:cNvSpPr>
+          <p:nvPr>
+            <p:ph type="sldNum" sz="quarter" idx="5"/>
+          </p:nvPr>
+        </p:nvSpPr>
+        <p:spPr/>
+        <p:txBody>
+          <a:bodyPr/>
+          <a:lstStyle/>
+          <a:p>
+            <a:fld id="{A7B5DF20-A866-4BB7-B325-DAFE65EFD4BA}" type="slidenum">
+              <a:rPr lang="en-US" smtClean="0"/>
+              <a:t>8</a:t>
+            </a:fld>
+            <a:endParaRPr lang="en-US"/>
+          </a:p>
+        </p:txBody>
+      </p:sp>
+    </p:spTree>
+    <p:extLst>
+      <p:ext uri="{BB962C8B-B14F-4D97-AF65-F5344CB8AC3E}">
+        <p14:creationId xmlns:p14="http://schemas.microsoft.com/office/powerpoint/2010/main" val="448289366"/>
+      </p:ext>
+    </p:extLst>
+  </p:cSld>
+  <p:clrMapOvr>
+    <a:masterClrMapping/>
+  </p:clrMapOvr>
+</p:notes>
+</file>
+
+<file path=ppt/notesSlides/notesSlide9.xml><?xml version="1.0" encoding="utf-8"?>
+<p:notes xmlns:a="http://schemas.openxmlformats.org/drawingml/2006/main" xmlns:r="http://schemas.openxmlformats.org/officeDocument/2006/relationships" xmlns:p="http://schemas.openxmlformats.org/presentationml/2006/main">
+  <p:cSld>
+    <p:spTree>
+      <p:nvGrpSpPr>
+        <p:cNvPr id="1" name=""/>
+        <p:cNvGrpSpPr/>
+        <p:nvPr/>
+      </p:nvGrpSpPr>
+      <p:grpSpPr>
+        <a:xfrm>
+          <a:off x="0" y="0"/>
+          <a:ext cx="0" cy="0"/>
+          <a:chOff x="0" y="0"/>
+          <a:chExt cx="0" cy="0"/>
+        </a:xfrm>
+      </p:grpSpPr>
+      <p:sp>
+        <p:nvSpPr>
+          <p:cNvPr id="2" name="Slide Image Placeholder 1"/>
+          <p:cNvSpPr>
+            <a:spLocks noGrp="1" noRot="1" noChangeAspect="1"/>
+          </p:cNvSpPr>
+          <p:nvPr>
+            <p:ph type="sldImg"/>
+          </p:nvPr>
+        </p:nvSpPr>
+        <p:spPr/>
+      </p:sp>
+      <p:sp>
+        <p:nvSpPr>
+          <p:cNvPr id="3" name="Notes Placeholder 2"/>
+          <p:cNvSpPr>
+            <a:spLocks noGrp="1"/>
+          </p:cNvSpPr>
+          <p:nvPr>
+            <p:ph type="body" idx="1"/>
+          </p:nvPr>
+        </p:nvSpPr>
+        <p:spPr/>
+        <p:txBody>
+          <a:bodyPr/>
+          <a:lstStyle/>
+          <a:p>
+            <a:r>
+              <a:rPr lang="en-US" dirty="0"/>
+              <a:t>Average scores were higher for reading.</a:t>
+            </a:r>
+          </a:p>
+          <a:p>
+            <a:r>
+              <a:rPr lang="en-US" dirty="0"/>
+              <a:t>Note a similar difference in average scores between the two types of schools</a:t>
+            </a:r>
+          </a:p>
+        </p:txBody>
+      </p:sp>
+      <p:sp>
+        <p:nvSpPr>
+          <p:cNvPr id="4" name="Slide Number Placeholder 3"/>
+          <p:cNvSpPr>
+            <a:spLocks noGrp="1"/>
+          </p:cNvSpPr>
+          <p:nvPr>
+            <p:ph type="sldNum" sz="quarter" idx="5"/>
+          </p:nvPr>
+        </p:nvSpPr>
+        <p:spPr/>
+        <p:txBody>
+          <a:bodyPr/>
+          <a:lstStyle/>
+          <a:p>
+            <a:fld id="{A7B5DF20-A866-4BB7-B325-DAFE65EFD4BA}" type="slidenum">
+              <a:rPr lang="en-US" smtClean="0"/>
+              <a:t>9</a:t>
+            </a:fld>
+            <a:endParaRPr lang="en-US"/>
+          </a:p>
+        </p:txBody>
+      </p:sp>
+    </p:spTree>
+    <p:extLst>
+      <p:ext uri="{BB962C8B-B14F-4D97-AF65-F5344CB8AC3E}">
+        <p14:creationId xmlns:p14="http://schemas.microsoft.com/office/powerpoint/2010/main" val="3142316414"/>
+      </p:ext>
+    </p:extLst>
+  </p:cSld>
+  <p:clrMapOvr>
+    <a:masterClrMapping/>
+  </p:clrMapOvr>
+</p:notes>
 </file>
 
 <file path=ppt/slideLayouts/slideLayout1.xml><?xml version="1.0" encoding="utf-8"?>
@@ -3496,7 +5330,7 @@
           <p:nvPr/>
         </p:nvPicPr>
         <p:blipFill>
-          <a:blip r:embed="rId2">
+          <a:blip r:embed="rId3">
             <a:extLst>
               <a:ext uri="{28A0092B-C50C-407E-A947-70E740481C1C}">
                 <a14:useLocalDpi xmlns:a14="http://schemas.microsoft.com/office/drawing/2010/main" val="0"/>
@@ -3681,7 +5515,7 @@
                   <a:schemeClr val="bg1"/>
                 </a:solidFill>
                 <a:latin typeface="Red Hat Display"/>
-                <a:hlinkClick r:id="rId3"/>
+                <a:hlinkClick r:id="rId4"/>
               </a:rPr>
               <a:t>https://www.flickr.com/photos/30478819@N08/51038121971</a:t>
             </a:r>
@@ -3700,7 +5534,7 @@
                   <a:schemeClr val="bg1"/>
                 </a:solidFill>
                 <a:latin typeface="Red Hat Display"/>
-                <a:hlinkClick r:id="rId4"/>
+                <a:hlinkClick r:id="rId5"/>
               </a:rPr>
               <a:t>https://creativecommons.org/licenses/by/2.0/</a:t>
             </a:r>
@@ -3862,7 +5696,7 @@
           <p:nvPr/>
         </p:nvPicPr>
         <p:blipFill>
-          <a:blip r:embed="rId2"/>
+          <a:blip r:embed="rId3"/>
           <a:stretch>
             <a:fillRect/>
           </a:stretch>
@@ -4023,7 +5857,7 @@
           <p:nvPr/>
         </p:nvPicPr>
         <p:blipFill>
-          <a:blip r:embed="rId2"/>
+          <a:blip r:embed="rId3"/>
           <a:stretch>
             <a:fillRect/>
           </a:stretch>
@@ -4179,7 +6013,7 @@
           <p:nvPr/>
         </p:nvPicPr>
         <p:blipFill>
-          <a:blip r:embed="rId2"/>
+          <a:blip r:embed="rId3"/>
           <a:stretch>
             <a:fillRect/>
           </a:stretch>
@@ -4252,55 +6086,356 @@
           </a:p>
         </p:txBody>
       </p:sp>
-      <p:pic>
-        <p:nvPicPr>
-          <p:cNvPr id="7170" name="Picture 2">
-            <a:extLst>
-              <a:ext uri="{FF2B5EF4-FFF2-40B4-BE49-F238E27FC236}">
-                <a16:creationId xmlns:a16="http://schemas.microsoft.com/office/drawing/2014/main" id="{5D1D14E1-8794-49FE-9796-0A9ED12638F7}"/>
-              </a:ext>
-            </a:extLst>
-          </p:cNvPr>
-          <p:cNvPicPr>
-            <a:picLocks noGrp="1" noChangeAspect="1" noChangeArrowheads="1"/>
-          </p:cNvPicPr>
+      <p:graphicFrame>
+        <p:nvGraphicFramePr>
+          <p:cNvPr id="4" name="Table 4">
+            <a:extLst>
+              <a:ext uri="{FF2B5EF4-FFF2-40B4-BE49-F238E27FC236}">
+                <a16:creationId xmlns:a16="http://schemas.microsoft.com/office/drawing/2014/main" id="{ACC0AED6-1FD9-4159-9687-FA06212BC346}"/>
+              </a:ext>
+            </a:extLst>
+          </p:cNvPr>
+          <p:cNvGraphicFramePr>
+            <a:graphicFrameLocks noGrp="1"/>
+          </p:cNvGraphicFramePr>
           <p:nvPr>
             <p:ph idx="1"/>
-          </p:nvPr>
-        </p:nvPicPr>
-        <p:blipFill>
-          <a:blip r:embed="rId2">
-            <a:extLst>
-              <a:ext uri="{28A0092B-C50C-407E-A947-70E740481C1C}">
-                <a14:useLocalDpi xmlns:a14="http://schemas.microsoft.com/office/drawing/2010/main" val="0"/>
-              </a:ext>
-            </a:extLst>
-          </a:blip>
-          <a:srcRect/>
-          <a:stretch>
-            <a:fillRect/>
-          </a:stretch>
-        </p:blipFill>
-        <p:spPr bwMode="auto">
-          <a:xfrm>
-            <a:off x="838199" y="1690688"/>
-            <a:ext cx="9596495" cy="1562466"/>
-          </a:xfrm>
-          <a:prstGeom prst="rect">
-            <a:avLst/>
-          </a:prstGeom>
-          <a:noFill/>
-          <a:extLst>
-            <a:ext uri="{909E8E84-426E-40DD-AFC4-6F175D3DCCD1}">
-              <a14:hiddenFill xmlns:a14="http://schemas.microsoft.com/office/drawing/2010/main">
-                <a:solidFill>
-                  <a:srgbClr val="FFFFFF"/>
-                </a:solidFill>
-              </a14:hiddenFill>
-            </a:ext>
-          </a:extLst>
-        </p:spPr>
-      </p:pic>
+            <p:extLst>
+              <p:ext uri="{D42A27DB-BD31-4B8C-83A1-F6EECF244321}">
+                <p14:modId xmlns:p14="http://schemas.microsoft.com/office/powerpoint/2010/main" val="2270391039"/>
+              </p:ext>
+            </p:extLst>
+          </p:nvPr>
+        </p:nvGraphicFramePr>
+        <p:xfrm>
+          <a:off x="838200" y="1825625"/>
+          <a:ext cx="10184448" cy="1112520"/>
+        </p:xfrm>
+        <a:graphic>
+          <a:graphicData uri="http://schemas.openxmlformats.org/drawingml/2006/table">
+            <a:tbl>
+              <a:tblPr firstRow="1" bandRow="1">
+                <a:tableStyleId>{5C22544A-7EE6-4342-B048-85BDC9FD1C3A}</a:tableStyleId>
+              </a:tblPr>
+              <a:tblGrid>
+                <a:gridCol w="1221296">
+                  <a:extLst>
+                    <a:ext uri="{9D8B030D-6E8A-4147-A177-3AD203B41FA5}">
+                      <a16:colId xmlns:a16="http://schemas.microsoft.com/office/drawing/2014/main" val="1736630949"/>
+                    </a:ext>
+                  </a:extLst>
+                </a:gridCol>
+                <a:gridCol w="1683448">
+                  <a:extLst>
+                    <a:ext uri="{9D8B030D-6E8A-4147-A177-3AD203B41FA5}">
+                      <a16:colId xmlns:a16="http://schemas.microsoft.com/office/drawing/2014/main" val="2082215429"/>
+                    </a:ext>
+                  </a:extLst>
+                </a:gridCol>
+                <a:gridCol w="1898904">
+                  <a:extLst>
+                    <a:ext uri="{9D8B030D-6E8A-4147-A177-3AD203B41FA5}">
+                      <a16:colId xmlns:a16="http://schemas.microsoft.com/office/drawing/2014/main" val="2465931278"/>
+                    </a:ext>
+                  </a:extLst>
+                </a:gridCol>
+                <a:gridCol w="1706372">
+                  <a:extLst>
+                    <a:ext uri="{9D8B030D-6E8A-4147-A177-3AD203B41FA5}">
+                      <a16:colId xmlns:a16="http://schemas.microsoft.com/office/drawing/2014/main" val="3277486119"/>
+                    </a:ext>
+                  </a:extLst>
+                </a:gridCol>
+                <a:gridCol w="1921828">
+                  <a:extLst>
+                    <a:ext uri="{9D8B030D-6E8A-4147-A177-3AD203B41FA5}">
+                      <a16:colId xmlns:a16="http://schemas.microsoft.com/office/drawing/2014/main" val="4167427998"/>
+                    </a:ext>
+                  </a:extLst>
+                </a:gridCol>
+                <a:gridCol w="1752600">
+                  <a:extLst>
+                    <a:ext uri="{9D8B030D-6E8A-4147-A177-3AD203B41FA5}">
+                      <a16:colId xmlns:a16="http://schemas.microsoft.com/office/drawing/2014/main" val="2733126066"/>
+                    </a:ext>
+                  </a:extLst>
+                </a:gridCol>
+              </a:tblGrid>
+              <a:tr h="370840">
+                <a:tc>
+                  <a:txBody>
+                    <a:bodyPr/>
+                    <a:lstStyle/>
+                    <a:p>
+                      <a:pPr algn="ctr"/>
+                      <a:r>
+                        <a:rPr lang="en-US" dirty="0"/>
+                        <a:t>Type</a:t>
+                      </a:r>
+                    </a:p>
+                  </a:txBody>
+                  <a:tcPr/>
+                </a:tc>
+                <a:tc>
+                  <a:txBody>
+                    <a:bodyPr/>
+                    <a:lstStyle/>
+                    <a:p>
+                      <a:pPr algn="ctr"/>
+                      <a:r>
+                        <a:rPr lang="en-US" dirty="0"/>
+                        <a:t>Avg math score</a:t>
+                      </a:r>
+                    </a:p>
+                  </a:txBody>
+                  <a:tcPr/>
+                </a:tc>
+                <a:tc>
+                  <a:txBody>
+                    <a:bodyPr/>
+                    <a:lstStyle/>
+                    <a:p>
+                      <a:pPr algn="ctr"/>
+                      <a:r>
+                        <a:rPr lang="en-US" dirty="0"/>
+                        <a:t>Avg reading score</a:t>
+                      </a:r>
+                    </a:p>
+                  </a:txBody>
+                  <a:tcPr/>
+                </a:tc>
+                <a:tc>
+                  <a:txBody>
+                    <a:bodyPr/>
+                    <a:lstStyle/>
+                    <a:p>
+                      <a:pPr algn="ctr"/>
+                      <a:r>
+                        <a:rPr lang="en-US" dirty="0"/>
+                        <a:t>% passing math</a:t>
+                      </a:r>
+                    </a:p>
+                  </a:txBody>
+                  <a:tcPr/>
+                </a:tc>
+                <a:tc>
+                  <a:txBody>
+                    <a:bodyPr/>
+                    <a:lstStyle/>
+                    <a:p>
+                      <a:pPr algn="ctr"/>
+                      <a:r>
+                        <a:rPr lang="en-US" dirty="0"/>
+                        <a:t>% passing reading</a:t>
+                      </a:r>
+                    </a:p>
+                  </a:txBody>
+                  <a:tcPr/>
+                </a:tc>
+                <a:tc>
+                  <a:txBody>
+                    <a:bodyPr/>
+                    <a:lstStyle/>
+                    <a:p>
+                      <a:pPr algn="ctr"/>
+                      <a:r>
+                        <a:rPr lang="en-US" dirty="0"/>
+                        <a:t>% passing both</a:t>
+                      </a:r>
+                    </a:p>
+                  </a:txBody>
+                  <a:tcPr/>
+                </a:tc>
+                <a:extLst>
+                  <a:ext uri="{0D108BD9-81ED-4DB2-BD59-A6C34878D82A}">
+                    <a16:rowId xmlns:a16="http://schemas.microsoft.com/office/drawing/2014/main" val="1103331193"/>
+                  </a:ext>
+                </a:extLst>
+              </a:tr>
+              <a:tr h="370840">
+                <a:tc>
+                  <a:txBody>
+                    <a:bodyPr/>
+                    <a:lstStyle/>
+                    <a:p>
+                      <a:r>
+                        <a:rPr lang="en-US" dirty="0"/>
+                        <a:t>Charter</a:t>
+                      </a:r>
+                    </a:p>
+                  </a:txBody>
+                  <a:tcPr/>
+                </a:tc>
+                <a:tc>
+                  <a:txBody>
+                    <a:bodyPr/>
+                    <a:lstStyle/>
+                    <a:p>
+                      <a:pPr algn="r"/>
+                      <a:r>
+                        <a:rPr lang="en-US" dirty="0"/>
+                        <a:t>84</a:t>
+                      </a:r>
+                    </a:p>
+                  </a:txBody>
+                  <a:tcPr/>
+                </a:tc>
+                <a:tc>
+                  <a:txBody>
+                    <a:bodyPr/>
+                    <a:lstStyle/>
+                    <a:p>
+                      <a:pPr algn="r"/>
+                      <a:r>
+                        <a:rPr lang="en-US" dirty="0"/>
+                        <a:t>84</a:t>
+                      </a:r>
+                    </a:p>
+                  </a:txBody>
+                  <a:tcPr/>
+                </a:tc>
+                <a:tc>
+                  <a:txBody>
+                    <a:bodyPr/>
+                    <a:lstStyle/>
+                    <a:p>
+                      <a:pPr algn="r"/>
+                      <a:r>
+                        <a:rPr lang="en-US" dirty="0"/>
+                        <a:t>94</a:t>
+                      </a:r>
+                    </a:p>
+                  </a:txBody>
+                  <a:tcPr/>
+                </a:tc>
+                <a:tc>
+                  <a:txBody>
+                    <a:bodyPr/>
+                    <a:lstStyle/>
+                    <a:p>
+                      <a:pPr algn="r"/>
+                      <a:r>
+                        <a:rPr lang="en-US" dirty="0"/>
+                        <a:t>97</a:t>
+                      </a:r>
+                    </a:p>
+                  </a:txBody>
+                  <a:tcPr/>
+                </a:tc>
+                <a:tc>
+                  <a:txBody>
+                    <a:bodyPr/>
+                    <a:lstStyle/>
+                    <a:p>
+                      <a:pPr algn="r"/>
+                      <a:r>
+                        <a:rPr lang="en-US" dirty="0"/>
+                        <a:t>90</a:t>
+                      </a:r>
+                    </a:p>
+                  </a:txBody>
+                  <a:tcPr/>
+                </a:tc>
+                <a:extLst>
+                  <a:ext uri="{0D108BD9-81ED-4DB2-BD59-A6C34878D82A}">
+                    <a16:rowId xmlns:a16="http://schemas.microsoft.com/office/drawing/2014/main" val="3686406876"/>
+                  </a:ext>
+                </a:extLst>
+              </a:tr>
+              <a:tr h="370840">
+                <a:tc>
+                  <a:txBody>
+                    <a:bodyPr/>
+                    <a:lstStyle/>
+                    <a:p>
+                      <a:r>
+                        <a:rPr lang="en-US" dirty="0"/>
+                        <a:t>Traditional</a:t>
+                      </a:r>
+                    </a:p>
+                  </a:txBody>
+                  <a:tcPr/>
+                </a:tc>
+                <a:tc>
+                  <a:txBody>
+                    <a:bodyPr/>
+                    <a:lstStyle/>
+                    <a:p>
+                      <a:pPr algn="r"/>
+                      <a:r>
+                        <a:rPr lang="en-US" dirty="0"/>
+                        <a:t>77</a:t>
+                      </a:r>
+                    </a:p>
+                  </a:txBody>
+                  <a:tcPr/>
+                </a:tc>
+                <a:tc>
+                  <a:txBody>
+                    <a:bodyPr/>
+                    <a:lstStyle/>
+                    <a:p>
+                      <a:pPr algn="r"/>
+                      <a:r>
+                        <a:rPr lang="en-US" dirty="0"/>
+                        <a:t>81</a:t>
+                      </a:r>
+                    </a:p>
+                  </a:txBody>
+                  <a:tcPr/>
+                </a:tc>
+                <a:tc>
+                  <a:txBody>
+                    <a:bodyPr/>
+                    <a:lstStyle/>
+                    <a:p>
+                      <a:pPr algn="r"/>
+                      <a:r>
+                        <a:rPr lang="en-US" dirty="0"/>
+                        <a:t>67</a:t>
+                      </a:r>
+                    </a:p>
+                  </a:txBody>
+                  <a:tcPr/>
+                </a:tc>
+                <a:tc>
+                  <a:txBody>
+                    <a:bodyPr/>
+                    <a:lstStyle/>
+                    <a:p>
+                      <a:pPr algn="r"/>
+                      <a:r>
+                        <a:rPr lang="en-US" dirty="0"/>
+                        <a:t>81</a:t>
+                      </a:r>
+                    </a:p>
+                  </a:txBody>
+                  <a:tcPr/>
+                </a:tc>
+                <a:tc>
+                  <a:txBody>
+                    <a:bodyPr/>
+                    <a:lstStyle/>
+                    <a:p>
+                      <a:pPr algn="r"/>
+                      <a:r>
+                        <a:rPr lang="en-US" dirty="0"/>
+                        <a:t>54</a:t>
+                      </a:r>
+                    </a:p>
+                  </a:txBody>
+                  <a:tcPr/>
+                </a:tc>
+                <a:extLst>
+                  <a:ext uri="{0D108BD9-81ED-4DB2-BD59-A6C34878D82A}">
+                    <a16:rowId xmlns:a16="http://schemas.microsoft.com/office/drawing/2014/main" val="1727784043"/>
+                  </a:ext>
+                </a:extLst>
+              </a:tr>
+            </a:tbl>
+          </a:graphicData>
+        </a:graphic>
+      </p:graphicFrame>
     </p:spTree>
     <p:extLst>
       <p:ext uri="{BB962C8B-B14F-4D97-AF65-F5344CB8AC3E}">
@@ -4359,59 +6494,540 @@
           </a:p>
         </p:txBody>
       </p:sp>
-      <p:pic>
-        <p:nvPicPr>
-          <p:cNvPr id="5122" name="Picture 2" descr="Scores_by_student_spending_original">
-            <a:extLst>
-              <a:ext uri="{FF2B5EF4-FFF2-40B4-BE49-F238E27FC236}">
-                <a16:creationId xmlns:a16="http://schemas.microsoft.com/office/drawing/2014/main" id="{DFA3E6FB-DE88-4AE0-9A8D-4A76E719CA9B}"/>
-              </a:ext>
-            </a:extLst>
-          </p:cNvPr>
-          <p:cNvPicPr>
-            <a:picLocks noGrp="1" noChangeAspect="1" noChangeArrowheads="1"/>
-          </p:cNvPicPr>
+      <p:graphicFrame>
+        <p:nvGraphicFramePr>
+          <p:cNvPr id="4" name="Table 4">
+            <a:extLst>
+              <a:ext uri="{FF2B5EF4-FFF2-40B4-BE49-F238E27FC236}">
+                <a16:creationId xmlns:a16="http://schemas.microsoft.com/office/drawing/2014/main" id="{ACC0AED6-1FD9-4159-9687-FA06212BC346}"/>
+              </a:ext>
+            </a:extLst>
+          </p:cNvPr>
+          <p:cNvGraphicFramePr>
+            <a:graphicFrameLocks noGrp="1"/>
+          </p:cNvGraphicFramePr>
           <p:nvPr>
             <p:ph idx="1"/>
-          </p:nvPr>
-        </p:nvPicPr>
-        <p:blipFill>
-          <a:blip r:embed="rId2">
-            <a:extLst>
-              <a:ext uri="{28A0092B-C50C-407E-A947-70E740481C1C}">
-                <a14:useLocalDpi xmlns:a14="http://schemas.microsoft.com/office/drawing/2010/main" val="0"/>
-              </a:ext>
-            </a:extLst>
-          </a:blip>
-          <a:srcRect/>
-          <a:stretch>
-            <a:fillRect/>
-          </a:stretch>
-        </p:blipFill>
-        <p:spPr bwMode="auto">
-          <a:xfrm>
-            <a:off x="838200" y="1690688"/>
-            <a:ext cx="9929160" cy="1931743"/>
-          </a:xfrm>
-          <a:prstGeom prst="rect">
-            <a:avLst/>
-          </a:prstGeom>
-          <a:noFill/>
-          <a:extLst>
-            <a:ext uri="{909E8E84-426E-40DD-AFC4-6F175D3DCCD1}">
-              <a14:hiddenFill xmlns:a14="http://schemas.microsoft.com/office/drawing/2010/main">
-                <a:solidFill>
-                  <a:srgbClr val="FFFFFF"/>
-                </a:solidFill>
-              </a14:hiddenFill>
-            </a:ext>
-          </a:extLst>
-        </p:spPr>
-      </p:pic>
+            <p:extLst>
+              <p:ext uri="{D42A27DB-BD31-4B8C-83A1-F6EECF244321}">
+                <p14:modId xmlns:p14="http://schemas.microsoft.com/office/powerpoint/2010/main" val="458906307"/>
+              </p:ext>
+            </p:extLst>
+          </p:nvPr>
+        </p:nvGraphicFramePr>
+        <p:xfrm>
+          <a:off x="838200" y="1825625"/>
+          <a:ext cx="9292936" cy="2123440"/>
+        </p:xfrm>
+        <a:graphic>
+          <a:graphicData uri="http://schemas.openxmlformats.org/drawingml/2006/table">
+            <a:tbl>
+              <a:tblPr firstRow="1" bandRow="1">
+                <a:tableStyleId>{5C22544A-7EE6-4342-B048-85BDC9FD1C3A}</a:tableStyleId>
+              </a:tblPr>
+              <a:tblGrid>
+                <a:gridCol w="1666009">
+                  <a:extLst>
+                    <a:ext uri="{9D8B030D-6E8A-4147-A177-3AD203B41FA5}">
+                      <a16:colId xmlns:a16="http://schemas.microsoft.com/office/drawing/2014/main" val="1736630949"/>
+                    </a:ext>
+                  </a:extLst>
+                </a:gridCol>
+                <a:gridCol w="1238735">
+                  <a:extLst>
+                    <a:ext uri="{9D8B030D-6E8A-4147-A177-3AD203B41FA5}">
+                      <a16:colId xmlns:a16="http://schemas.microsoft.com/office/drawing/2014/main" val="2082215429"/>
+                    </a:ext>
+                  </a:extLst>
+                </a:gridCol>
+                <a:gridCol w="1494074">
+                  <a:extLst>
+                    <a:ext uri="{9D8B030D-6E8A-4147-A177-3AD203B41FA5}">
+                      <a16:colId xmlns:a16="http://schemas.microsoft.com/office/drawing/2014/main" val="2465931278"/>
+                    </a:ext>
+                  </a:extLst>
+                </a:gridCol>
+                <a:gridCol w="1610591">
+                  <a:extLst>
+                    <a:ext uri="{9D8B030D-6E8A-4147-A177-3AD203B41FA5}">
+                      <a16:colId xmlns:a16="http://schemas.microsoft.com/office/drawing/2014/main" val="3277486119"/>
+                    </a:ext>
+                  </a:extLst>
+                </a:gridCol>
+                <a:gridCol w="1766455">
+                  <a:extLst>
+                    <a:ext uri="{9D8B030D-6E8A-4147-A177-3AD203B41FA5}">
+                      <a16:colId xmlns:a16="http://schemas.microsoft.com/office/drawing/2014/main" val="4167427998"/>
+                    </a:ext>
+                  </a:extLst>
+                </a:gridCol>
+                <a:gridCol w="1517072">
+                  <a:extLst>
+                    <a:ext uri="{9D8B030D-6E8A-4147-A177-3AD203B41FA5}">
+                      <a16:colId xmlns:a16="http://schemas.microsoft.com/office/drawing/2014/main" val="2733126066"/>
+                    </a:ext>
+                  </a:extLst>
+                </a:gridCol>
+              </a:tblGrid>
+              <a:tr h="370840">
+                <a:tc>
+                  <a:txBody>
+                    <a:bodyPr/>
+                    <a:lstStyle/>
+                    <a:p>
+                      <a:pPr algn="ctr"/>
+                      <a:r>
+                        <a:rPr lang="en-US" dirty="0"/>
+                        <a:t>Spending range (per student)</a:t>
+                      </a:r>
+                    </a:p>
+                  </a:txBody>
+                  <a:tcPr/>
+                </a:tc>
+                <a:tc>
+                  <a:txBody>
+                    <a:bodyPr/>
+                    <a:lstStyle/>
+                    <a:p>
+                      <a:pPr algn="ctr"/>
+                      <a:r>
+                        <a:rPr lang="en-US" dirty="0"/>
+                        <a:t>Avg math score</a:t>
+                      </a:r>
+                    </a:p>
+                  </a:txBody>
+                  <a:tcPr/>
+                </a:tc>
+                <a:tc>
+                  <a:txBody>
+                    <a:bodyPr/>
+                    <a:lstStyle/>
+                    <a:p>
+                      <a:pPr algn="ctr"/>
+                      <a:r>
+                        <a:rPr lang="en-US" dirty="0"/>
+                        <a:t>Avg reading score</a:t>
+                      </a:r>
+                    </a:p>
+                  </a:txBody>
+                  <a:tcPr/>
+                </a:tc>
+                <a:tc>
+                  <a:txBody>
+                    <a:bodyPr/>
+                    <a:lstStyle/>
+                    <a:p>
+                      <a:pPr algn="ctr"/>
+                      <a:r>
+                        <a:rPr lang="en-US" dirty="0"/>
+                        <a:t>% passing math</a:t>
+                      </a:r>
+                    </a:p>
+                  </a:txBody>
+                  <a:tcPr/>
+                </a:tc>
+                <a:tc>
+                  <a:txBody>
+                    <a:bodyPr/>
+                    <a:lstStyle/>
+                    <a:p>
+                      <a:pPr algn="ctr"/>
+                      <a:r>
+                        <a:rPr lang="en-US" dirty="0"/>
+                        <a:t>% passing reading</a:t>
+                      </a:r>
+                    </a:p>
+                  </a:txBody>
+                  <a:tcPr/>
+                </a:tc>
+                <a:tc>
+                  <a:txBody>
+                    <a:bodyPr/>
+                    <a:lstStyle/>
+                    <a:p>
+                      <a:pPr algn="ctr"/>
+                      <a:r>
+                        <a:rPr lang="en-US" dirty="0"/>
+                        <a:t>% passing both</a:t>
+                      </a:r>
+                    </a:p>
+                  </a:txBody>
+                  <a:tcPr/>
+                </a:tc>
+                <a:extLst>
+                  <a:ext uri="{0D108BD9-81ED-4DB2-BD59-A6C34878D82A}">
+                    <a16:rowId xmlns:a16="http://schemas.microsoft.com/office/drawing/2014/main" val="1103331193"/>
+                  </a:ext>
+                </a:extLst>
+              </a:tr>
+              <a:tr h="370840">
+                <a:tc>
+                  <a:txBody>
+                    <a:bodyPr/>
+                    <a:lstStyle/>
+                    <a:p>
+                      <a:r>
+                        <a:rPr lang="en-US" dirty="0"/>
+                        <a:t>&lt; $584</a:t>
+                      </a:r>
+                    </a:p>
+                  </a:txBody>
+                  <a:tcPr/>
+                </a:tc>
+                <a:tc>
+                  <a:txBody>
+                    <a:bodyPr/>
+                    <a:lstStyle/>
+                    <a:p>
+                      <a:pPr algn="r"/>
+                      <a:r>
+                        <a:rPr lang="en-US" dirty="0"/>
+                        <a:t>84</a:t>
+                      </a:r>
+                    </a:p>
+                  </a:txBody>
+                  <a:tcPr/>
+                </a:tc>
+                <a:tc>
+                  <a:txBody>
+                    <a:bodyPr/>
+                    <a:lstStyle/>
+                    <a:p>
+                      <a:pPr algn="r"/>
+                      <a:r>
+                        <a:rPr lang="en-US" dirty="0"/>
+                        <a:t>84</a:t>
+                      </a:r>
+                    </a:p>
+                  </a:txBody>
+                  <a:tcPr/>
+                </a:tc>
+                <a:tc>
+                  <a:txBody>
+                    <a:bodyPr/>
+                    <a:lstStyle/>
+                    <a:p>
+                      <a:pPr algn="r"/>
+                      <a:r>
+                        <a:rPr lang="en-US" dirty="0"/>
+                        <a:t>93</a:t>
+                      </a:r>
+                    </a:p>
+                  </a:txBody>
+                  <a:tcPr/>
+                </a:tc>
+                <a:tc>
+                  <a:txBody>
+                    <a:bodyPr/>
+                    <a:lstStyle/>
+                    <a:p>
+                      <a:pPr algn="r"/>
+                      <a:r>
+                        <a:rPr lang="en-US" dirty="0"/>
+                        <a:t>97</a:t>
+                      </a:r>
+                    </a:p>
+                  </a:txBody>
+                  <a:tcPr/>
+                </a:tc>
+                <a:tc>
+                  <a:txBody>
+                    <a:bodyPr/>
+                    <a:lstStyle/>
+                    <a:p>
+                      <a:pPr algn="r"/>
+                      <a:r>
+                        <a:rPr lang="en-US" dirty="0"/>
+                        <a:t>90</a:t>
+                      </a:r>
+                    </a:p>
+                  </a:txBody>
+                  <a:tcPr/>
+                </a:tc>
+                <a:extLst>
+                  <a:ext uri="{0D108BD9-81ED-4DB2-BD59-A6C34878D82A}">
+                    <a16:rowId xmlns:a16="http://schemas.microsoft.com/office/drawing/2014/main" val="3686406876"/>
+                  </a:ext>
+                </a:extLst>
+              </a:tr>
+              <a:tr h="370840">
+                <a:tc>
+                  <a:txBody>
+                    <a:bodyPr/>
+                    <a:lstStyle/>
+                    <a:p>
+                      <a:r>
+                        <a:rPr lang="en-US" dirty="0"/>
+                        <a:t>$585-629</a:t>
+                      </a:r>
+                    </a:p>
+                  </a:txBody>
+                  <a:tcPr/>
+                </a:tc>
+                <a:tc>
+                  <a:txBody>
+                    <a:bodyPr/>
+                    <a:lstStyle/>
+                    <a:p>
+                      <a:pPr algn="r"/>
+                      <a:r>
+                        <a:rPr lang="en-US" dirty="0"/>
+                        <a:t>82</a:t>
+                      </a:r>
+                    </a:p>
+                  </a:txBody>
+                  <a:tcPr/>
+                </a:tc>
+                <a:tc>
+                  <a:txBody>
+                    <a:bodyPr/>
+                    <a:lstStyle/>
+                    <a:p>
+                      <a:pPr algn="r"/>
+                      <a:r>
+                        <a:rPr lang="en-US" dirty="0"/>
+                        <a:t>83</a:t>
+                      </a:r>
+                    </a:p>
+                  </a:txBody>
+                  <a:tcPr/>
+                </a:tc>
+                <a:tc>
+                  <a:txBody>
+                    <a:bodyPr/>
+                    <a:lstStyle/>
+                    <a:p>
+                      <a:pPr algn="r"/>
+                      <a:r>
+                        <a:rPr lang="en-US" dirty="0"/>
+                        <a:t>87</a:t>
+                      </a:r>
+                    </a:p>
+                  </a:txBody>
+                  <a:tcPr/>
+                </a:tc>
+                <a:tc>
+                  <a:txBody>
+                    <a:bodyPr/>
+                    <a:lstStyle/>
+                    <a:p>
+                      <a:pPr algn="r"/>
+                      <a:r>
+                        <a:rPr lang="en-US" dirty="0"/>
+                        <a:t>93</a:t>
+                      </a:r>
+                    </a:p>
+                  </a:txBody>
+                  <a:tcPr/>
+                </a:tc>
+                <a:tc>
+                  <a:txBody>
+                    <a:bodyPr/>
+                    <a:lstStyle/>
+                    <a:p>
+                      <a:pPr algn="r"/>
+                      <a:r>
+                        <a:rPr lang="en-US" dirty="0"/>
+                        <a:t>81</a:t>
+                      </a:r>
+                    </a:p>
+                  </a:txBody>
+                  <a:tcPr/>
+                </a:tc>
+                <a:extLst>
+                  <a:ext uri="{0D108BD9-81ED-4DB2-BD59-A6C34878D82A}">
+                    <a16:rowId xmlns:a16="http://schemas.microsoft.com/office/drawing/2014/main" val="4292956545"/>
+                  </a:ext>
+                </a:extLst>
+              </a:tr>
+              <a:tr h="370840">
+                <a:tc>
+                  <a:txBody>
+                    <a:bodyPr/>
+                    <a:lstStyle/>
+                    <a:p>
+                      <a:r>
+                        <a:rPr lang="en-US" dirty="0"/>
+                        <a:t>$630-644</a:t>
+                      </a:r>
+                    </a:p>
+                  </a:txBody>
+                  <a:tcPr/>
+                </a:tc>
+                <a:tc>
+                  <a:txBody>
+                    <a:bodyPr/>
+                    <a:lstStyle/>
+                    <a:p>
+                      <a:pPr algn="r"/>
+                      <a:r>
+                        <a:rPr lang="en-US" dirty="0"/>
+                        <a:t>79</a:t>
+                      </a:r>
+                    </a:p>
+                  </a:txBody>
+                  <a:tcPr/>
+                </a:tc>
+                <a:tc>
+                  <a:txBody>
+                    <a:bodyPr/>
+                    <a:lstStyle/>
+                    <a:p>
+                      <a:pPr algn="r"/>
+                      <a:r>
+                        <a:rPr lang="en-US" dirty="0"/>
+                        <a:t>82</a:t>
+                      </a:r>
+                    </a:p>
+                  </a:txBody>
+                  <a:tcPr/>
+                </a:tc>
+                <a:tc>
+                  <a:txBody>
+                    <a:bodyPr/>
+                    <a:lstStyle/>
+                    <a:p>
+                      <a:pPr algn="r"/>
+                      <a:r>
+                        <a:rPr lang="en-US" dirty="0"/>
+                        <a:t>73</a:t>
+                      </a:r>
+                    </a:p>
+                  </a:txBody>
+                  <a:tcPr/>
+                </a:tc>
+                <a:tc>
+                  <a:txBody>
+                    <a:bodyPr/>
+                    <a:lstStyle/>
+                    <a:p>
+                      <a:pPr algn="r"/>
+                      <a:r>
+                        <a:rPr lang="en-US" dirty="0"/>
+                        <a:t>84</a:t>
+                      </a:r>
+                    </a:p>
+                  </a:txBody>
+                  <a:tcPr/>
+                </a:tc>
+                <a:tc>
+                  <a:txBody>
+                    <a:bodyPr/>
+                    <a:lstStyle/>
+                    <a:p>
+                      <a:pPr algn="r"/>
+                      <a:r>
+                        <a:rPr lang="en-US" dirty="0"/>
+                        <a:t>63</a:t>
+                      </a:r>
+                    </a:p>
+                  </a:txBody>
+                  <a:tcPr/>
+                </a:tc>
+                <a:extLst>
+                  <a:ext uri="{0D108BD9-81ED-4DB2-BD59-A6C34878D82A}">
+                    <a16:rowId xmlns:a16="http://schemas.microsoft.com/office/drawing/2014/main" val="3342695760"/>
+                  </a:ext>
+                </a:extLst>
+              </a:tr>
+              <a:tr h="370840">
+                <a:tc>
+                  <a:txBody>
+                    <a:bodyPr/>
+                    <a:lstStyle/>
+                    <a:p>
+                      <a:r>
+                        <a:rPr lang="en-US" dirty="0"/>
+                        <a:t>$645-675</a:t>
+                      </a:r>
+                    </a:p>
+                  </a:txBody>
+                  <a:tcPr/>
+                </a:tc>
+                <a:tc>
+                  <a:txBody>
+                    <a:bodyPr/>
+                    <a:lstStyle/>
+                    <a:p>
+                      <a:pPr algn="r"/>
+                      <a:r>
+                        <a:rPr lang="en-US" dirty="0"/>
+                        <a:t>77</a:t>
+                      </a:r>
+                    </a:p>
+                  </a:txBody>
+                  <a:tcPr/>
+                </a:tc>
+                <a:tc>
+                  <a:txBody>
+                    <a:bodyPr/>
+                    <a:lstStyle/>
+                    <a:p>
+                      <a:pPr algn="r"/>
+                      <a:r>
+                        <a:rPr lang="en-US" dirty="0"/>
+                        <a:t>81</a:t>
+                      </a:r>
+                    </a:p>
+                  </a:txBody>
+                  <a:tcPr/>
+                </a:tc>
+                <a:tc>
+                  <a:txBody>
+                    <a:bodyPr/>
+                    <a:lstStyle/>
+                    <a:p>
+                      <a:pPr algn="r"/>
+                      <a:r>
+                        <a:rPr lang="en-US" dirty="0"/>
+                        <a:t>66</a:t>
+                      </a:r>
+                    </a:p>
+                  </a:txBody>
+                  <a:tcPr/>
+                </a:tc>
+                <a:tc>
+                  <a:txBody>
+                    <a:bodyPr/>
+                    <a:lstStyle/>
+                    <a:p>
+                      <a:pPr algn="r"/>
+                      <a:r>
+                        <a:rPr lang="en-US" dirty="0"/>
+                        <a:t>81</a:t>
+                      </a:r>
+                    </a:p>
+                  </a:txBody>
+                  <a:tcPr/>
+                </a:tc>
+                <a:tc>
+                  <a:txBody>
+                    <a:bodyPr/>
+                    <a:lstStyle/>
+                    <a:p>
+                      <a:pPr algn="r"/>
+                      <a:r>
+                        <a:rPr lang="en-US" dirty="0"/>
+                        <a:t>54</a:t>
+                      </a:r>
+                    </a:p>
+                  </a:txBody>
+                  <a:tcPr/>
+                </a:tc>
+                <a:extLst>
+                  <a:ext uri="{0D108BD9-81ED-4DB2-BD59-A6C34878D82A}">
+                    <a16:rowId xmlns:a16="http://schemas.microsoft.com/office/drawing/2014/main" val="1727784043"/>
+                  </a:ext>
+                </a:extLst>
+              </a:tr>
+            </a:tbl>
+          </a:graphicData>
+        </a:graphic>
+      </p:graphicFrame>
     </p:spTree>
     <p:extLst>
       <p:ext uri="{BB962C8B-B14F-4D97-AF65-F5344CB8AC3E}">
-        <p14:creationId xmlns:p14="http://schemas.microsoft.com/office/powerpoint/2010/main" val="1394594586"/>
+        <p14:creationId xmlns:p14="http://schemas.microsoft.com/office/powerpoint/2010/main" val="3743605804"/>
       </p:ext>
     </p:extLst>
   </p:cSld>
@@ -4466,59 +7082,450 @@
           </a:p>
         </p:txBody>
       </p:sp>
-      <p:pic>
-        <p:nvPicPr>
-          <p:cNvPr id="6146" name="Picture 2" descr="Scores_by_school_size_original">
-            <a:extLst>
-              <a:ext uri="{FF2B5EF4-FFF2-40B4-BE49-F238E27FC236}">
-                <a16:creationId xmlns:a16="http://schemas.microsoft.com/office/drawing/2014/main" id="{5BF5FB9F-CC5D-45AE-8332-16117D414853}"/>
-              </a:ext>
-            </a:extLst>
-          </p:cNvPr>
-          <p:cNvPicPr>
-            <a:picLocks noGrp="1" noChangeAspect="1" noChangeArrowheads="1"/>
-          </p:cNvPicPr>
+      <p:graphicFrame>
+        <p:nvGraphicFramePr>
+          <p:cNvPr id="4" name="Table 4">
+            <a:extLst>
+              <a:ext uri="{FF2B5EF4-FFF2-40B4-BE49-F238E27FC236}">
+                <a16:creationId xmlns:a16="http://schemas.microsoft.com/office/drawing/2014/main" id="{ACC0AED6-1FD9-4159-9687-FA06212BC346}"/>
+              </a:ext>
+            </a:extLst>
+          </p:cNvPr>
+          <p:cNvGraphicFramePr>
+            <a:graphicFrameLocks noGrp="1"/>
+          </p:cNvGraphicFramePr>
           <p:nvPr>
             <p:ph idx="1"/>
-          </p:nvPr>
-        </p:nvPicPr>
-        <p:blipFill>
-          <a:blip r:embed="rId2">
-            <a:extLst>
-              <a:ext uri="{28A0092B-C50C-407E-A947-70E740481C1C}">
-                <a14:useLocalDpi xmlns:a14="http://schemas.microsoft.com/office/drawing/2010/main" val="0"/>
-              </a:ext>
-            </a:extLst>
-          </a:blip>
-          <a:srcRect/>
-          <a:stretch>
-            <a:fillRect/>
-          </a:stretch>
-        </p:blipFill>
-        <p:spPr bwMode="auto">
-          <a:xfrm>
-            <a:off x="838200" y="1690688"/>
-            <a:ext cx="10215653" cy="1878989"/>
-          </a:xfrm>
-          <a:prstGeom prst="rect">
-            <a:avLst/>
-          </a:prstGeom>
-          <a:noFill/>
-          <a:extLst>
-            <a:ext uri="{909E8E84-426E-40DD-AFC4-6F175D3DCCD1}">
-              <a14:hiddenFill xmlns:a14="http://schemas.microsoft.com/office/drawing/2010/main">
-                <a:solidFill>
-                  <a:srgbClr val="FFFFFF"/>
-                </a:solidFill>
-              </a14:hiddenFill>
-            </a:ext>
-          </a:extLst>
-        </p:spPr>
-      </p:pic>
+            <p:extLst>
+              <p:ext uri="{D42A27DB-BD31-4B8C-83A1-F6EECF244321}">
+                <p14:modId xmlns:p14="http://schemas.microsoft.com/office/powerpoint/2010/main" val="2414422636"/>
+              </p:ext>
+            </p:extLst>
+          </p:nvPr>
+        </p:nvGraphicFramePr>
+        <p:xfrm>
+          <a:off x="838200" y="1825625"/>
+          <a:ext cx="10586212" cy="1483360"/>
+        </p:xfrm>
+        <a:graphic>
+          <a:graphicData uri="http://schemas.openxmlformats.org/drawingml/2006/table">
+            <a:tbl>
+              <a:tblPr firstRow="1" bandRow="1">
+                <a:tableStyleId>{5C22544A-7EE6-4342-B048-85BDC9FD1C3A}</a:tableStyleId>
+              </a:tblPr>
+              <a:tblGrid>
+                <a:gridCol w="1721168">
+                  <a:extLst>
+                    <a:ext uri="{9D8B030D-6E8A-4147-A177-3AD203B41FA5}">
+                      <a16:colId xmlns:a16="http://schemas.microsoft.com/office/drawing/2014/main" val="1736630949"/>
+                    </a:ext>
+                  </a:extLst>
+                </a:gridCol>
+                <a:gridCol w="1683448">
+                  <a:extLst>
+                    <a:ext uri="{9D8B030D-6E8A-4147-A177-3AD203B41FA5}">
+                      <a16:colId xmlns:a16="http://schemas.microsoft.com/office/drawing/2014/main" val="2082215429"/>
+                    </a:ext>
+                  </a:extLst>
+                </a:gridCol>
+                <a:gridCol w="1898904">
+                  <a:extLst>
+                    <a:ext uri="{9D8B030D-6E8A-4147-A177-3AD203B41FA5}">
+                      <a16:colId xmlns:a16="http://schemas.microsoft.com/office/drawing/2014/main" val="2465931278"/>
+                    </a:ext>
+                  </a:extLst>
+                </a:gridCol>
+                <a:gridCol w="1706372">
+                  <a:extLst>
+                    <a:ext uri="{9D8B030D-6E8A-4147-A177-3AD203B41FA5}">
+                      <a16:colId xmlns:a16="http://schemas.microsoft.com/office/drawing/2014/main" val="3277486119"/>
+                    </a:ext>
+                  </a:extLst>
+                </a:gridCol>
+                <a:gridCol w="1921828">
+                  <a:extLst>
+                    <a:ext uri="{9D8B030D-6E8A-4147-A177-3AD203B41FA5}">
+                      <a16:colId xmlns:a16="http://schemas.microsoft.com/office/drawing/2014/main" val="4167427998"/>
+                    </a:ext>
+                  </a:extLst>
+                </a:gridCol>
+                <a:gridCol w="1654492">
+                  <a:extLst>
+                    <a:ext uri="{9D8B030D-6E8A-4147-A177-3AD203B41FA5}">
+                      <a16:colId xmlns:a16="http://schemas.microsoft.com/office/drawing/2014/main" val="2733126066"/>
+                    </a:ext>
+                  </a:extLst>
+                </a:gridCol>
+              </a:tblGrid>
+              <a:tr h="370840">
+                <a:tc>
+                  <a:txBody>
+                    <a:bodyPr/>
+                    <a:lstStyle/>
+                    <a:p>
+                      <a:pPr algn="ctr"/>
+                      <a:r>
+                        <a:rPr lang="en-US" dirty="0"/>
+                        <a:t>School size</a:t>
+                      </a:r>
+                    </a:p>
+                  </a:txBody>
+                  <a:tcPr/>
+                </a:tc>
+                <a:tc>
+                  <a:txBody>
+                    <a:bodyPr/>
+                    <a:lstStyle/>
+                    <a:p>
+                      <a:pPr algn="ctr"/>
+                      <a:r>
+                        <a:rPr lang="en-US" dirty="0"/>
+                        <a:t>Avg math score</a:t>
+                      </a:r>
+                    </a:p>
+                  </a:txBody>
+                  <a:tcPr/>
+                </a:tc>
+                <a:tc>
+                  <a:txBody>
+                    <a:bodyPr/>
+                    <a:lstStyle/>
+                    <a:p>
+                      <a:pPr algn="ctr"/>
+                      <a:r>
+                        <a:rPr lang="en-US" dirty="0"/>
+                        <a:t>Avg reading score</a:t>
+                      </a:r>
+                    </a:p>
+                  </a:txBody>
+                  <a:tcPr/>
+                </a:tc>
+                <a:tc>
+                  <a:txBody>
+                    <a:bodyPr/>
+                    <a:lstStyle/>
+                    <a:p>
+                      <a:pPr algn="ctr"/>
+                      <a:r>
+                        <a:rPr lang="en-US" dirty="0"/>
+                        <a:t>% passing math</a:t>
+                      </a:r>
+                    </a:p>
+                  </a:txBody>
+                  <a:tcPr/>
+                </a:tc>
+                <a:tc>
+                  <a:txBody>
+                    <a:bodyPr/>
+                    <a:lstStyle/>
+                    <a:p>
+                      <a:pPr algn="ctr"/>
+                      <a:r>
+                        <a:rPr lang="en-US" dirty="0"/>
+                        <a:t>% passing reading</a:t>
+                      </a:r>
+                    </a:p>
+                  </a:txBody>
+                  <a:tcPr/>
+                </a:tc>
+                <a:tc>
+                  <a:txBody>
+                    <a:bodyPr/>
+                    <a:lstStyle/>
+                    <a:p>
+                      <a:pPr algn="ctr"/>
+                      <a:r>
+                        <a:rPr lang="en-US" dirty="0"/>
+                        <a:t>% passing both</a:t>
+                      </a:r>
+                    </a:p>
+                  </a:txBody>
+                  <a:tcPr/>
+                </a:tc>
+                <a:extLst>
+                  <a:ext uri="{0D108BD9-81ED-4DB2-BD59-A6C34878D82A}">
+                    <a16:rowId xmlns:a16="http://schemas.microsoft.com/office/drawing/2014/main" val="1103331193"/>
+                  </a:ext>
+                </a:extLst>
+              </a:tr>
+              <a:tr h="370840">
+                <a:tc>
+                  <a:txBody>
+                    <a:bodyPr/>
+                    <a:lstStyle/>
+                    <a:p>
+                      <a:r>
+                        <a:rPr lang="en-US" dirty="0"/>
+                        <a:t>Small (&lt; 1,000)</a:t>
+                      </a:r>
+                    </a:p>
+                  </a:txBody>
+                  <a:tcPr/>
+                </a:tc>
+                <a:tc>
+                  <a:txBody>
+                    <a:bodyPr/>
+                    <a:lstStyle/>
+                    <a:p>
+                      <a:pPr algn="r"/>
+                      <a:r>
+                        <a:rPr lang="en-US" dirty="0"/>
+                        <a:t>84</a:t>
+                      </a:r>
+                    </a:p>
+                  </a:txBody>
+                  <a:tcPr/>
+                </a:tc>
+                <a:tc>
+                  <a:txBody>
+                    <a:bodyPr/>
+                    <a:lstStyle/>
+                    <a:p>
+                      <a:pPr algn="r"/>
+                      <a:r>
+                        <a:rPr lang="en-US" dirty="0"/>
+                        <a:t>84</a:t>
+                      </a:r>
+                    </a:p>
+                  </a:txBody>
+                  <a:tcPr/>
+                </a:tc>
+                <a:tc>
+                  <a:txBody>
+                    <a:bodyPr/>
+                    <a:lstStyle/>
+                    <a:p>
+                      <a:pPr algn="r"/>
+                      <a:r>
+                        <a:rPr lang="en-US" dirty="0"/>
+                        <a:t>94</a:t>
+                      </a:r>
+                    </a:p>
+                  </a:txBody>
+                  <a:tcPr/>
+                </a:tc>
+                <a:tc>
+                  <a:txBody>
+                    <a:bodyPr/>
+                    <a:lstStyle/>
+                    <a:p>
+                      <a:pPr algn="r"/>
+                      <a:r>
+                        <a:rPr lang="en-US" dirty="0"/>
+                        <a:t>96</a:t>
+                      </a:r>
+                    </a:p>
+                  </a:txBody>
+                  <a:tcPr/>
+                </a:tc>
+                <a:tc>
+                  <a:txBody>
+                    <a:bodyPr/>
+                    <a:lstStyle/>
+                    <a:p>
+                      <a:pPr algn="r"/>
+                      <a:r>
+                        <a:rPr lang="en-US" dirty="0"/>
+                        <a:t>90</a:t>
+                      </a:r>
+                    </a:p>
+                  </a:txBody>
+                  <a:tcPr/>
+                </a:tc>
+                <a:extLst>
+                  <a:ext uri="{0D108BD9-81ED-4DB2-BD59-A6C34878D82A}">
+                    <a16:rowId xmlns:a16="http://schemas.microsoft.com/office/drawing/2014/main" val="3686406876"/>
+                  </a:ext>
+                </a:extLst>
+              </a:tr>
+              <a:tr h="370840">
+                <a:tc>
+                  <a:txBody>
+                    <a:bodyPr/>
+                    <a:lstStyle/>
+                    <a:p>
+                      <a:r>
+                        <a:rPr lang="en-US" dirty="0"/>
+                        <a:t>Medium (1k-2k)</a:t>
+                      </a:r>
+                    </a:p>
+                  </a:txBody>
+                  <a:tcPr/>
+                </a:tc>
+                <a:tc>
+                  <a:txBody>
+                    <a:bodyPr/>
+                    <a:lstStyle/>
+                    <a:p>
+                      <a:pPr algn="r"/>
+                      <a:r>
+                        <a:rPr lang="en-US" dirty="0"/>
+                        <a:t>83</a:t>
+                      </a:r>
+                    </a:p>
+                  </a:txBody>
+                  <a:tcPr/>
+                </a:tc>
+                <a:tc>
+                  <a:txBody>
+                    <a:bodyPr/>
+                    <a:lstStyle/>
+                    <a:p>
+                      <a:pPr algn="r"/>
+                      <a:r>
+                        <a:rPr lang="en-US" dirty="0"/>
+                        <a:t>84</a:t>
+                      </a:r>
+                    </a:p>
+                  </a:txBody>
+                  <a:tcPr/>
+                </a:tc>
+                <a:tc>
+                  <a:txBody>
+                    <a:bodyPr/>
+                    <a:lstStyle/>
+                    <a:p>
+                      <a:pPr algn="r"/>
+                      <a:r>
+                        <a:rPr lang="en-US" dirty="0"/>
+                        <a:t>94</a:t>
+                      </a:r>
+                    </a:p>
+                  </a:txBody>
+                  <a:tcPr/>
+                </a:tc>
+                <a:tc>
+                  <a:txBody>
+                    <a:bodyPr/>
+                    <a:lstStyle/>
+                    <a:p>
+                      <a:pPr algn="r"/>
+                      <a:r>
+                        <a:rPr lang="en-US" dirty="0"/>
+                        <a:t>97</a:t>
+                      </a:r>
+                    </a:p>
+                  </a:txBody>
+                  <a:tcPr/>
+                </a:tc>
+                <a:tc>
+                  <a:txBody>
+                    <a:bodyPr/>
+                    <a:lstStyle/>
+                    <a:p>
+                      <a:pPr algn="r"/>
+                      <a:r>
+                        <a:rPr lang="en-US" dirty="0"/>
+                        <a:t>91</a:t>
+                      </a:r>
+                    </a:p>
+                  </a:txBody>
+                  <a:tcPr/>
+                </a:tc>
+                <a:extLst>
+                  <a:ext uri="{0D108BD9-81ED-4DB2-BD59-A6C34878D82A}">
+                    <a16:rowId xmlns:a16="http://schemas.microsoft.com/office/drawing/2014/main" val="4292956545"/>
+                  </a:ext>
+                </a:extLst>
+              </a:tr>
+              <a:tr h="370840">
+                <a:tc>
+                  <a:txBody>
+                    <a:bodyPr/>
+                    <a:lstStyle/>
+                    <a:p>
+                      <a:r>
+                        <a:rPr lang="en-US" dirty="0"/>
+                        <a:t>Large (2k-5k)</a:t>
+                      </a:r>
+                    </a:p>
+                  </a:txBody>
+                  <a:tcPr/>
+                </a:tc>
+                <a:tc>
+                  <a:txBody>
+                    <a:bodyPr/>
+                    <a:lstStyle/>
+                    <a:p>
+                      <a:pPr algn="r"/>
+                      <a:r>
+                        <a:rPr lang="en-US" dirty="0"/>
+                        <a:t>78</a:t>
+                      </a:r>
+                    </a:p>
+                  </a:txBody>
+                  <a:tcPr/>
+                </a:tc>
+                <a:tc>
+                  <a:txBody>
+                    <a:bodyPr/>
+                    <a:lstStyle/>
+                    <a:p>
+                      <a:pPr algn="r"/>
+                      <a:r>
+                        <a:rPr lang="en-US" dirty="0"/>
+                        <a:t>81</a:t>
+                      </a:r>
+                    </a:p>
+                  </a:txBody>
+                  <a:tcPr/>
+                </a:tc>
+                <a:tc>
+                  <a:txBody>
+                    <a:bodyPr/>
+                    <a:lstStyle/>
+                    <a:p>
+                      <a:pPr algn="r"/>
+                      <a:r>
+                        <a:rPr lang="en-US" dirty="0"/>
+                        <a:t>70</a:t>
+                      </a:r>
+                    </a:p>
+                  </a:txBody>
+                  <a:tcPr/>
+                </a:tc>
+                <a:tc>
+                  <a:txBody>
+                    <a:bodyPr/>
+                    <a:lstStyle/>
+                    <a:p>
+                      <a:pPr algn="r"/>
+                      <a:r>
+                        <a:rPr lang="en-US" dirty="0"/>
+                        <a:t>83</a:t>
+                      </a:r>
+                    </a:p>
+                  </a:txBody>
+                  <a:tcPr/>
+                </a:tc>
+                <a:tc>
+                  <a:txBody>
+                    <a:bodyPr/>
+                    <a:lstStyle/>
+                    <a:p>
+                      <a:pPr algn="r"/>
+                      <a:r>
+                        <a:rPr lang="en-US" dirty="0"/>
+                        <a:t>58</a:t>
+                      </a:r>
+                    </a:p>
+                  </a:txBody>
+                  <a:tcPr/>
+                </a:tc>
+                <a:extLst>
+                  <a:ext uri="{0D108BD9-81ED-4DB2-BD59-A6C34878D82A}">
+                    <a16:rowId xmlns:a16="http://schemas.microsoft.com/office/drawing/2014/main" val="3342695760"/>
+                  </a:ext>
+                </a:extLst>
+              </a:tr>
+            </a:tbl>
+          </a:graphicData>
+        </a:graphic>
+      </p:graphicFrame>
     </p:spTree>
     <p:extLst>
       <p:ext uri="{BB962C8B-B14F-4D97-AF65-F5344CB8AC3E}">
-        <p14:creationId xmlns:p14="http://schemas.microsoft.com/office/powerpoint/2010/main" val="3045326624"/>
+        <p14:creationId xmlns:p14="http://schemas.microsoft.com/office/powerpoint/2010/main" val="1976789470"/>
       </p:ext>
     </p:extLst>
   </p:cSld>
@@ -6609,14 +9616,14 @@
             <p:ph idx="1"/>
             <p:extLst>
               <p:ext uri="{D42A27DB-BD31-4B8C-83A1-F6EECF244321}">
-                <p14:modId xmlns:p14="http://schemas.microsoft.com/office/powerpoint/2010/main" val="784020468"/>
+                <p14:modId xmlns:p14="http://schemas.microsoft.com/office/powerpoint/2010/main" val="4186236309"/>
               </p:ext>
             </p:extLst>
           </p:nvPr>
         </p:nvGraphicFramePr>
         <p:xfrm>
           <a:off x="3124199" y="2361955"/>
-          <a:ext cx="5052647" cy="3337560"/>
+          <a:ext cx="3494810" cy="3337560"/>
         </p:xfrm>
         <a:graphic>
           <a:graphicData uri="http://schemas.openxmlformats.org/drawingml/2006/table">
@@ -6625,14 +9632,14 @@
                 <a:tableStyleId>{5C22544A-7EE6-4342-B048-85BDC9FD1C3A}</a:tableStyleId>
               </a:tblPr>
               <a:tblGrid>
-                <a:gridCol w="2490839">
+                <a:gridCol w="2247901">
                   <a:extLst>
                     <a:ext uri="{9D8B030D-6E8A-4147-A177-3AD203B41FA5}">
                       <a16:colId xmlns:a16="http://schemas.microsoft.com/office/drawing/2014/main" val="334385605"/>
                     </a:ext>
                   </a:extLst>
                 </a:gridCol>
-                <a:gridCol w="2561808">
+                <a:gridCol w="1246909">
                   <a:extLst>
                     <a:ext uri="{9D8B030D-6E8A-4147-A177-3AD203B41FA5}">
                       <a16:colId xmlns:a16="http://schemas.microsoft.com/office/drawing/2014/main" val="1271844370"/>
@@ -6646,6 +9653,7 @@
                     <a:bodyPr/>
                     <a:lstStyle/>
                     <a:p>
+                      <a:pPr algn="ctr"/>
                       <a:r>
                         <a:rPr lang="en-US" dirty="0"/>
                         <a:t>Measure</a:t>
@@ -6659,6 +9667,7 @@
                     <a:bodyPr/>
                     <a:lstStyle/>
                     <a:p>
+                      <a:pPr algn="ctr"/>
                       <a:r>
                         <a:rPr lang="en-US" dirty="0"/>
                         <a:t>Value</a:t>
@@ -6692,6 +9701,7 @@
                     <a:bodyPr/>
                     <a:lstStyle/>
                     <a:p>
+                      <a:pPr algn="r"/>
                       <a:r>
                         <a:rPr lang="en-US" dirty="0"/>
                         <a:t>15</a:t>
@@ -6725,6 +9735,7 @@
                     <a:bodyPr/>
                     <a:lstStyle/>
                     <a:p>
+                      <a:pPr algn="r"/>
                       <a:r>
                         <a:rPr lang="en-US" dirty="0"/>
                         <a:t>39,170</a:t>
@@ -6758,9 +9769,10 @@
                     <a:bodyPr/>
                     <a:lstStyle/>
                     <a:p>
+                      <a:pPr algn="r"/>
                       <a:r>
                         <a:rPr lang="en-US" dirty="0"/>
-                        <a:t>$24,649,428</a:t>
+                        <a:t>$24.6mil</a:t>
                       </a:r>
                     </a:p>
                   </a:txBody>
@@ -6791,9 +9803,10 @@
                     <a:bodyPr/>
                     <a:lstStyle/>
                     <a:p>
+                      <a:pPr algn="r"/>
                       <a:r>
                         <a:rPr lang="en-US" dirty="0"/>
-                        <a:t>79.0</a:t>
+                        <a:t>79</a:t>
                       </a:r>
                     </a:p>
                   </a:txBody>
@@ -6824,9 +9837,10 @@
                     <a:bodyPr/>
                     <a:lstStyle/>
                     <a:p>
+                      <a:pPr algn="r"/>
                       <a:r>
                         <a:rPr lang="en-US" dirty="0"/>
-                        <a:t>81.9</a:t>
+                        <a:t>82</a:t>
                       </a:r>
                     </a:p>
                   </a:txBody>
@@ -6857,9 +9871,10 @@
                     <a:bodyPr/>
                     <a:lstStyle/>
                     <a:p>
+                      <a:pPr algn="r"/>
                       <a:r>
                         <a:rPr lang="en-US" dirty="0"/>
-                        <a:t>75.0%</a:t>
+                        <a:t>75</a:t>
                       </a:r>
                     </a:p>
                   </a:txBody>
@@ -6890,9 +9905,10 @@
                     <a:bodyPr/>
                     <a:lstStyle/>
                     <a:p>
+                      <a:pPr algn="r"/>
                       <a:r>
                         <a:rPr lang="en-US" dirty="0"/>
-                        <a:t>85.8%</a:t>
+                        <a:t>86</a:t>
                       </a:r>
                     </a:p>
                   </a:txBody>
@@ -6923,9 +9939,10 @@
                     <a:bodyPr/>
                     <a:lstStyle/>
                     <a:p>
+                      <a:pPr algn="r"/>
                       <a:r>
                         <a:rPr lang="en-US" dirty="0"/>
-                        <a:t>65.2%</a:t>
+                        <a:t>65</a:t>
                       </a:r>
                     </a:p>
                   </a:txBody>
@@ -7546,7 +10563,7 @@
           <p:nvPr/>
         </p:nvPicPr>
         <p:blipFill>
-          <a:blip r:embed="rId2"/>
+          <a:blip r:embed="rId3"/>
           <a:stretch>
             <a:fillRect/>
           </a:stretch>
@@ -7707,7 +10724,7 @@
           <p:nvPr/>
         </p:nvPicPr>
         <p:blipFill>
-          <a:blip r:embed="rId2"/>
+          <a:blip r:embed="rId3"/>
           <a:stretch>
             <a:fillRect/>
           </a:stretch>
@@ -7863,7 +10880,7 @@
           <p:nvPr/>
         </p:nvPicPr>
         <p:blipFill>
-          <a:blip r:embed="rId2"/>
+          <a:blip r:embed="rId3"/>
           <a:stretch>
             <a:fillRect/>
           </a:stretch>
@@ -8090,4 +11107,299 @@
     </a:ext>
   </a:extLst>
 </a:theme>
+</file>
+
+<file path=ppt/theme/theme2.xml><?xml version="1.0" encoding="utf-8"?>
+<a:theme xmlns:a="http://schemas.openxmlformats.org/drawingml/2006/main" name="Office Theme">
+  <a:themeElements>
+    <a:clrScheme name="Office">
+      <a:dk1>
+        <a:sysClr val="windowText" lastClr="000000"/>
+      </a:dk1>
+      <a:lt1>
+        <a:sysClr val="window" lastClr="FFFFFF"/>
+      </a:lt1>
+      <a:dk2>
+        <a:srgbClr val="44546A"/>
+      </a:dk2>
+      <a:lt2>
+        <a:srgbClr val="E7E6E6"/>
+      </a:lt2>
+      <a:accent1>
+        <a:srgbClr val="4472C4"/>
+      </a:accent1>
+      <a:accent2>
+        <a:srgbClr val="ED7D31"/>
+      </a:accent2>
+      <a:accent3>
+        <a:srgbClr val="A5A5A5"/>
+      </a:accent3>
+      <a:accent4>
+        <a:srgbClr val="FFC000"/>
+      </a:accent4>
+      <a:accent5>
+        <a:srgbClr val="5B9BD5"/>
+      </a:accent5>
+      <a:accent6>
+        <a:srgbClr val="70AD47"/>
+      </a:accent6>
+      <a:hlink>
+        <a:srgbClr val="0563C1"/>
+      </a:hlink>
+      <a:folHlink>
+        <a:srgbClr val="954F72"/>
+      </a:folHlink>
+    </a:clrScheme>
+    <a:fontScheme name="Office">
+      <a:majorFont>
+        <a:latin typeface="Calibri Light" panose="020F0302020204030204"/>
+        <a:ea typeface=""/>
+        <a:cs typeface=""/>
+        <a:font script="Jpan" typeface="游ゴシック Light"/>
+        <a:font script="Hang" typeface="맑은 고딕"/>
+        <a:font script="Hans" typeface="等线 Light"/>
+        <a:font script="Hant" typeface="新細明體"/>
+        <a:font script="Arab" typeface="Times New Roman"/>
+        <a:font script="Hebr" typeface="Times New Roman"/>
+        <a:font script="Thai" typeface="Angsana New"/>
+        <a:font script="Ethi" typeface="Nyala"/>
+        <a:font script="Beng" typeface="Vrinda"/>
+        <a:font script="Gujr" typeface="Shruti"/>
+        <a:font script="Khmr" typeface="MoolBoran"/>
+        <a:font script="Knda" typeface="Tunga"/>
+        <a:font script="Guru" typeface="Raavi"/>
+        <a:font script="Cans" typeface="Euphemia"/>
+        <a:font script="Cher" typeface="Plantagenet Cherokee"/>
+        <a:font script="Yiii" typeface="Microsoft Yi Baiti"/>
+        <a:font script="Tibt" typeface="Microsoft Himalaya"/>
+        <a:font script="Thaa" typeface="MV Boli"/>
+        <a:font script="Deva" typeface="Mangal"/>
+        <a:font script="Telu" typeface="Gautami"/>
+        <a:font script="Taml" typeface="Latha"/>
+        <a:font script="Syrc" typeface="Estrangelo Edessa"/>
+        <a:font script="Orya" typeface="Kalinga"/>
+        <a:font script="Mlym" typeface="Kartika"/>
+        <a:font script="Laoo" typeface="DokChampa"/>
+        <a:font script="Sinh" typeface="Iskoola Pota"/>
+        <a:font script="Mong" typeface="Mongolian Baiti"/>
+        <a:font script="Viet" typeface="Times New Roman"/>
+        <a:font script="Uigh" typeface="Microsoft Uighur"/>
+        <a:font script="Geor" typeface="Sylfaen"/>
+        <a:font script="Armn" typeface="Arial"/>
+        <a:font script="Bugi" typeface="Leelawadee UI"/>
+        <a:font script="Bopo" typeface="Microsoft JhengHei"/>
+        <a:font script="Java" typeface="Javanese Text"/>
+        <a:font script="Lisu" typeface="Segoe UI"/>
+        <a:font script="Mymr" typeface="Myanmar Text"/>
+        <a:font script="Nkoo" typeface="Ebrima"/>
+        <a:font script="Olck" typeface="Nirmala UI"/>
+        <a:font script="Osma" typeface="Ebrima"/>
+        <a:font script="Phag" typeface="Phagspa"/>
+        <a:font script="Syrn" typeface="Estrangelo Edessa"/>
+        <a:font script="Syrj" typeface="Estrangelo Edessa"/>
+        <a:font script="Syre" typeface="Estrangelo Edessa"/>
+        <a:font script="Sora" typeface="Nirmala UI"/>
+        <a:font script="Tale" typeface="Microsoft Tai Le"/>
+        <a:font script="Talu" typeface="Microsoft New Tai Lue"/>
+        <a:font script="Tfng" typeface="Ebrima"/>
+      </a:majorFont>
+      <a:minorFont>
+        <a:latin typeface="Calibri" panose="020F0502020204030204"/>
+        <a:ea typeface=""/>
+        <a:cs typeface=""/>
+        <a:font script="Jpan" typeface="游ゴシック"/>
+        <a:font script="Hang" typeface="맑은 고딕"/>
+        <a:font script="Hans" typeface="等线"/>
+        <a:font script="Hant" typeface="新細明體"/>
+        <a:font script="Arab" typeface="Arial"/>
+        <a:font script="Hebr" typeface="Arial"/>
+        <a:font script="Thai" typeface="Cordia New"/>
+        <a:font script="Ethi" typeface="Nyala"/>
+        <a:font script="Beng" typeface="Vrinda"/>
+        <a:font script="Gujr" typeface="Shruti"/>
+        <a:font script="Khmr" typeface="DaunPenh"/>
+        <a:font script="Knda" typeface="Tunga"/>
+        <a:font script="Guru" typeface="Raavi"/>
+        <a:font script="Cans" typeface="Euphemia"/>
+        <a:font script="Cher" typeface="Plantagenet Cherokee"/>
+        <a:font script="Yiii" typeface="Microsoft Yi Baiti"/>
+        <a:font script="Tibt" typeface="Microsoft Himalaya"/>
+        <a:font script="Thaa" typeface="MV Boli"/>
+        <a:font script="Deva" typeface="Mangal"/>
+        <a:font script="Telu" typeface="Gautami"/>
+        <a:font script="Taml" typeface="Latha"/>
+        <a:font script="Syrc" typeface="Estrangelo Edessa"/>
+        <a:font script="Orya" typeface="Kalinga"/>
+        <a:font script="Mlym" typeface="Kartika"/>
+        <a:font script="Laoo" typeface="DokChampa"/>
+        <a:font script="Sinh" typeface="Iskoola Pota"/>
+        <a:font script="Mong" typeface="Mongolian Baiti"/>
+        <a:font script="Viet" typeface="Arial"/>
+        <a:font script="Uigh" typeface="Microsoft Uighur"/>
+        <a:font script="Geor" typeface="Sylfaen"/>
+        <a:font script="Armn" typeface="Arial"/>
+        <a:font script="Bugi" typeface="Leelawadee UI"/>
+        <a:font script="Bopo" typeface="Microsoft JhengHei"/>
+        <a:font script="Java" typeface="Javanese Text"/>
+        <a:font script="Lisu" typeface="Segoe UI"/>
+        <a:font script="Mymr" typeface="Myanmar Text"/>
+        <a:font script="Nkoo" typeface="Ebrima"/>
+        <a:font script="Olck" typeface="Nirmala UI"/>
+        <a:font script="Osma" typeface="Ebrima"/>
+        <a:font script="Phag" typeface="Phagspa"/>
+        <a:font script="Syrn" typeface="Estrangelo Edessa"/>
+        <a:font script="Syrj" typeface="Estrangelo Edessa"/>
+        <a:font script="Syre" typeface="Estrangelo Edessa"/>
+        <a:font script="Sora" typeface="Nirmala UI"/>
+        <a:font script="Tale" typeface="Microsoft Tai Le"/>
+        <a:font script="Talu" typeface="Microsoft New Tai Lue"/>
+        <a:font script="Tfng" typeface="Ebrima"/>
+      </a:minorFont>
+    </a:fontScheme>
+    <a:fmtScheme name="Office">
+      <a:fillStyleLst>
+        <a:solidFill>
+          <a:schemeClr val="phClr"/>
+        </a:solidFill>
+        <a:gradFill rotWithShape="1">
+          <a:gsLst>
+            <a:gs pos="0">
+              <a:schemeClr val="phClr">
+                <a:lumMod val="110000"/>
+                <a:satMod val="105000"/>
+                <a:tint val="67000"/>
+              </a:schemeClr>
+            </a:gs>
+            <a:gs pos="50000">
+              <a:schemeClr val="phClr">
+                <a:lumMod val="105000"/>
+                <a:satMod val="103000"/>
+                <a:tint val="73000"/>
+              </a:schemeClr>
+            </a:gs>
+            <a:gs pos="100000">
+              <a:schemeClr val="phClr">
+                <a:lumMod val="105000"/>
+                <a:satMod val="109000"/>
+                <a:tint val="81000"/>
+              </a:schemeClr>
+            </a:gs>
+          </a:gsLst>
+          <a:lin ang="5400000" scaled="0"/>
+        </a:gradFill>
+        <a:gradFill rotWithShape="1">
+          <a:gsLst>
+            <a:gs pos="0">
+              <a:schemeClr val="phClr">
+                <a:satMod val="103000"/>
+                <a:lumMod val="102000"/>
+                <a:tint val="94000"/>
+              </a:schemeClr>
+            </a:gs>
+            <a:gs pos="50000">
+              <a:schemeClr val="phClr">
+                <a:satMod val="110000"/>
+                <a:lumMod val="100000"/>
+                <a:shade val="100000"/>
+              </a:schemeClr>
+            </a:gs>
+            <a:gs pos="100000">
+              <a:schemeClr val="phClr">
+                <a:lumMod val="99000"/>
+                <a:satMod val="120000"/>
+                <a:shade val="78000"/>
+              </a:schemeClr>
+            </a:gs>
+          </a:gsLst>
+          <a:lin ang="5400000" scaled="0"/>
+        </a:gradFill>
+      </a:fillStyleLst>
+      <a:lnStyleLst>
+        <a:ln w="6350" cap="flat" cmpd="sng" algn="ctr">
+          <a:solidFill>
+            <a:schemeClr val="phClr"/>
+          </a:solidFill>
+          <a:prstDash val="solid"/>
+          <a:miter lim="800000"/>
+        </a:ln>
+        <a:ln w="12700" cap="flat" cmpd="sng" algn="ctr">
+          <a:solidFill>
+            <a:schemeClr val="phClr"/>
+          </a:solidFill>
+          <a:prstDash val="solid"/>
+          <a:miter lim="800000"/>
+        </a:ln>
+        <a:ln w="19050" cap="flat" cmpd="sng" algn="ctr">
+          <a:solidFill>
+            <a:schemeClr val="phClr"/>
+          </a:solidFill>
+          <a:prstDash val="solid"/>
+          <a:miter lim="800000"/>
+        </a:ln>
+      </a:lnStyleLst>
+      <a:effectStyleLst>
+        <a:effectStyle>
+          <a:effectLst/>
+        </a:effectStyle>
+        <a:effectStyle>
+          <a:effectLst/>
+        </a:effectStyle>
+        <a:effectStyle>
+          <a:effectLst>
+            <a:outerShdw blurRad="57150" dist="19050" dir="5400000" algn="ctr" rotWithShape="0">
+              <a:srgbClr val="000000">
+                <a:alpha val="63000"/>
+              </a:srgbClr>
+            </a:outerShdw>
+          </a:effectLst>
+        </a:effectStyle>
+      </a:effectStyleLst>
+      <a:bgFillStyleLst>
+        <a:solidFill>
+          <a:schemeClr val="phClr"/>
+        </a:solidFill>
+        <a:solidFill>
+          <a:schemeClr val="phClr">
+            <a:tint val="95000"/>
+            <a:satMod val="170000"/>
+          </a:schemeClr>
+        </a:solidFill>
+        <a:gradFill rotWithShape="1">
+          <a:gsLst>
+            <a:gs pos="0">
+              <a:schemeClr val="phClr">
+                <a:tint val="93000"/>
+                <a:satMod val="150000"/>
+                <a:shade val="98000"/>
+                <a:lumMod val="102000"/>
+              </a:schemeClr>
+            </a:gs>
+            <a:gs pos="50000">
+              <a:schemeClr val="phClr">
+                <a:tint val="98000"/>
+                <a:satMod val="130000"/>
+                <a:shade val="90000"/>
+                <a:lumMod val="103000"/>
+              </a:schemeClr>
+            </a:gs>
+            <a:gs pos="100000">
+              <a:schemeClr val="phClr">
+                <a:shade val="63000"/>
+                <a:satMod val="120000"/>
+              </a:schemeClr>
+            </a:gs>
+          </a:gsLst>
+          <a:lin ang="5400000" scaled="0"/>
+        </a:gradFill>
+      </a:bgFillStyleLst>
+    </a:fmtScheme>
+  </a:themeElements>
+  <a:objectDefaults/>
+  <a:extraClrSchemeLst/>
+  <a:extLst>
+    <a:ext uri="{05A4C25C-085E-4340-85A3-A5531E510DB2}">
+      <thm15:themeFamily xmlns:thm15="http://schemas.microsoft.com/office/thememl/2012/main" name="Office Theme" id="{62F939B6-93AF-4DB8-9C6B-D6C7DFDC589F}" vid="{4A3C46E8-61CC-4603-A589-7422A47A8E4A}"/>
+    </a:ext>
+  </a:extLst>
+</a:theme>
 </file>
</xml_diff>

<commit_message>
Adding updated presentation file
</commit_message>
<xml_diff>
--- a/School District Analysis.pptx
+++ b/School District Analysis.pptx
@@ -5,7 +5,7 @@
     <p:sldMasterId id="2147483648" r:id="rId1"/>
   </p:sldMasterIdLst>
   <p:notesMasterIdLst>
-    <p:notesMasterId r:id="rId25"/>
+    <p:notesMasterId r:id="rId28"/>
   </p:notesMasterIdLst>
   <p:sldIdLst>
     <p:sldId id="256" r:id="rId2"/>
@@ -27,10 +27,13 @@
     <p:sldId id="302" r:id="rId18"/>
     <p:sldId id="321" r:id="rId19"/>
     <p:sldId id="303" r:id="rId20"/>
-    <p:sldId id="307" r:id="rId21"/>
-    <p:sldId id="308" r:id="rId22"/>
-    <p:sldId id="309" r:id="rId23"/>
-    <p:sldId id="310" r:id="rId24"/>
+    <p:sldId id="299" r:id="rId21"/>
+    <p:sldId id="305" r:id="rId22"/>
+    <p:sldId id="301" r:id="rId23"/>
+    <p:sldId id="307" r:id="rId24"/>
+    <p:sldId id="308" r:id="rId25"/>
+    <p:sldId id="309" r:id="rId26"/>
+    <p:sldId id="310" r:id="rId27"/>
   </p:sldIdLst>
   <p:sldSz cx="12192000" cy="6858000"/>
   <p:notesSz cx="6858000" cy="9144000"/>
@@ -177,6 +180,9 @@
         </p14:section>
         <p14:section name="Appendix" id="{92D20F5D-082C-47E6-8594-401CF0C2BC6D}">
           <p14:sldIdLst>
+            <p14:sldId id="299"/>
+            <p14:sldId id="305"/>
+            <p14:sldId id="301"/>
             <p14:sldId id="307"/>
             <p14:sldId id="308"/>
             <p14:sldId id="309"/>
@@ -1414,21 +1420,24 @@
           <a:p>
             <a:r>
               <a:rPr lang="en-US" dirty="0"/>
+              <a:t>We’d like to bring the traditional scores up to closer congruence with those of the </a:t>
+            </a:r>
+            <a:r>
+              <a:rPr lang="en-US"/>
+              <a:t>charter schools</a:t>
+            </a:r>
+            <a:endParaRPr lang="en-US" dirty="0"/>
+          </a:p>
+          <a:p>
+            <a:r>
+              <a:rPr lang="en-US" dirty="0"/>
               <a:t>First I recommend that we perform a regression analysis to determine if the variances are a result of other variables or seem to be highly correlated to those mentioned in this presentation</a:t>
             </a:r>
           </a:p>
           <a:p>
             <a:r>
               <a:rPr lang="en-US" dirty="0"/>
-              <a:t>Secondly, and in conjunction with the findings from the </a:t>
-            </a:r>
-            <a:r>
-              <a:rPr lang="en-US"/>
-              <a:t>analysis, to </a:t>
-            </a:r>
-            <a:r>
-              <a:rPr lang="en-US" dirty="0"/>
-              <a:t>have a team study various approaches that were used surrounding standardized testing in an attempt to socialize those that were highly effective</a:t>
+              <a:t>Secondly, and in conjunction with the findings from the analysis, to have a team study various approaches that were used surrounding standardized testing in an attempt to socialize those that were highly effective</a:t>
             </a:r>
           </a:p>
         </p:txBody>
@@ -7901,6 +7910,361 @@
           <p:cNvPr id="2" name="Title 1">
             <a:extLst>
               <a:ext uri="{FF2B5EF4-FFF2-40B4-BE49-F238E27FC236}">
+                <a16:creationId xmlns:a16="http://schemas.microsoft.com/office/drawing/2014/main" id="{3EFB1119-6DAB-476F-9541-ABA9503B44FF}"/>
+              </a:ext>
+            </a:extLst>
+          </p:cNvPr>
+          <p:cNvSpPr>
+            <a:spLocks noGrp="1"/>
+          </p:cNvSpPr>
+          <p:nvPr>
+            <p:ph type="title"/>
+          </p:nvPr>
+        </p:nvSpPr>
+        <p:spPr/>
+        <p:txBody>
+          <a:bodyPr/>
+          <a:lstStyle/>
+          <a:p>
+            <a:r>
+              <a:rPr lang="en-US" dirty="0"/>
+              <a:t>Dataset Analyzed</a:t>
+            </a:r>
+          </a:p>
+        </p:txBody>
+      </p:sp>
+      <p:sp>
+        <p:nvSpPr>
+          <p:cNvPr id="3" name="Content Placeholder 2">
+            <a:extLst>
+              <a:ext uri="{FF2B5EF4-FFF2-40B4-BE49-F238E27FC236}">
+                <a16:creationId xmlns:a16="http://schemas.microsoft.com/office/drawing/2014/main" id="{304380FF-F4C6-46D9-95C8-F4A1742EB433}"/>
+              </a:ext>
+            </a:extLst>
+          </p:cNvPr>
+          <p:cNvSpPr>
+            <a:spLocks noGrp="1"/>
+          </p:cNvSpPr>
+          <p:nvPr>
+            <p:ph idx="1"/>
+          </p:nvPr>
+        </p:nvSpPr>
+        <p:spPr/>
+        <p:txBody>
+          <a:bodyPr>
+            <a:normAutofit/>
+          </a:bodyPr>
+          <a:lstStyle/>
+          <a:p>
+            <a:r>
+              <a:rPr lang="en-US" sz="3600" dirty="0"/>
+              <a:t>Student file – 39,170 individual student records</a:t>
+            </a:r>
+          </a:p>
+          <a:p>
+            <a:pPr lvl="1"/>
+            <a:r>
+              <a:rPr lang="en-US" sz="3200" dirty="0"/>
+              <a:t>Student ID</a:t>
+            </a:r>
+          </a:p>
+          <a:p>
+            <a:pPr lvl="1"/>
+            <a:r>
+              <a:rPr lang="en-US" sz="3200" dirty="0"/>
+              <a:t>Name</a:t>
+            </a:r>
+          </a:p>
+          <a:p>
+            <a:pPr lvl="1"/>
+            <a:r>
+              <a:rPr lang="en-US" sz="3200" dirty="0"/>
+              <a:t>Gender</a:t>
+            </a:r>
+          </a:p>
+          <a:p>
+            <a:pPr lvl="1"/>
+            <a:r>
+              <a:rPr lang="en-US" sz="3200" dirty="0"/>
+              <a:t>Grade</a:t>
+            </a:r>
+          </a:p>
+          <a:p>
+            <a:pPr lvl="1"/>
+            <a:r>
+              <a:rPr lang="en-US" sz="3200" dirty="0"/>
+              <a:t>High School</a:t>
+            </a:r>
+          </a:p>
+          <a:p>
+            <a:pPr lvl="1"/>
+            <a:r>
+              <a:rPr lang="en-US" sz="3200" dirty="0"/>
+              <a:t>Reading score</a:t>
+            </a:r>
+          </a:p>
+          <a:p>
+            <a:pPr lvl="1"/>
+            <a:r>
+              <a:rPr lang="en-US" sz="3200" dirty="0"/>
+              <a:t>Math score</a:t>
+            </a:r>
+          </a:p>
+        </p:txBody>
+      </p:sp>
+    </p:spTree>
+    <p:extLst>
+      <p:ext uri="{BB962C8B-B14F-4D97-AF65-F5344CB8AC3E}">
+        <p14:creationId xmlns:p14="http://schemas.microsoft.com/office/powerpoint/2010/main" val="1277202695"/>
+      </p:ext>
+    </p:extLst>
+  </p:cSld>
+  <p:clrMapOvr>
+    <a:masterClrMapping/>
+  </p:clrMapOvr>
+</p:sld>
+</file>
+
+<file path=ppt/slides/slide21.xml><?xml version="1.0" encoding="utf-8"?>
+<p:sld xmlns:a="http://schemas.openxmlformats.org/drawingml/2006/main" xmlns:r="http://schemas.openxmlformats.org/officeDocument/2006/relationships" xmlns:p="http://schemas.openxmlformats.org/presentationml/2006/main">
+  <p:cSld>
+    <p:spTree>
+      <p:nvGrpSpPr>
+        <p:cNvPr id="1" name=""/>
+        <p:cNvGrpSpPr/>
+        <p:nvPr/>
+      </p:nvGrpSpPr>
+      <p:grpSpPr>
+        <a:xfrm>
+          <a:off x="0" y="0"/>
+          <a:ext cx="0" cy="0"/>
+          <a:chOff x="0" y="0"/>
+          <a:chExt cx="0" cy="0"/>
+        </a:xfrm>
+      </p:grpSpPr>
+      <p:sp>
+        <p:nvSpPr>
+          <p:cNvPr id="2" name="Title 1">
+            <a:extLst>
+              <a:ext uri="{FF2B5EF4-FFF2-40B4-BE49-F238E27FC236}">
+                <a16:creationId xmlns:a16="http://schemas.microsoft.com/office/drawing/2014/main" id="{3EFB1119-6DAB-476F-9541-ABA9503B44FF}"/>
+              </a:ext>
+            </a:extLst>
+          </p:cNvPr>
+          <p:cNvSpPr>
+            <a:spLocks noGrp="1"/>
+          </p:cNvSpPr>
+          <p:nvPr>
+            <p:ph type="title"/>
+          </p:nvPr>
+        </p:nvSpPr>
+        <p:spPr/>
+        <p:txBody>
+          <a:bodyPr/>
+          <a:lstStyle/>
+          <a:p>
+            <a:r>
+              <a:rPr lang="en-US" dirty="0"/>
+              <a:t>Dataset Analyzed</a:t>
+            </a:r>
+          </a:p>
+        </p:txBody>
+      </p:sp>
+      <p:sp>
+        <p:nvSpPr>
+          <p:cNvPr id="3" name="Content Placeholder 2">
+            <a:extLst>
+              <a:ext uri="{FF2B5EF4-FFF2-40B4-BE49-F238E27FC236}">
+                <a16:creationId xmlns:a16="http://schemas.microsoft.com/office/drawing/2014/main" id="{304380FF-F4C6-46D9-95C8-F4A1742EB433}"/>
+              </a:ext>
+            </a:extLst>
+          </p:cNvPr>
+          <p:cNvSpPr>
+            <a:spLocks noGrp="1"/>
+          </p:cNvSpPr>
+          <p:nvPr>
+            <p:ph idx="1"/>
+          </p:nvPr>
+        </p:nvSpPr>
+        <p:spPr/>
+        <p:txBody>
+          <a:bodyPr>
+            <a:normAutofit/>
+          </a:bodyPr>
+          <a:lstStyle/>
+          <a:p>
+            <a:r>
+              <a:rPr lang="en-US" sz="3600" dirty="0"/>
+              <a:t>School file -15 school records</a:t>
+            </a:r>
+          </a:p>
+          <a:p>
+            <a:pPr lvl="1"/>
+            <a:r>
+              <a:rPr lang="en-US" sz="3200" dirty="0"/>
+              <a:t>School ID</a:t>
+            </a:r>
+          </a:p>
+          <a:p>
+            <a:pPr lvl="1"/>
+            <a:r>
+              <a:rPr lang="en-US" sz="3200" dirty="0"/>
+              <a:t>Name</a:t>
+            </a:r>
+          </a:p>
+          <a:p>
+            <a:pPr lvl="1"/>
+            <a:r>
+              <a:rPr lang="en-US" sz="3200" dirty="0"/>
+              <a:t>Type (charter or traditional)</a:t>
+            </a:r>
+          </a:p>
+          <a:p>
+            <a:pPr lvl="1"/>
+            <a:r>
+              <a:rPr lang="en-US" sz="3200" dirty="0"/>
+              <a:t>Student population</a:t>
+            </a:r>
+          </a:p>
+          <a:p>
+            <a:pPr lvl="1"/>
+            <a:r>
+              <a:rPr lang="en-US" sz="3200" dirty="0"/>
+              <a:t>Total budget</a:t>
+            </a:r>
+          </a:p>
+        </p:txBody>
+      </p:sp>
+    </p:spTree>
+    <p:extLst>
+      <p:ext uri="{BB962C8B-B14F-4D97-AF65-F5344CB8AC3E}">
+        <p14:creationId xmlns:p14="http://schemas.microsoft.com/office/powerpoint/2010/main" val="283376497"/>
+      </p:ext>
+    </p:extLst>
+  </p:cSld>
+  <p:clrMapOvr>
+    <a:masterClrMapping/>
+  </p:clrMapOvr>
+</p:sld>
+</file>
+
+<file path=ppt/slides/slide22.xml><?xml version="1.0" encoding="utf-8"?>
+<p:sld xmlns:a="http://schemas.openxmlformats.org/drawingml/2006/main" xmlns:r="http://schemas.openxmlformats.org/officeDocument/2006/relationships" xmlns:p="http://schemas.openxmlformats.org/presentationml/2006/main">
+  <p:cSld>
+    <p:spTree>
+      <p:nvGrpSpPr>
+        <p:cNvPr id="1" name=""/>
+        <p:cNvGrpSpPr/>
+        <p:nvPr/>
+      </p:nvGrpSpPr>
+      <p:grpSpPr>
+        <a:xfrm>
+          <a:off x="0" y="0"/>
+          <a:ext cx="0" cy="0"/>
+          <a:chOff x="0" y="0"/>
+          <a:chExt cx="0" cy="0"/>
+        </a:xfrm>
+      </p:grpSpPr>
+      <p:sp>
+        <p:nvSpPr>
+          <p:cNvPr id="2" name="Title 1">
+            <a:extLst>
+              <a:ext uri="{FF2B5EF4-FFF2-40B4-BE49-F238E27FC236}">
+                <a16:creationId xmlns:a16="http://schemas.microsoft.com/office/drawing/2014/main" id="{3EFB1119-6DAB-476F-9541-ABA9503B44FF}"/>
+              </a:ext>
+            </a:extLst>
+          </p:cNvPr>
+          <p:cNvSpPr>
+            <a:spLocks noGrp="1"/>
+          </p:cNvSpPr>
+          <p:nvPr>
+            <p:ph type="title"/>
+          </p:nvPr>
+        </p:nvSpPr>
+        <p:spPr/>
+        <p:txBody>
+          <a:bodyPr/>
+          <a:lstStyle/>
+          <a:p>
+            <a:r>
+              <a:rPr lang="en-US" dirty="0"/>
+              <a:t>Analysis project</a:t>
+            </a:r>
+          </a:p>
+        </p:txBody>
+      </p:sp>
+      <p:sp>
+        <p:nvSpPr>
+          <p:cNvPr id="3" name="Content Placeholder 2">
+            <a:extLst>
+              <a:ext uri="{FF2B5EF4-FFF2-40B4-BE49-F238E27FC236}">
+                <a16:creationId xmlns:a16="http://schemas.microsoft.com/office/drawing/2014/main" id="{304380FF-F4C6-46D9-95C8-F4A1742EB433}"/>
+              </a:ext>
+            </a:extLst>
+          </p:cNvPr>
+          <p:cNvSpPr>
+            <a:spLocks noGrp="1"/>
+          </p:cNvSpPr>
+          <p:nvPr>
+            <p:ph idx="1"/>
+          </p:nvPr>
+        </p:nvSpPr>
+        <p:spPr/>
+        <p:txBody>
+          <a:bodyPr>
+            <a:normAutofit/>
+          </a:bodyPr>
+          <a:lstStyle/>
+          <a:p>
+            <a:r>
+              <a:rPr lang="en-US" sz="3600" dirty="0"/>
+              <a:t>Aggregation of data to get success metrics</a:t>
+            </a:r>
+          </a:p>
+          <a:p>
+            <a:r>
+              <a:rPr lang="en-US" sz="3600" dirty="0"/>
+              <a:t>Joining of files to get type/school performance, budget summaries</a:t>
+            </a:r>
+            <a:endParaRPr lang="en-US" sz="3200" dirty="0"/>
+          </a:p>
+        </p:txBody>
+      </p:sp>
+    </p:spTree>
+    <p:extLst>
+      <p:ext uri="{BB962C8B-B14F-4D97-AF65-F5344CB8AC3E}">
+        <p14:creationId xmlns:p14="http://schemas.microsoft.com/office/powerpoint/2010/main" val="2122951435"/>
+      </p:ext>
+    </p:extLst>
+  </p:cSld>
+  <p:clrMapOvr>
+    <a:masterClrMapping/>
+  </p:clrMapOvr>
+</p:sld>
+</file>
+
+<file path=ppt/slides/slide23.xml><?xml version="1.0" encoding="utf-8"?>
+<p:sld xmlns:a="http://schemas.openxmlformats.org/drawingml/2006/main" xmlns:r="http://schemas.openxmlformats.org/officeDocument/2006/relationships" xmlns:p="http://schemas.openxmlformats.org/presentationml/2006/main">
+  <p:cSld>
+    <p:spTree>
+      <p:nvGrpSpPr>
+        <p:cNvPr id="1" name=""/>
+        <p:cNvGrpSpPr/>
+        <p:nvPr/>
+      </p:nvGrpSpPr>
+      <p:grpSpPr>
+        <a:xfrm>
+          <a:off x="0" y="0"/>
+          <a:ext cx="0" cy="0"/>
+          <a:chOff x="0" y="0"/>
+          <a:chExt cx="0" cy="0"/>
+        </a:xfrm>
+      </p:grpSpPr>
+      <p:sp>
+        <p:nvSpPr>
+          <p:cNvPr id="2" name="Title 1">
+            <a:extLst>
+              <a:ext uri="{FF2B5EF4-FFF2-40B4-BE49-F238E27FC236}">
                 <a16:creationId xmlns:a16="http://schemas.microsoft.com/office/drawing/2014/main" id="{1A073648-C590-4552-B61B-849C75E9DBB4}"/>
               </a:ext>
             </a:extLst>
@@ -7986,7 +8350,7 @@
 </p:sld>
 </file>
 
-<file path=ppt/slides/slide21.xml><?xml version="1.0" encoding="utf-8"?>
+<file path=ppt/slides/slide24.xml><?xml version="1.0" encoding="utf-8"?>
 <p:sld xmlns:a="http://schemas.openxmlformats.org/drawingml/2006/main" xmlns:r="http://schemas.openxmlformats.org/officeDocument/2006/relationships" xmlns:p="http://schemas.openxmlformats.org/presentationml/2006/main">
   <p:cSld>
     <p:spTree>
@@ -8093,7 +8457,7 @@
 </p:sld>
 </file>
 
-<file path=ppt/slides/slide22.xml><?xml version="1.0" encoding="utf-8"?>
+<file path=ppt/slides/slide25.xml><?xml version="1.0" encoding="utf-8"?>
 <p:sld xmlns:a="http://schemas.openxmlformats.org/drawingml/2006/main" xmlns:r="http://schemas.openxmlformats.org/officeDocument/2006/relationships" xmlns:p="http://schemas.openxmlformats.org/presentationml/2006/main">
   <p:cSld>
     <p:spTree>
@@ -8200,7 +8564,7 @@
 </p:sld>
 </file>
 
-<file path=ppt/slides/slide23.xml><?xml version="1.0" encoding="utf-8"?>
+<file path=ppt/slides/slide26.xml><?xml version="1.0" encoding="utf-8"?>
 <p:sld xmlns:a="http://schemas.openxmlformats.org/drawingml/2006/main" xmlns:r="http://schemas.openxmlformats.org/officeDocument/2006/relationships" xmlns:p="http://schemas.openxmlformats.org/presentationml/2006/main">
   <p:cSld>
     <p:spTree>

</xml_diff>